<commit_message>
Updated with achievements/challenges and FDP
</commit_message>
<xml_diff>
--- a/CentRes.pptx
+++ b/CentRes.pptx
@@ -249,7 +249,7 @@
           <a:p>
             <a:fld id="{966D5B4E-BF3E-3B45-A4BA-D6C3B92870D7}" type="datetimeFigureOut">
               <a:rPr lang="en-US" smtClean="0"/>
-              <a:t>11/8/2022</a:t>
+              <a:t>11/9/2022</a:t>
             </a:fld>
             <a:endParaRPr lang="en-US" dirty="0"/>
           </a:p>
@@ -426,7 +426,7 @@
           <a:p>
             <a:fld id="{F5A8621B-8C8E-49BA-8772-41D0FE75A082}" type="datetimeFigureOut">
               <a:rPr lang="en-US" smtClean="0"/>
-              <a:t>11/8/2022</a:t>
+              <a:t>11/9/2022</a:t>
             </a:fld>
             <a:endParaRPr lang="en-US" dirty="0"/>
           </a:p>
@@ -8108,6 +8108,87 @@
           <a:lstStyle/>
           <a:p>
             <a:pPr algn="l"/>
+            <a:r>
+              <a:rPr lang="en-US" sz="1600" u="sng" spc="0" dirty="0">
+                <a:cs typeface="Arial" panose="020B0604020202020204" pitchFamily="34" charset="0"/>
+              </a:rPr>
+              <a:t>Achievements:</a:t>
+            </a:r>
+          </a:p>
+          <a:p>
+            <a:pPr marL="285750" indent="-285750" algn="l">
+              <a:buFont typeface="Arial" panose="020B0604020202020204" pitchFamily="34" charset="0"/>
+              <a:buChar char="•"/>
+            </a:pPr>
+            <a:r>
+              <a:rPr lang="en-US" spc="0" dirty="0">
+                <a:cs typeface="Arial" panose="020B0604020202020204" pitchFamily="34" charset="0"/>
+              </a:rPr>
+              <a:t>Successfully hosted sprint meetings with all members present weekly and participating</a:t>
+            </a:r>
+          </a:p>
+          <a:p>
+            <a:pPr marL="285750" indent="-285750" algn="l">
+              <a:buFont typeface="Arial" panose="020B0604020202020204" pitchFamily="34" charset="0"/>
+              <a:buChar char="•"/>
+            </a:pPr>
+            <a:endParaRPr lang="en-US" spc="0" dirty="0">
+              <a:cs typeface="Arial" panose="020B0604020202020204" pitchFamily="34" charset="0"/>
+            </a:endParaRPr>
+          </a:p>
+          <a:p>
+            <a:pPr marL="285750" indent="-285750" algn="l">
+              <a:buFont typeface="Arial" panose="020B0604020202020204" pitchFamily="34" charset="0"/>
+              <a:buChar char="•"/>
+            </a:pPr>
+            <a:endParaRPr lang="en-US" spc="0" dirty="0">
+              <a:cs typeface="Arial" panose="020B0604020202020204" pitchFamily="34" charset="0"/>
+            </a:endParaRPr>
+          </a:p>
+          <a:p>
+            <a:pPr algn="l"/>
+            <a:endParaRPr lang="en-US" spc="0" dirty="0">
+              <a:cs typeface="Arial" panose="020B0604020202020204" pitchFamily="34" charset="0"/>
+            </a:endParaRPr>
+          </a:p>
+          <a:p>
+            <a:pPr algn="l"/>
+            <a:endParaRPr lang="en-US" spc="0" dirty="0">
+              <a:cs typeface="Arial" panose="020B0604020202020204" pitchFamily="34" charset="0"/>
+            </a:endParaRPr>
+          </a:p>
+          <a:p>
+            <a:pPr algn="l"/>
+            <a:endParaRPr lang="en-US" spc="0" dirty="0">
+              <a:cs typeface="Arial" panose="020B0604020202020204" pitchFamily="34" charset="0"/>
+            </a:endParaRPr>
+          </a:p>
+          <a:p>
+            <a:pPr algn="l"/>
+            <a:r>
+              <a:rPr lang="en-US" sz="1600" u="sng" spc="0" dirty="0">
+                <a:cs typeface="Arial" panose="020B0604020202020204" pitchFamily="34" charset="0"/>
+              </a:rPr>
+              <a:t>Challenges:</a:t>
+            </a:r>
+          </a:p>
+          <a:p>
+            <a:pPr marL="285750" indent="-285750" algn="l">
+              <a:buFont typeface="Arial" panose="020B0604020202020204" pitchFamily="34" charset="0"/>
+              <a:buChar char="•"/>
+            </a:pPr>
+            <a:r>
+              <a:rPr lang="en-US" spc="0" dirty="0">
+                <a:cs typeface="Arial" panose="020B0604020202020204" pitchFamily="34" charset="0"/>
+              </a:rPr>
+              <a:t>Microsoft word formatting for SRS document </a:t>
+            </a:r>
+          </a:p>
+          <a:p>
+            <a:pPr marL="285750" indent="-285750" algn="l">
+              <a:buFont typeface="Arial" panose="020B0604020202020204" pitchFamily="34" charset="0"/>
+              <a:buChar char="•"/>
+            </a:pPr>
             <a:endParaRPr lang="en-US" sz="1600" spc="0" dirty="0">
               <a:cs typeface="Arial" panose="020B0604020202020204" pitchFamily="34" charset="0"/>
             </a:endParaRPr>
@@ -8267,14 +8348,29 @@
         <p:spPr>
           <a:xfrm>
             <a:off x="5897218" y="956345"/>
-            <a:ext cx="6095999" cy="5653439"/>
+            <a:ext cx="6095999" cy="5578679"/>
           </a:xfrm>
         </p:spPr>
         <p:txBody>
           <a:bodyPr/>
           <a:lstStyle/>
           <a:p>
-            <a:pPr algn="l"/>
+            <a:pPr marL="285750" indent="-285750" algn="l">
+              <a:buFont typeface="Arial" panose="020B0604020202020204" pitchFamily="34" charset="0"/>
+              <a:buChar char="•"/>
+            </a:pPr>
+            <a:r>
+              <a:rPr lang="en-US" sz="1600" spc="0" dirty="0">
+                <a:cs typeface="Arial" panose="020B0604020202020204" pitchFamily="34" charset="0"/>
+              </a:rPr>
+              <a:t>Create a Mobile application version to give restaurant owners the option to use either a web application or mobile application based </a:t>
+            </a:r>
+            <a:r>
+              <a:rPr lang="en-US" sz="1600" spc="0">
+                <a:cs typeface="Arial" panose="020B0604020202020204" pitchFamily="34" charset="0"/>
+              </a:rPr>
+              <a:t>on their needs. </a:t>
+            </a:r>
             <a:endParaRPr lang="en-US" sz="1600" spc="0" dirty="0">
               <a:cs typeface="Arial" panose="020B0604020202020204" pitchFamily="34" charset="0"/>
             </a:endParaRPr>
@@ -12095,21 +12191,21 @@
 </file>
 
 <file path=customXml/item2.xml><?xml version="1.0" encoding="utf-8"?>
+<p:properties xmlns:p="http://schemas.microsoft.com/office/2006/metadata/properties" xmlns:xsi="http://www.w3.org/2001/XMLSchema-instance" xmlns:pc="http://schemas.microsoft.com/office/infopath/2007/PartnerControls">
+  <documentManagement>
+    <Status xmlns="71af3243-3dd4-4a8d-8c0d-dd76da1f02a5">Not started</Status>
+    <MediaServiceKeyPoints xmlns="71af3243-3dd4-4a8d-8c0d-dd76da1f02a5" xsi:nil="true"/>
+  </documentManagement>
+</p:properties>
+</file>
+
+<file path=customXml/item3.xml><?xml version="1.0" encoding="utf-8"?>
 <?mso-contentType ?>
 <FormTemplates xmlns="http://schemas.microsoft.com/sharepoint/v3/contenttype/forms">
   <Display>DocumentLibraryForm</Display>
   <Edit>DocumentLibraryForm</Edit>
   <New>DocumentLibraryForm</New>
 </FormTemplates>
-</file>
-
-<file path=customXml/item3.xml><?xml version="1.0" encoding="utf-8"?>
-<p:properties xmlns:p="http://schemas.microsoft.com/office/2006/metadata/properties" xmlns:xsi="http://www.w3.org/2001/XMLSchema-instance" xmlns:pc="http://schemas.microsoft.com/office/infopath/2007/PartnerControls">
-  <documentManagement>
-    <Status xmlns="71af3243-3dd4-4a8d-8c0d-dd76da1f02a5">Not started</Status>
-    <MediaServiceKeyPoints xmlns="71af3243-3dd4-4a8d-8c0d-dd76da1f02a5" xsi:nil="true"/>
-  </documentManagement>
-</p:properties>
 </file>
 
 <file path=customXml/itemProps1.xml><?xml version="1.0" encoding="utf-8"?>
@@ -12132,14 +12228,6 @@
 </file>
 
 <file path=customXml/itemProps2.xml><?xml version="1.0" encoding="utf-8"?>
-<ds:datastoreItem xmlns:ds="http://schemas.openxmlformats.org/officeDocument/2006/customXml" ds:itemID="{1B7E2D32-4FDD-4266-880C-17595B801432}">
-  <ds:schemaRefs>
-    <ds:schemaRef ds:uri="http://schemas.microsoft.com/sharepoint/v3/contenttype/forms"/>
-  </ds:schemaRefs>
-</ds:datastoreItem>
-</file>
-
-<file path=customXml/itemProps3.xml><?xml version="1.0" encoding="utf-8"?>
 <ds:datastoreItem xmlns:ds="http://schemas.openxmlformats.org/officeDocument/2006/customXml" ds:itemID="{E3D9F223-918A-45AF-9B53-56AB9E5E2182}">
   <ds:schemaRefs>
     <ds:schemaRef ds:uri="http://schemas.microsoft.com/office/2006/metadata/properties"/>
@@ -12147,4 +12235,12 @@
     <ds:schemaRef ds:uri="71af3243-3dd4-4a8d-8c0d-dd76da1f02a5"/>
   </ds:schemaRefs>
 </ds:datastoreItem>
+</file>
+
+<file path=customXml/itemProps3.xml><?xml version="1.0" encoding="utf-8"?>
+<ds:datastoreItem xmlns:ds="http://schemas.openxmlformats.org/officeDocument/2006/customXml" ds:itemID="{1B7E2D32-4FDD-4266-880C-17595B801432}">
+  <ds:schemaRefs>
+    <ds:schemaRef ds:uri="http://schemas.microsoft.com/sharepoint/v3/contenttype/forms"/>
+  </ds:schemaRefs>
+</ds:datastoreItem>
 </file>
</xml_diff>

<commit_message>
Added hardware, architecture and project specs
</commit_message>
<xml_diff>
--- a/CentRes.pptx
+++ b/CentRes.pptx
@@ -6400,7 +6400,7 @@
         </p:spPr>
         <p:txBody>
           <a:bodyPr>
-            <a:normAutofit/>
+            <a:normAutofit fontScale="92500" lnSpcReduction="10000"/>
           </a:bodyPr>
           <a:lstStyle/>
           <a:p>
@@ -6673,6 +6673,42 @@
               <a:defRPr/>
             </a:pPr>
             <a:r>
+              <a:rPr kumimoji="0" lang="en-US" sz="1600" b="0" i="0" strike="noStrike" kern="1200" cap="none" normalizeH="0" noProof="0" dirty="0">
+                <a:ln>
+                  <a:noFill/>
+                </a:ln>
+                <a:solidFill>
+                  <a:schemeClr val="tx1"/>
+                </a:solidFill>
+                <a:effectLst/>
+                <a:uLnTx/>
+                <a:uFillTx/>
+                <a:latin typeface="+mn-lt"/>
+                <a:ea typeface="+mn-ea"/>
+                <a:cs typeface="Biome Light" panose="020B0303030204020804" pitchFamily="34" charset="0"/>
+              </a:rPr>
+              <a:t>Network: </a:t>
+            </a:r>
+          </a:p>
+          <a:p>
+            <a:pPr marL="0" marR="0" lvl="0" indent="0" algn="l" defTabSz="914400" rtl="0" eaLnBrk="1" fontAlgn="auto" latinLnBrk="0" hangingPunct="1">
+              <a:lnSpc>
+                <a:spcPct val="100000"/>
+              </a:lnSpc>
+              <a:spcBef>
+                <a:spcPts val="1000"/>
+              </a:spcBef>
+              <a:spcAft>
+                <a:spcPts val="0"/>
+              </a:spcAft>
+              <a:buClrTx/>
+              <a:buSzTx/>
+              <a:buFont typeface="Arial" panose="020B0604020202020204" pitchFamily="34" charset="0"/>
+              <a:buNone/>
+              <a:tabLst/>
+              <a:defRPr/>
+            </a:pPr>
+            <a:r>
               <a:rPr kumimoji="0" lang="en-US" sz="1600" b="0" i="0" u="none" strike="noStrike" kern="1200" cap="none" normalizeH="0" noProof="0" dirty="0">
                 <a:ln>
                   <a:noFill/>
@@ -6687,11 +6723,742 @@
                 <a:ea typeface="+mn-ea"/>
                 <a:cs typeface="Biome Light" panose="020B0303030204020804" pitchFamily="34" charset="0"/>
               </a:rPr>
-              <a:t>We finished the consolidation project</a:t>
+              <a:t>    Switch, Cabling, CAT6, Universal Power Supply (UPS)</a:t>
             </a:r>
           </a:p>
           <a:p>
             <a:pPr marL="0" marR="0" lvl="0" indent="0" algn="l" defTabSz="914400" rtl="0" eaLnBrk="1" fontAlgn="auto" latinLnBrk="0" hangingPunct="1">
+              <a:lnSpc>
+                <a:spcPct val="100000"/>
+              </a:lnSpc>
+              <a:spcBef>
+                <a:spcPts val="1000"/>
+              </a:spcBef>
+              <a:spcAft>
+                <a:spcPts val="0"/>
+              </a:spcAft>
+              <a:buClrTx/>
+              <a:buSzTx/>
+              <a:buFont typeface="Arial" panose="020B0604020202020204" pitchFamily="34" charset="0"/>
+              <a:buNone/>
+              <a:tabLst/>
+              <a:defRPr/>
+            </a:pPr>
+            <a:r>
+              <a:rPr lang="en-US" dirty="0">
+                <a:cs typeface="Biome Light" panose="020B0303030204020804" pitchFamily="34" charset="0"/>
+              </a:rPr>
+              <a:t>Tablet: </a:t>
+            </a:r>
+          </a:p>
+          <a:p>
+            <a:pPr marL="0" marR="0" lvl="0" indent="0" algn="l" defTabSz="914400" rtl="0" eaLnBrk="1" fontAlgn="auto" latinLnBrk="0" hangingPunct="1">
+              <a:lnSpc>
+                <a:spcPct val="100000"/>
+              </a:lnSpc>
+              <a:spcBef>
+                <a:spcPts val="1000"/>
+              </a:spcBef>
+              <a:spcAft>
+                <a:spcPts val="0"/>
+              </a:spcAft>
+              <a:buClrTx/>
+              <a:buSzTx/>
+              <a:buFont typeface="Arial" panose="020B0604020202020204" pitchFamily="34" charset="0"/>
+              <a:buNone/>
+              <a:tabLst/>
+              <a:defRPr/>
+            </a:pPr>
+            <a:r>
+              <a:rPr lang="en-US" dirty="0">
+                <a:cs typeface="Biome Light" panose="020B0303030204020804" pitchFamily="34" charset="0"/>
+              </a:rPr>
+              <a:t>    IOS, Android, or any OS that has web browser capability</a:t>
+            </a:r>
+          </a:p>
+          <a:p>
+            <a:pPr marL="0" marR="0" lvl="0" indent="0" algn="l" defTabSz="914400" rtl="0" eaLnBrk="1" fontAlgn="auto" latinLnBrk="0" hangingPunct="1">
+              <a:lnSpc>
+                <a:spcPct val="100000"/>
+              </a:lnSpc>
+              <a:spcBef>
+                <a:spcPts val="1000"/>
+              </a:spcBef>
+              <a:spcAft>
+                <a:spcPts val="0"/>
+              </a:spcAft>
+              <a:buClrTx/>
+              <a:buSzTx/>
+              <a:buFont typeface="Arial" panose="020B0604020202020204" pitchFamily="34" charset="0"/>
+              <a:buNone/>
+              <a:tabLst/>
+              <a:defRPr/>
+            </a:pPr>
+            <a:r>
+              <a:rPr lang="en-US" dirty="0">
+                <a:cs typeface="Biome Light" panose="020B0303030204020804" pitchFamily="34" charset="0"/>
+              </a:rPr>
+              <a:t>Printer: </a:t>
+            </a:r>
+          </a:p>
+          <a:p>
+            <a:pPr marL="0" marR="0" lvl="0" indent="0" algn="l" defTabSz="914400" rtl="0" eaLnBrk="1" fontAlgn="auto" latinLnBrk="0" hangingPunct="1">
+              <a:lnSpc>
+                <a:spcPct val="100000"/>
+              </a:lnSpc>
+              <a:spcBef>
+                <a:spcPts val="1000"/>
+              </a:spcBef>
+              <a:spcAft>
+                <a:spcPts val="0"/>
+              </a:spcAft>
+              <a:buClrTx/>
+              <a:buSzTx/>
+              <a:buFont typeface="Arial" panose="020B0604020202020204" pitchFamily="34" charset="0"/>
+              <a:buNone/>
+              <a:tabLst/>
+              <a:defRPr/>
+            </a:pPr>
+            <a:r>
+              <a:rPr lang="en-US" dirty="0">
+                <a:cs typeface="Biome Light" panose="020B0303030204020804" pitchFamily="34" charset="0"/>
+              </a:rPr>
+              <a:t>    Customer bills, server shift report, manager daily monetary report</a:t>
+            </a:r>
+            <a:endParaRPr kumimoji="0" lang="en-US" sz="1600" b="0" i="0" u="none" strike="noStrike" kern="1200" cap="none" normalizeH="0" noProof="0" dirty="0">
+              <a:ln>
+                <a:noFill/>
+              </a:ln>
+              <a:solidFill>
+                <a:schemeClr val="tx1"/>
+              </a:solidFill>
+              <a:effectLst/>
+              <a:uLnTx/>
+              <a:uFillTx/>
+              <a:latin typeface="+mn-lt"/>
+              <a:ea typeface="+mn-ea"/>
+              <a:cs typeface="Biome Light" panose="020B0303030204020804" pitchFamily="34" charset="0"/>
+            </a:endParaRPr>
+          </a:p>
+          <a:p>
+            <a:pPr marL="0" indent="0">
+              <a:buNone/>
+            </a:pPr>
+            <a:endParaRPr lang="en-US" b="1" dirty="0"/>
+          </a:p>
+        </p:txBody>
+      </p:sp>
+      <p:sp>
+        <p:nvSpPr>
+          <p:cNvPr id="16" name="Slide Number Placeholder 15">
+            <a:extLst>
+              <a:ext uri="{FF2B5EF4-FFF2-40B4-BE49-F238E27FC236}">
+                <a16:creationId xmlns:a16="http://schemas.microsoft.com/office/drawing/2014/main" id="{7FA57D11-A25F-4772-8E50-DDB68BE8CB69}"/>
+              </a:ext>
+            </a:extLst>
+          </p:cNvPr>
+          <p:cNvSpPr>
+            <a:spLocks noGrp="1"/>
+          </p:cNvSpPr>
+          <p:nvPr>
+            <p:ph type="sldNum" sz="quarter" idx="4"/>
+          </p:nvPr>
+        </p:nvSpPr>
+        <p:spPr/>
+        <p:txBody>
+          <a:bodyPr/>
+          <a:lstStyle/>
+          <a:p>
+            <a:fld id="{8C2E478F-E849-4A8C-AF1F-CBCC78A7CBFA}" type="slidenum">
+              <a:rPr lang="en-US" smtClean="0"/>
+              <a:t>13</a:t>
+            </a:fld>
+            <a:endParaRPr lang="en-US" dirty="0"/>
+          </a:p>
+        </p:txBody>
+      </p:sp>
+    </p:spTree>
+    <p:extLst>
+      <p:ext uri="{BB962C8B-B14F-4D97-AF65-F5344CB8AC3E}">
+        <p14:creationId xmlns:p14="http://schemas.microsoft.com/office/powerpoint/2010/main" val="3516891798"/>
+      </p:ext>
+    </p:extLst>
+  </p:cSld>
+  <p:clrMapOvr>
+    <a:masterClrMapping/>
+  </p:clrMapOvr>
+</p:sld>
+</file>
+
+<file path=ppt/slides/slide14.xml><?xml version="1.0" encoding="utf-8"?>
+<p:sld xmlns:a="http://schemas.openxmlformats.org/drawingml/2006/main" xmlns:r="http://schemas.openxmlformats.org/officeDocument/2006/relationships" xmlns:p="http://schemas.openxmlformats.org/presentationml/2006/main">
+  <p:cSld>
+    <p:spTree>
+      <p:nvGrpSpPr>
+        <p:cNvPr id="1" name=""/>
+        <p:cNvGrpSpPr/>
+        <p:nvPr/>
+      </p:nvGrpSpPr>
+      <p:grpSpPr>
+        <a:xfrm>
+          <a:off x="0" y="0"/>
+          <a:ext cx="0" cy="0"/>
+          <a:chOff x="0" y="0"/>
+          <a:chExt cx="0" cy="0"/>
+        </a:xfrm>
+      </p:grpSpPr>
+      <p:sp>
+        <p:nvSpPr>
+          <p:cNvPr id="2" name="Title 1">
+            <a:extLst>
+              <a:ext uri="{FF2B5EF4-FFF2-40B4-BE49-F238E27FC236}">
+                <a16:creationId xmlns:a16="http://schemas.microsoft.com/office/drawing/2014/main" id="{12CC3376-5069-4C7B-BE6B-A3776D1B47BA}"/>
+              </a:ext>
+            </a:extLst>
+          </p:cNvPr>
+          <p:cNvSpPr>
+            <a:spLocks noGrp="1"/>
+          </p:cNvSpPr>
+          <p:nvPr>
+            <p:ph type="title"/>
+          </p:nvPr>
+        </p:nvSpPr>
+        <p:spPr>
+          <a:xfrm>
+            <a:off x="6095999" y="35082"/>
+            <a:ext cx="5897218" cy="884238"/>
+          </a:xfrm>
+        </p:spPr>
+        <p:txBody>
+          <a:bodyPr/>
+          <a:lstStyle/>
+          <a:p>
+            <a:r>
+              <a:rPr lang="en-US" dirty="0"/>
+              <a:t>High Level Design</a:t>
+            </a:r>
+          </a:p>
+        </p:txBody>
+      </p:sp>
+      <p:pic>
+        <p:nvPicPr>
+          <p:cNvPr id="6" name="Picture Placeholder 5" descr="person staring at blueprints on a brick wall">
+            <a:extLst>
+              <a:ext uri="{FF2B5EF4-FFF2-40B4-BE49-F238E27FC236}">
+                <a16:creationId xmlns:a16="http://schemas.microsoft.com/office/drawing/2014/main" id="{C07C315A-7CD1-432C-92FA-6B62159B56CA}"/>
+              </a:ext>
+            </a:extLst>
+          </p:cNvPr>
+          <p:cNvPicPr>
+            <a:picLocks noGrp="1" noChangeAspect="1"/>
+          </p:cNvPicPr>
+          <p:nvPr>
+            <p:ph type="pic" sz="quarter" idx="14"/>
+          </p:nvPr>
+        </p:nvPicPr>
+        <p:blipFill rotWithShape="1">
+          <a:blip r:embed="rId3">
+            <a:extLst>
+              <a:ext uri="{BEBA8EAE-BF5A-486C-A8C5-ECC9F3942E4B}">
+                <a14:imgProps xmlns:a14="http://schemas.microsoft.com/office/drawing/2010/main">
+                  <a14:imgLayer r:embed="rId4">
+                    <a14:imgEffect>
+                      <a14:saturation sat="0"/>
+                    </a14:imgEffect>
+                  </a14:imgLayer>
+                </a14:imgProps>
+              </a:ext>
+            </a:extLst>
+          </a:blip>
+          <a:srcRect l="23552" t="1" r="23880" b="327"/>
+          <a:stretch/>
+        </p:blipFill>
+        <p:spPr>
+          <a:xfrm>
+            <a:off x="0" y="0"/>
+            <a:ext cx="5416550" cy="6858000"/>
+          </a:xfrm>
+        </p:spPr>
+      </p:pic>
+      <p:sp>
+        <p:nvSpPr>
+          <p:cNvPr id="14" name="Content Placeholder 13">
+            <a:extLst>
+              <a:ext uri="{FF2B5EF4-FFF2-40B4-BE49-F238E27FC236}">
+                <a16:creationId xmlns:a16="http://schemas.microsoft.com/office/drawing/2014/main" id="{79248A72-A597-48DF-A270-3389F5D209C0}"/>
+              </a:ext>
+            </a:extLst>
+          </p:cNvPr>
+          <p:cNvSpPr>
+            <a:spLocks noGrp="1"/>
+          </p:cNvSpPr>
+          <p:nvPr>
+            <p:ph idx="1"/>
+          </p:nvPr>
+        </p:nvSpPr>
+        <p:spPr>
+          <a:xfrm>
+            <a:off x="6096000" y="919320"/>
+            <a:ext cx="5690532" cy="4949971"/>
+          </a:xfrm>
+        </p:spPr>
+        <p:txBody>
+          <a:bodyPr>
+            <a:normAutofit/>
+          </a:bodyPr>
+          <a:lstStyle/>
+          <a:p>
+            <a:pPr marL="0" marR="0" lvl="0" indent="0" algn="l" defTabSz="914400" rtl="0" eaLnBrk="1" fontAlgn="auto" latinLnBrk="0" hangingPunct="1">
+              <a:lnSpc>
+                <a:spcPct val="100000"/>
+              </a:lnSpc>
+              <a:spcBef>
+                <a:spcPts val="1000"/>
+              </a:spcBef>
+              <a:spcAft>
+                <a:spcPts val="0"/>
+              </a:spcAft>
+              <a:buClrTx/>
+              <a:buSzTx/>
+              <a:buFont typeface="Arial" panose="020B0604020202020204" pitchFamily="34" charset="0"/>
+              <a:buNone/>
+              <a:tabLst/>
+              <a:defRPr/>
+            </a:pPr>
+            <a:r>
+              <a:rPr kumimoji="0" lang="en-US" sz="2000" b="0" i="0" u="sng" strike="noStrike" kern="1200" cap="none" normalizeH="0" noProof="0" dirty="0">
+                <a:ln>
+                  <a:noFill/>
+                </a:ln>
+                <a:solidFill>
+                  <a:schemeClr val="tx1"/>
+                </a:solidFill>
+                <a:effectLst/>
+                <a:uLnTx/>
+                <a:uFillTx/>
+                <a:latin typeface="+mn-lt"/>
+                <a:ea typeface="+mn-ea"/>
+                <a:cs typeface="Biome Light" panose="020B0303030204020804" pitchFamily="34" charset="0"/>
+              </a:rPr>
+              <a:t>User Interface</a:t>
+            </a:r>
+          </a:p>
+          <a:p>
+            <a:pPr marL="0" marR="0" lvl="0" indent="0" algn="l" defTabSz="914400" rtl="0" eaLnBrk="1" fontAlgn="auto" latinLnBrk="0" hangingPunct="1">
+              <a:lnSpc>
+                <a:spcPct val="100000"/>
+              </a:lnSpc>
+              <a:spcBef>
+                <a:spcPts val="1000"/>
+              </a:spcBef>
+              <a:spcAft>
+                <a:spcPts val="0"/>
+              </a:spcAft>
+              <a:buClrTx/>
+              <a:buSzTx/>
+              <a:buFont typeface="Arial" panose="020B0604020202020204" pitchFamily="34" charset="0"/>
+              <a:buNone/>
+              <a:tabLst/>
+              <a:defRPr/>
+            </a:pPr>
+            <a:r>
+              <a:rPr kumimoji="0" lang="en-US" sz="1600" b="0" i="0" u="none" strike="noStrike" kern="1200" cap="none" normalizeH="0" noProof="0" dirty="0">
+                <a:ln>
+                  <a:noFill/>
+                </a:ln>
+                <a:solidFill>
+                  <a:schemeClr val="tx1"/>
+                </a:solidFill>
+                <a:effectLst/>
+                <a:uLnTx/>
+                <a:uFillTx/>
+                <a:latin typeface="+mn-lt"/>
+                <a:ea typeface="+mn-ea"/>
+                <a:cs typeface="Biome Light" panose="020B0303030204020804" pitchFamily="34" charset="0"/>
+              </a:rPr>
+              <a:t>Profits are up in the last quarter by 3%</a:t>
+            </a:r>
+          </a:p>
+          <a:p>
+            <a:pPr marL="0" indent="0">
+              <a:buNone/>
+            </a:pPr>
+            <a:endParaRPr lang="en-US" b="1" dirty="0"/>
+          </a:p>
+        </p:txBody>
+      </p:sp>
+      <p:sp>
+        <p:nvSpPr>
+          <p:cNvPr id="16" name="Slide Number Placeholder 15">
+            <a:extLst>
+              <a:ext uri="{FF2B5EF4-FFF2-40B4-BE49-F238E27FC236}">
+                <a16:creationId xmlns:a16="http://schemas.microsoft.com/office/drawing/2014/main" id="{7FA57D11-A25F-4772-8E50-DDB68BE8CB69}"/>
+              </a:ext>
+            </a:extLst>
+          </p:cNvPr>
+          <p:cNvSpPr>
+            <a:spLocks noGrp="1"/>
+          </p:cNvSpPr>
+          <p:nvPr>
+            <p:ph type="sldNum" sz="quarter" idx="4"/>
+          </p:nvPr>
+        </p:nvSpPr>
+        <p:spPr/>
+        <p:txBody>
+          <a:bodyPr/>
+          <a:lstStyle/>
+          <a:p>
+            <a:fld id="{8C2E478F-E849-4A8C-AF1F-CBCC78A7CBFA}" type="slidenum">
+              <a:rPr lang="en-US" smtClean="0"/>
+              <a:t>14</a:t>
+            </a:fld>
+            <a:endParaRPr lang="en-US" dirty="0"/>
+          </a:p>
+        </p:txBody>
+      </p:sp>
+    </p:spTree>
+    <p:extLst>
+      <p:ext uri="{BB962C8B-B14F-4D97-AF65-F5344CB8AC3E}">
+        <p14:creationId xmlns:p14="http://schemas.microsoft.com/office/powerpoint/2010/main" val="1690341182"/>
+      </p:ext>
+    </p:extLst>
+  </p:cSld>
+  <p:clrMapOvr>
+    <a:masterClrMapping/>
+  </p:clrMapOvr>
+</p:sld>
+</file>
+
+<file path=ppt/slides/slide15.xml><?xml version="1.0" encoding="utf-8"?>
+<p:sld xmlns:a="http://schemas.openxmlformats.org/drawingml/2006/main" xmlns:r="http://schemas.openxmlformats.org/officeDocument/2006/relationships" xmlns:p="http://schemas.openxmlformats.org/presentationml/2006/main">
+  <p:cSld>
+    <p:spTree>
+      <p:nvGrpSpPr>
+        <p:cNvPr id="1" name=""/>
+        <p:cNvGrpSpPr/>
+        <p:nvPr/>
+      </p:nvGrpSpPr>
+      <p:grpSpPr>
+        <a:xfrm>
+          <a:off x="0" y="0"/>
+          <a:ext cx="0" cy="0"/>
+          <a:chOff x="0" y="0"/>
+          <a:chExt cx="0" cy="0"/>
+        </a:xfrm>
+      </p:grpSpPr>
+      <p:sp>
+        <p:nvSpPr>
+          <p:cNvPr id="2" name="Title 1">
+            <a:extLst>
+              <a:ext uri="{FF2B5EF4-FFF2-40B4-BE49-F238E27FC236}">
+                <a16:creationId xmlns:a16="http://schemas.microsoft.com/office/drawing/2014/main" id="{12CC3376-5069-4C7B-BE6B-A3776D1B47BA}"/>
+              </a:ext>
+            </a:extLst>
+          </p:cNvPr>
+          <p:cNvSpPr>
+            <a:spLocks noGrp="1"/>
+          </p:cNvSpPr>
+          <p:nvPr>
+            <p:ph type="title"/>
+          </p:nvPr>
+        </p:nvSpPr>
+        <p:spPr>
+          <a:xfrm>
+            <a:off x="6096000" y="0"/>
+            <a:ext cx="5816368" cy="599012"/>
+          </a:xfrm>
+        </p:spPr>
+        <p:txBody>
+          <a:bodyPr/>
+          <a:lstStyle/>
+          <a:p>
+            <a:r>
+              <a:rPr lang="en-US" u="sng" dirty="0"/>
+              <a:t>High Level Design</a:t>
+            </a:r>
+          </a:p>
+        </p:txBody>
+      </p:sp>
+      <p:pic>
+        <p:nvPicPr>
+          <p:cNvPr id="6" name="Picture Placeholder 5" descr="person staring at blueprints on a brick wall">
+            <a:extLst>
+              <a:ext uri="{FF2B5EF4-FFF2-40B4-BE49-F238E27FC236}">
+                <a16:creationId xmlns:a16="http://schemas.microsoft.com/office/drawing/2014/main" id="{C07C315A-7CD1-432C-92FA-6B62159B56CA}"/>
+              </a:ext>
+            </a:extLst>
+          </p:cNvPr>
+          <p:cNvPicPr>
+            <a:picLocks noGrp="1" noChangeAspect="1"/>
+          </p:cNvPicPr>
+          <p:nvPr>
+            <p:ph type="pic" sz="quarter" idx="14"/>
+          </p:nvPr>
+        </p:nvPicPr>
+        <p:blipFill rotWithShape="1">
+          <a:blip r:embed="rId3">
+            <a:extLst>
+              <a:ext uri="{BEBA8EAE-BF5A-486C-A8C5-ECC9F3942E4B}">
+                <a14:imgProps xmlns:a14="http://schemas.microsoft.com/office/drawing/2010/main">
+                  <a14:imgLayer r:embed="rId4">
+                    <a14:imgEffect>
+                      <a14:saturation sat="0"/>
+                    </a14:imgEffect>
+                  </a14:imgLayer>
+                </a14:imgProps>
+              </a:ext>
+            </a:extLst>
+          </a:blip>
+          <a:srcRect l="23552" t="1" r="23880" b="327"/>
+          <a:stretch/>
+        </p:blipFill>
+        <p:spPr>
+          <a:xfrm>
+            <a:off x="0" y="0"/>
+            <a:ext cx="5416550" cy="6858000"/>
+          </a:xfrm>
+        </p:spPr>
+      </p:pic>
+      <p:sp>
+        <p:nvSpPr>
+          <p:cNvPr id="14" name="Content Placeholder 13">
+            <a:extLst>
+              <a:ext uri="{FF2B5EF4-FFF2-40B4-BE49-F238E27FC236}">
+                <a16:creationId xmlns:a16="http://schemas.microsoft.com/office/drawing/2014/main" id="{79248A72-A597-48DF-A270-3389F5D209C0}"/>
+              </a:ext>
+            </a:extLst>
+          </p:cNvPr>
+          <p:cNvSpPr>
+            <a:spLocks noGrp="1"/>
+          </p:cNvSpPr>
+          <p:nvPr>
+            <p:ph idx="1"/>
+          </p:nvPr>
+        </p:nvSpPr>
+        <p:spPr>
+          <a:xfrm>
+            <a:off x="6096000" y="763398"/>
+            <a:ext cx="5690532" cy="5318620"/>
+          </a:xfrm>
+        </p:spPr>
+        <p:txBody>
+          <a:bodyPr>
+            <a:normAutofit/>
+          </a:bodyPr>
+          <a:lstStyle/>
+          <a:p>
+            <a:pPr marL="0" marR="0" lvl="0" indent="0" defTabSz="914400" rtl="0" eaLnBrk="1" fontAlgn="auto" latinLnBrk="0" hangingPunct="1">
+              <a:lnSpc>
+                <a:spcPct val="100000"/>
+              </a:lnSpc>
+              <a:spcBef>
+                <a:spcPts val="1000"/>
+              </a:spcBef>
+              <a:spcAft>
+                <a:spcPts val="0"/>
+              </a:spcAft>
+              <a:buClrTx/>
+              <a:buSzTx/>
+              <a:buFont typeface="Arial" panose="020B0604020202020204" pitchFamily="34" charset="0"/>
+              <a:buNone/>
+              <a:tabLst/>
+              <a:defRPr/>
+            </a:pPr>
+            <a:r>
+              <a:rPr kumimoji="0" lang="en-US" sz="2000" b="0" i="0" u="sng" strike="noStrike" kern="1200" cap="none" normalizeH="0" noProof="0" dirty="0">
+                <a:ln>
+                  <a:noFill/>
+                </a:ln>
+                <a:solidFill>
+                  <a:schemeClr val="tx1"/>
+                </a:solidFill>
+                <a:effectLst/>
+                <a:uLnTx/>
+                <a:uFillTx/>
+                <a:latin typeface="+mn-lt"/>
+                <a:ea typeface="+mn-ea"/>
+                <a:cs typeface="Biome Light" panose="020B0303030204020804" pitchFamily="34" charset="0"/>
+              </a:rPr>
+              <a:t>Architecture</a:t>
+            </a:r>
+          </a:p>
+          <a:p>
+            <a:pPr marL="0" marR="0" lvl="0" indent="0" defTabSz="914400" rtl="0" eaLnBrk="1" fontAlgn="auto" latinLnBrk="0" hangingPunct="1">
+              <a:lnSpc>
+                <a:spcPct val="100000"/>
+              </a:lnSpc>
+              <a:spcBef>
+                <a:spcPts val="1000"/>
+              </a:spcBef>
+              <a:spcAft>
+                <a:spcPts val="0"/>
+              </a:spcAft>
+              <a:buClrTx/>
+              <a:buSzTx/>
+              <a:buFont typeface="Arial" panose="020B0604020202020204" pitchFamily="34" charset="0"/>
+              <a:buNone/>
+              <a:tabLst/>
+              <a:defRPr/>
+            </a:pPr>
+            <a:r>
+              <a:rPr kumimoji="0" lang="en-US" sz="1600" b="0" i="0" u="none" strike="noStrike" kern="1200" cap="none" normalizeH="0" noProof="0" dirty="0">
+                <a:ln>
+                  <a:noFill/>
+                </a:ln>
+                <a:solidFill>
+                  <a:schemeClr val="tx1"/>
+                </a:solidFill>
+                <a:effectLst/>
+                <a:uLnTx/>
+                <a:uFillTx/>
+                <a:latin typeface="+mn-lt"/>
+                <a:ea typeface="+mn-ea"/>
+                <a:cs typeface="Biome Light" panose="020B0303030204020804" pitchFamily="34" charset="0"/>
+              </a:rPr>
+              <a:t>Event-driven:</a:t>
+            </a:r>
+          </a:p>
+          <a:p>
+            <a:pPr marL="0" marR="0" lvl="0" indent="0" defTabSz="914400" rtl="0" eaLnBrk="1" fontAlgn="auto" latinLnBrk="0" hangingPunct="1">
+              <a:lnSpc>
+                <a:spcPct val="100000"/>
+              </a:lnSpc>
+              <a:spcBef>
+                <a:spcPts val="1000"/>
+              </a:spcBef>
+              <a:spcAft>
+                <a:spcPts val="0"/>
+              </a:spcAft>
+              <a:buClrTx/>
+              <a:buSzTx/>
+              <a:buFont typeface="Arial" panose="020B0604020202020204" pitchFamily="34" charset="0"/>
+              <a:buNone/>
+              <a:tabLst/>
+              <a:defRPr/>
+            </a:pPr>
+            <a:r>
+              <a:rPr kumimoji="0" lang="en-US" sz="1600" b="0" i="0" u="none" strike="noStrike" kern="1200" cap="none" normalizeH="0" noProof="0" dirty="0">
+                <a:ln>
+                  <a:noFill/>
+                </a:ln>
+                <a:solidFill>
+                  <a:schemeClr val="tx1"/>
+                </a:solidFill>
+                <a:effectLst/>
+                <a:uLnTx/>
+                <a:uFillTx/>
+                <a:latin typeface="+mn-lt"/>
+                <a:ea typeface="+mn-ea"/>
+                <a:cs typeface="Biome Light" panose="020B0303030204020804" pitchFamily="34" charset="0"/>
+              </a:rPr>
+              <a:t>    CentRes will utilize time stamps for orders in and </a:t>
+            </a:r>
+            <a:r>
+              <a:rPr lang="en-US" dirty="0">
+                <a:cs typeface="Biome Light" panose="020B0303030204020804" pitchFamily="34" charset="0"/>
+              </a:rPr>
+              <a:t>orders out. </a:t>
+            </a:r>
+          </a:p>
+          <a:p>
+            <a:pPr marL="0" marR="0" lvl="0" indent="0" defTabSz="914400" rtl="0" eaLnBrk="1" fontAlgn="auto" latinLnBrk="0" hangingPunct="1">
+              <a:lnSpc>
+                <a:spcPct val="100000"/>
+              </a:lnSpc>
+              <a:spcBef>
+                <a:spcPts val="1000"/>
+              </a:spcBef>
+              <a:spcAft>
+                <a:spcPts val="0"/>
+              </a:spcAft>
+              <a:buClrTx/>
+              <a:buSzTx/>
+              <a:buFont typeface="Arial" panose="020B0604020202020204" pitchFamily="34" charset="0"/>
+              <a:buNone/>
+              <a:tabLst/>
+              <a:defRPr/>
+            </a:pPr>
+            <a:endParaRPr lang="en-US" dirty="0">
+              <a:cs typeface="Biome Light" panose="020B0303030204020804" pitchFamily="34" charset="0"/>
+            </a:endParaRPr>
+          </a:p>
+          <a:p>
+            <a:pPr marL="0" marR="0" lvl="0" indent="0" defTabSz="914400" rtl="0" eaLnBrk="1" fontAlgn="auto" latinLnBrk="0" hangingPunct="1">
+              <a:lnSpc>
+                <a:spcPct val="100000"/>
+              </a:lnSpc>
+              <a:spcBef>
+                <a:spcPts val="1000"/>
+              </a:spcBef>
+              <a:spcAft>
+                <a:spcPts val="0"/>
+              </a:spcAft>
+              <a:buClrTx/>
+              <a:buSzTx/>
+              <a:buFont typeface="Arial" panose="020B0604020202020204" pitchFamily="34" charset="0"/>
+              <a:buNone/>
+              <a:tabLst/>
+              <a:defRPr/>
+            </a:pPr>
+            <a:r>
+              <a:rPr kumimoji="0" lang="en-US" sz="1600" b="0" i="0" u="none" strike="noStrike" kern="1200" cap="none" normalizeH="0" noProof="0" dirty="0">
+                <a:ln>
+                  <a:noFill/>
+                </a:ln>
+                <a:solidFill>
+                  <a:schemeClr val="tx1"/>
+                </a:solidFill>
+                <a:effectLst/>
+                <a:uLnTx/>
+                <a:uFillTx/>
+                <a:latin typeface="+mn-lt"/>
+                <a:ea typeface="+mn-ea"/>
+                <a:cs typeface="Biome Light" panose="020B0303030204020804" pitchFamily="34" charset="0"/>
+              </a:rPr>
+              <a:t>Data-centric:</a:t>
+            </a:r>
+          </a:p>
+          <a:p>
+            <a:pPr marL="0" marR="0" lvl="0" indent="0" defTabSz="914400" rtl="0" eaLnBrk="1" fontAlgn="auto" latinLnBrk="0" hangingPunct="1">
+              <a:lnSpc>
+                <a:spcPct val="100000"/>
+              </a:lnSpc>
+              <a:spcBef>
+                <a:spcPts val="1000"/>
+              </a:spcBef>
+              <a:spcAft>
+                <a:spcPts val="0"/>
+              </a:spcAft>
+              <a:buClrTx/>
+              <a:buSzTx/>
+              <a:buFont typeface="Arial" panose="020B0604020202020204" pitchFamily="34" charset="0"/>
+              <a:buNone/>
+              <a:tabLst/>
+              <a:defRPr/>
+            </a:pPr>
+            <a:r>
+              <a:rPr lang="en-US" dirty="0">
+                <a:cs typeface="Biome Light" panose="020B0303030204020804" pitchFamily="34" charset="0"/>
+              </a:rPr>
+              <a:t>    Utilizes a database to track menu items, prices and inventory</a:t>
+            </a:r>
+            <a:endParaRPr kumimoji="0" lang="en-US" sz="1600" b="0" i="0" u="none" strike="noStrike" kern="1200" cap="none" normalizeH="0" noProof="0" dirty="0">
+              <a:ln>
+                <a:noFill/>
+              </a:ln>
+              <a:solidFill>
+                <a:schemeClr val="tx1"/>
+              </a:solidFill>
+              <a:effectLst/>
+              <a:uLnTx/>
+              <a:uFillTx/>
+              <a:latin typeface="+mn-lt"/>
+              <a:ea typeface="+mn-ea"/>
+              <a:cs typeface="Biome Light" panose="020B0303030204020804" pitchFamily="34" charset="0"/>
+            </a:endParaRPr>
+          </a:p>
+          <a:p>
+            <a:pPr marL="0" marR="0" lvl="0" indent="0" defTabSz="914400" rtl="0" eaLnBrk="1" fontAlgn="auto" latinLnBrk="0" hangingPunct="1">
               <a:lnSpc>
                 <a:spcPct val="100000"/>
               </a:lnSpc>
@@ -6724,174 +7491,7 @@
             </a:endParaRPr>
           </a:p>
           <a:p>
-            <a:pPr marL="0" indent="0">
-              <a:buNone/>
-            </a:pPr>
-            <a:endParaRPr lang="en-US" b="1" dirty="0"/>
-          </a:p>
-        </p:txBody>
-      </p:sp>
-      <p:sp>
-        <p:nvSpPr>
-          <p:cNvPr id="16" name="Slide Number Placeholder 15">
-            <a:extLst>
-              <a:ext uri="{FF2B5EF4-FFF2-40B4-BE49-F238E27FC236}">
-                <a16:creationId xmlns:a16="http://schemas.microsoft.com/office/drawing/2014/main" id="{7FA57D11-A25F-4772-8E50-DDB68BE8CB69}"/>
-              </a:ext>
-            </a:extLst>
-          </p:cNvPr>
-          <p:cNvSpPr>
-            <a:spLocks noGrp="1"/>
-          </p:cNvSpPr>
-          <p:nvPr>
-            <p:ph type="sldNum" sz="quarter" idx="4"/>
-          </p:nvPr>
-        </p:nvSpPr>
-        <p:spPr/>
-        <p:txBody>
-          <a:bodyPr/>
-          <a:lstStyle/>
-          <a:p>
-            <a:fld id="{8C2E478F-E849-4A8C-AF1F-CBCC78A7CBFA}" type="slidenum">
-              <a:rPr lang="en-US" smtClean="0"/>
-              <a:t>13</a:t>
-            </a:fld>
-            <a:endParaRPr lang="en-US" dirty="0"/>
-          </a:p>
-        </p:txBody>
-      </p:sp>
-    </p:spTree>
-    <p:extLst>
-      <p:ext uri="{BB962C8B-B14F-4D97-AF65-F5344CB8AC3E}">
-        <p14:creationId xmlns:p14="http://schemas.microsoft.com/office/powerpoint/2010/main" val="3516891798"/>
-      </p:ext>
-    </p:extLst>
-  </p:cSld>
-  <p:clrMapOvr>
-    <a:masterClrMapping/>
-  </p:clrMapOvr>
-</p:sld>
-</file>
-
-<file path=ppt/slides/slide14.xml><?xml version="1.0" encoding="utf-8"?>
-<p:sld xmlns:a="http://schemas.openxmlformats.org/drawingml/2006/main" xmlns:r="http://schemas.openxmlformats.org/officeDocument/2006/relationships" xmlns:p="http://schemas.openxmlformats.org/presentationml/2006/main">
-  <p:cSld>
-    <p:spTree>
-      <p:nvGrpSpPr>
-        <p:cNvPr id="1" name=""/>
-        <p:cNvGrpSpPr/>
-        <p:nvPr/>
-      </p:nvGrpSpPr>
-      <p:grpSpPr>
-        <a:xfrm>
-          <a:off x="0" y="0"/>
-          <a:ext cx="0" cy="0"/>
-          <a:chOff x="0" y="0"/>
-          <a:chExt cx="0" cy="0"/>
-        </a:xfrm>
-      </p:grpSpPr>
-      <p:sp>
-        <p:nvSpPr>
-          <p:cNvPr id="2" name="Title 1">
-            <a:extLst>
-              <a:ext uri="{FF2B5EF4-FFF2-40B4-BE49-F238E27FC236}">
-                <a16:creationId xmlns:a16="http://schemas.microsoft.com/office/drawing/2014/main" id="{12CC3376-5069-4C7B-BE6B-A3776D1B47BA}"/>
-              </a:ext>
-            </a:extLst>
-          </p:cNvPr>
-          <p:cNvSpPr>
-            <a:spLocks noGrp="1"/>
-          </p:cNvSpPr>
-          <p:nvPr>
-            <p:ph type="title"/>
-          </p:nvPr>
-        </p:nvSpPr>
-        <p:spPr>
-          <a:xfrm>
-            <a:off x="6095999" y="35082"/>
-            <a:ext cx="5897218" cy="884238"/>
-          </a:xfrm>
-        </p:spPr>
-        <p:txBody>
-          <a:bodyPr/>
-          <a:lstStyle/>
-          <a:p>
-            <a:r>
-              <a:rPr lang="en-US" dirty="0"/>
-              <a:t>High Level Design</a:t>
-            </a:r>
-          </a:p>
-        </p:txBody>
-      </p:sp>
-      <p:pic>
-        <p:nvPicPr>
-          <p:cNvPr id="6" name="Picture Placeholder 5" descr="person staring at blueprints on a brick wall">
-            <a:extLst>
-              <a:ext uri="{FF2B5EF4-FFF2-40B4-BE49-F238E27FC236}">
-                <a16:creationId xmlns:a16="http://schemas.microsoft.com/office/drawing/2014/main" id="{C07C315A-7CD1-432C-92FA-6B62159B56CA}"/>
-              </a:ext>
-            </a:extLst>
-          </p:cNvPr>
-          <p:cNvPicPr>
-            <a:picLocks noGrp="1" noChangeAspect="1"/>
-          </p:cNvPicPr>
-          <p:nvPr>
-            <p:ph type="pic" sz="quarter" idx="14"/>
-          </p:nvPr>
-        </p:nvPicPr>
-        <p:blipFill rotWithShape="1">
-          <a:blip r:embed="rId3">
-            <a:extLst>
-              <a:ext uri="{BEBA8EAE-BF5A-486C-A8C5-ECC9F3942E4B}">
-                <a14:imgProps xmlns:a14="http://schemas.microsoft.com/office/drawing/2010/main">
-                  <a14:imgLayer r:embed="rId4">
-                    <a14:imgEffect>
-                      <a14:saturation sat="0"/>
-                    </a14:imgEffect>
-                  </a14:imgLayer>
-                </a14:imgProps>
-              </a:ext>
-            </a:extLst>
-          </a:blip>
-          <a:srcRect l="23552" t="1" r="23880" b="327"/>
-          <a:stretch/>
-        </p:blipFill>
-        <p:spPr>
-          <a:xfrm>
-            <a:off x="0" y="0"/>
-            <a:ext cx="5416550" cy="6858000"/>
-          </a:xfrm>
-        </p:spPr>
-      </p:pic>
-      <p:sp>
-        <p:nvSpPr>
-          <p:cNvPr id="14" name="Content Placeholder 13">
-            <a:extLst>
-              <a:ext uri="{FF2B5EF4-FFF2-40B4-BE49-F238E27FC236}">
-                <a16:creationId xmlns:a16="http://schemas.microsoft.com/office/drawing/2014/main" id="{79248A72-A597-48DF-A270-3389F5D209C0}"/>
-              </a:ext>
-            </a:extLst>
-          </p:cNvPr>
-          <p:cNvSpPr>
-            <a:spLocks noGrp="1"/>
-          </p:cNvSpPr>
-          <p:nvPr>
-            <p:ph idx="1"/>
-          </p:nvPr>
-        </p:nvSpPr>
-        <p:spPr>
-          <a:xfrm>
-            <a:off x="6096000" y="919320"/>
-            <a:ext cx="5690532" cy="4949971"/>
-          </a:xfrm>
-        </p:spPr>
-        <p:txBody>
-          <a:bodyPr>
-            <a:normAutofit/>
-          </a:bodyPr>
-          <a:lstStyle/>
-          <a:p>
-            <a:pPr marL="0" marR="0" lvl="0" indent="0" algn="l" defTabSz="914400" rtl="0" eaLnBrk="1" fontAlgn="auto" latinLnBrk="0" hangingPunct="1">
+            <a:pPr marL="0" marR="0" lvl="0" indent="0" defTabSz="914400" rtl="0" eaLnBrk="1" fontAlgn="auto" latinLnBrk="0" hangingPunct="1">
               <a:lnSpc>
                 <a:spcPct val="100000"/>
               </a:lnSpc>
@@ -6923,465 +7523,11 @@
                 <a:ea typeface="+mn-ea"/>
                 <a:cs typeface="Biome Light" panose="020B0303030204020804" pitchFamily="34" charset="0"/>
               </a:rPr>
-              <a:t>User Interface</a:t>
-            </a:r>
-          </a:p>
-          <a:p>
-            <a:pPr marL="0" marR="0" lvl="0" indent="0" algn="l" defTabSz="914400" rtl="0" eaLnBrk="1" fontAlgn="auto" latinLnBrk="0" hangingPunct="1">
-              <a:lnSpc>
-                <a:spcPct val="100000"/>
-              </a:lnSpc>
-              <a:spcBef>
-                <a:spcPts val="1000"/>
-              </a:spcBef>
-              <a:spcAft>
-                <a:spcPts val="0"/>
-              </a:spcAft>
-              <a:buClrTx/>
-              <a:buSzTx/>
-              <a:buFont typeface="Arial" panose="020B0604020202020204" pitchFamily="34" charset="0"/>
-              <a:buNone/>
-              <a:tabLst/>
-              <a:defRPr/>
-            </a:pPr>
-            <a:r>
-              <a:rPr kumimoji="0" lang="en-US" sz="1600" b="0" i="0" u="none" strike="noStrike" kern="1200" cap="none" normalizeH="0" noProof="0" dirty="0">
-                <a:ln>
-                  <a:noFill/>
-                </a:ln>
-                <a:solidFill>
-                  <a:schemeClr val="tx1"/>
-                </a:solidFill>
-                <a:effectLst/>
-                <a:uLnTx/>
-                <a:uFillTx/>
-                <a:latin typeface="+mn-lt"/>
-                <a:ea typeface="+mn-ea"/>
-                <a:cs typeface="Biome Light" panose="020B0303030204020804" pitchFamily="34" charset="0"/>
-              </a:rPr>
-              <a:t>Profits are up in the last quarter by 3%</a:t>
-            </a:r>
-          </a:p>
-          <a:p>
-            <a:pPr marL="0" indent="0">
-              <a:buNone/>
-            </a:pPr>
-            <a:endParaRPr lang="en-US" b="1" dirty="0"/>
-          </a:p>
-        </p:txBody>
-      </p:sp>
-      <p:sp>
-        <p:nvSpPr>
-          <p:cNvPr id="16" name="Slide Number Placeholder 15">
-            <a:extLst>
-              <a:ext uri="{FF2B5EF4-FFF2-40B4-BE49-F238E27FC236}">
-                <a16:creationId xmlns:a16="http://schemas.microsoft.com/office/drawing/2014/main" id="{7FA57D11-A25F-4772-8E50-DDB68BE8CB69}"/>
-              </a:ext>
-            </a:extLst>
-          </p:cNvPr>
-          <p:cNvSpPr>
-            <a:spLocks noGrp="1"/>
-          </p:cNvSpPr>
-          <p:nvPr>
-            <p:ph type="sldNum" sz="quarter" idx="4"/>
-          </p:nvPr>
-        </p:nvSpPr>
-        <p:spPr/>
-        <p:txBody>
-          <a:bodyPr/>
-          <a:lstStyle/>
-          <a:p>
-            <a:fld id="{8C2E478F-E849-4A8C-AF1F-CBCC78A7CBFA}" type="slidenum">
-              <a:rPr lang="en-US" smtClean="0"/>
-              <a:t>14</a:t>
-            </a:fld>
-            <a:endParaRPr lang="en-US" dirty="0"/>
-          </a:p>
-        </p:txBody>
-      </p:sp>
-    </p:spTree>
-    <p:extLst>
-      <p:ext uri="{BB962C8B-B14F-4D97-AF65-F5344CB8AC3E}">
-        <p14:creationId xmlns:p14="http://schemas.microsoft.com/office/powerpoint/2010/main" val="1690341182"/>
-      </p:ext>
-    </p:extLst>
-  </p:cSld>
-  <p:clrMapOvr>
-    <a:masterClrMapping/>
-  </p:clrMapOvr>
-</p:sld>
-</file>
-
-<file path=ppt/slides/slide15.xml><?xml version="1.0" encoding="utf-8"?>
-<p:sld xmlns:a="http://schemas.openxmlformats.org/drawingml/2006/main" xmlns:r="http://schemas.openxmlformats.org/officeDocument/2006/relationships" xmlns:p="http://schemas.openxmlformats.org/presentationml/2006/main">
-  <p:cSld>
-    <p:spTree>
-      <p:nvGrpSpPr>
-        <p:cNvPr id="1" name=""/>
-        <p:cNvGrpSpPr/>
-        <p:nvPr/>
-      </p:nvGrpSpPr>
-      <p:grpSpPr>
-        <a:xfrm>
-          <a:off x="0" y="0"/>
-          <a:ext cx="0" cy="0"/>
-          <a:chOff x="0" y="0"/>
-          <a:chExt cx="0" cy="0"/>
-        </a:xfrm>
-      </p:grpSpPr>
-      <p:sp>
-        <p:nvSpPr>
-          <p:cNvPr id="2" name="Title 1">
-            <a:extLst>
-              <a:ext uri="{FF2B5EF4-FFF2-40B4-BE49-F238E27FC236}">
-                <a16:creationId xmlns:a16="http://schemas.microsoft.com/office/drawing/2014/main" id="{12CC3376-5069-4C7B-BE6B-A3776D1B47BA}"/>
-              </a:ext>
-            </a:extLst>
-          </p:cNvPr>
-          <p:cNvSpPr>
-            <a:spLocks noGrp="1"/>
-          </p:cNvSpPr>
-          <p:nvPr>
-            <p:ph type="title"/>
-          </p:nvPr>
-        </p:nvSpPr>
-        <p:spPr>
-          <a:xfrm>
-            <a:off x="6095999" y="35082"/>
-            <a:ext cx="5897218" cy="884238"/>
-          </a:xfrm>
-        </p:spPr>
-        <p:txBody>
-          <a:bodyPr/>
-          <a:lstStyle/>
-          <a:p>
-            <a:r>
-              <a:rPr lang="en-US" dirty="0"/>
-              <a:t>High Level Design</a:t>
-            </a:r>
-          </a:p>
-        </p:txBody>
-      </p:sp>
-      <p:pic>
-        <p:nvPicPr>
-          <p:cNvPr id="6" name="Picture Placeholder 5" descr="person staring at blueprints on a brick wall">
-            <a:extLst>
-              <a:ext uri="{FF2B5EF4-FFF2-40B4-BE49-F238E27FC236}">
-                <a16:creationId xmlns:a16="http://schemas.microsoft.com/office/drawing/2014/main" id="{C07C315A-7CD1-432C-92FA-6B62159B56CA}"/>
-              </a:ext>
-            </a:extLst>
-          </p:cNvPr>
-          <p:cNvPicPr>
-            <a:picLocks noGrp="1" noChangeAspect="1"/>
-          </p:cNvPicPr>
-          <p:nvPr>
-            <p:ph type="pic" sz="quarter" idx="14"/>
-          </p:nvPr>
-        </p:nvPicPr>
-        <p:blipFill rotWithShape="1">
-          <a:blip r:embed="rId3">
-            <a:extLst>
-              <a:ext uri="{BEBA8EAE-BF5A-486C-A8C5-ECC9F3942E4B}">
-                <a14:imgProps xmlns:a14="http://schemas.microsoft.com/office/drawing/2010/main">
-                  <a14:imgLayer r:embed="rId4">
-                    <a14:imgEffect>
-                      <a14:saturation sat="0"/>
-                    </a14:imgEffect>
-                  </a14:imgLayer>
-                </a14:imgProps>
-              </a:ext>
-            </a:extLst>
-          </a:blip>
-          <a:srcRect l="23552" t="1" r="23880" b="327"/>
-          <a:stretch/>
-        </p:blipFill>
-        <p:spPr>
-          <a:xfrm>
-            <a:off x="0" y="0"/>
-            <a:ext cx="5416550" cy="6858000"/>
-          </a:xfrm>
-        </p:spPr>
-      </p:pic>
-      <p:sp>
-        <p:nvSpPr>
-          <p:cNvPr id="14" name="Content Placeholder 13">
-            <a:extLst>
-              <a:ext uri="{FF2B5EF4-FFF2-40B4-BE49-F238E27FC236}">
-                <a16:creationId xmlns:a16="http://schemas.microsoft.com/office/drawing/2014/main" id="{79248A72-A597-48DF-A270-3389F5D209C0}"/>
-              </a:ext>
-            </a:extLst>
-          </p:cNvPr>
-          <p:cNvSpPr>
-            <a:spLocks noGrp="1"/>
-          </p:cNvSpPr>
-          <p:nvPr>
-            <p:ph idx="1"/>
-          </p:nvPr>
-        </p:nvSpPr>
-        <p:spPr>
-          <a:xfrm>
-            <a:off x="6096000" y="919320"/>
-            <a:ext cx="5690532" cy="4949971"/>
-          </a:xfrm>
-        </p:spPr>
-        <p:txBody>
-          <a:bodyPr>
-            <a:normAutofit/>
-          </a:bodyPr>
-          <a:lstStyle/>
-          <a:p>
-            <a:pPr marL="0" marR="0" lvl="0" indent="0" algn="l" defTabSz="914400" rtl="0" eaLnBrk="1" fontAlgn="auto" latinLnBrk="0" hangingPunct="1">
-              <a:lnSpc>
-                <a:spcPct val="100000"/>
-              </a:lnSpc>
-              <a:spcBef>
-                <a:spcPts val="1000"/>
-              </a:spcBef>
-              <a:spcAft>
-                <a:spcPts val="0"/>
-              </a:spcAft>
-              <a:buClrTx/>
-              <a:buSzTx/>
-              <a:buFont typeface="Arial" panose="020B0604020202020204" pitchFamily="34" charset="0"/>
-              <a:buNone/>
-              <a:tabLst/>
-              <a:defRPr/>
-            </a:pPr>
-            <a:r>
-              <a:rPr kumimoji="0" lang="en-US" sz="2000" b="0" i="0" u="none" strike="noStrike" kern="1200" cap="none" normalizeH="0" noProof="0" dirty="0">
-                <a:ln>
-                  <a:noFill/>
-                </a:ln>
-                <a:solidFill>
-                  <a:schemeClr val="tx1"/>
-                </a:solidFill>
-                <a:effectLst/>
-                <a:uLnTx/>
-                <a:uFillTx/>
-                <a:latin typeface="+mn-lt"/>
-                <a:ea typeface="+mn-ea"/>
-                <a:cs typeface="Biome Light" panose="020B0303030204020804" pitchFamily="34" charset="0"/>
-              </a:rPr>
-              <a:t>Architecture</a:t>
-            </a:r>
-          </a:p>
-          <a:p>
-            <a:pPr marL="0" marR="0" lvl="0" indent="0" algn="l" defTabSz="914400" rtl="0" eaLnBrk="1" fontAlgn="auto" latinLnBrk="0" hangingPunct="1">
-              <a:lnSpc>
-                <a:spcPct val="100000"/>
-              </a:lnSpc>
-              <a:spcBef>
-                <a:spcPts val="1000"/>
-              </a:spcBef>
-              <a:spcAft>
-                <a:spcPts val="0"/>
-              </a:spcAft>
-              <a:buClrTx/>
-              <a:buSzTx/>
-              <a:buFont typeface="Arial" panose="020B0604020202020204" pitchFamily="34" charset="0"/>
-              <a:buNone/>
-              <a:tabLst/>
-              <a:defRPr/>
-            </a:pPr>
-            <a:r>
-              <a:rPr kumimoji="0" lang="en-US" sz="1600" b="0" i="0" u="none" strike="noStrike" kern="1200" cap="none" normalizeH="0" noProof="0" dirty="0">
-                <a:ln>
-                  <a:noFill/>
-                </a:ln>
-                <a:solidFill>
-                  <a:schemeClr val="tx1"/>
-                </a:solidFill>
-                <a:effectLst/>
-                <a:uLnTx/>
-                <a:uFillTx/>
-                <a:latin typeface="+mn-lt"/>
-                <a:ea typeface="+mn-ea"/>
-                <a:cs typeface="Biome Light" panose="020B0303030204020804" pitchFamily="34" charset="0"/>
-              </a:rPr>
-              <a:t>Profits are up in the last quarter by 3%</a:t>
-            </a:r>
-          </a:p>
-          <a:p>
-            <a:pPr marL="0" marR="0" lvl="0" indent="0" algn="l" defTabSz="914400" rtl="0" eaLnBrk="1" fontAlgn="auto" latinLnBrk="0" hangingPunct="1">
-              <a:lnSpc>
-                <a:spcPct val="100000"/>
-              </a:lnSpc>
-              <a:spcBef>
-                <a:spcPts val="1000"/>
-              </a:spcBef>
-              <a:spcAft>
-                <a:spcPts val="0"/>
-              </a:spcAft>
-              <a:buClrTx/>
-              <a:buSzTx/>
-              <a:buFont typeface="Arial" panose="020B0604020202020204" pitchFamily="34" charset="0"/>
-              <a:buNone/>
-              <a:tabLst/>
-              <a:defRPr/>
-            </a:pPr>
-            <a:endParaRPr kumimoji="0" lang="en-US" sz="1600" b="0" i="0" u="none" strike="noStrike" kern="1200" cap="none" normalizeH="0" noProof="0" dirty="0">
-              <a:ln>
-                <a:noFill/>
-              </a:ln>
-              <a:solidFill>
-                <a:schemeClr val="tx1"/>
-              </a:solidFill>
-              <a:effectLst/>
-              <a:uLnTx/>
-              <a:uFillTx/>
-              <a:latin typeface="+mn-lt"/>
-              <a:ea typeface="+mn-ea"/>
-              <a:cs typeface="Biome Light" panose="020B0303030204020804" pitchFamily="34" charset="0"/>
-            </a:endParaRPr>
-          </a:p>
-          <a:p>
-            <a:pPr marL="0" marR="0" lvl="0" indent="0" algn="l" defTabSz="914400" rtl="0" eaLnBrk="1" fontAlgn="auto" latinLnBrk="0" hangingPunct="1">
-              <a:lnSpc>
-                <a:spcPct val="100000"/>
-              </a:lnSpc>
-              <a:spcBef>
-                <a:spcPts val="1000"/>
-              </a:spcBef>
-              <a:spcAft>
-                <a:spcPts val="0"/>
-              </a:spcAft>
-              <a:buClrTx/>
-              <a:buSzTx/>
-              <a:buFont typeface="Arial" panose="020B0604020202020204" pitchFamily="34" charset="0"/>
-              <a:buNone/>
-              <a:tabLst/>
-              <a:defRPr/>
-            </a:pPr>
-            <a:endParaRPr kumimoji="0" lang="en-US" sz="1600" b="0" i="0" u="none" strike="noStrike" kern="1200" cap="none" normalizeH="0" noProof="0" dirty="0">
-              <a:ln>
-                <a:noFill/>
-              </a:ln>
-              <a:solidFill>
-                <a:schemeClr val="tx1"/>
-              </a:solidFill>
-              <a:effectLst/>
-              <a:uLnTx/>
-              <a:uFillTx/>
-              <a:latin typeface="+mn-lt"/>
-              <a:ea typeface="+mn-ea"/>
-              <a:cs typeface="Biome Light" panose="020B0303030204020804" pitchFamily="34" charset="0"/>
-            </a:endParaRPr>
-          </a:p>
-          <a:p>
-            <a:pPr marL="0" marR="0" lvl="0" indent="0" algn="l" defTabSz="914400" rtl="0" eaLnBrk="1" fontAlgn="auto" latinLnBrk="0" hangingPunct="1">
-              <a:lnSpc>
-                <a:spcPct val="100000"/>
-              </a:lnSpc>
-              <a:spcBef>
-                <a:spcPts val="1000"/>
-              </a:spcBef>
-              <a:spcAft>
-                <a:spcPts val="0"/>
-              </a:spcAft>
-              <a:buClrTx/>
-              <a:buSzTx/>
-              <a:buFont typeface="Arial" panose="020B0604020202020204" pitchFamily="34" charset="0"/>
-              <a:buNone/>
-              <a:tabLst/>
-              <a:defRPr/>
-            </a:pPr>
-            <a:endParaRPr lang="en-US" dirty="0">
-              <a:cs typeface="Biome Light" panose="020B0303030204020804" pitchFamily="34" charset="0"/>
-            </a:endParaRPr>
-          </a:p>
-          <a:p>
-            <a:pPr marL="0" marR="0" lvl="0" indent="0" algn="l" defTabSz="914400" rtl="0" eaLnBrk="1" fontAlgn="auto" latinLnBrk="0" hangingPunct="1">
-              <a:lnSpc>
-                <a:spcPct val="100000"/>
-              </a:lnSpc>
-              <a:spcBef>
-                <a:spcPts val="1000"/>
-              </a:spcBef>
-              <a:spcAft>
-                <a:spcPts val="0"/>
-              </a:spcAft>
-              <a:buClrTx/>
-              <a:buSzTx/>
-              <a:buFont typeface="Arial" panose="020B0604020202020204" pitchFamily="34" charset="0"/>
-              <a:buNone/>
-              <a:tabLst/>
-              <a:defRPr/>
-            </a:pPr>
-            <a:endParaRPr lang="en-US" dirty="0">
-              <a:cs typeface="Biome Light" panose="020B0303030204020804" pitchFamily="34" charset="0"/>
-            </a:endParaRPr>
-          </a:p>
-          <a:p>
-            <a:pPr marL="0" marR="0" lvl="0" indent="0" algn="l" defTabSz="914400" rtl="0" eaLnBrk="1" fontAlgn="auto" latinLnBrk="0" hangingPunct="1">
-              <a:lnSpc>
-                <a:spcPct val="100000"/>
-              </a:lnSpc>
-              <a:spcBef>
-                <a:spcPts val="1000"/>
-              </a:spcBef>
-              <a:spcAft>
-                <a:spcPts val="0"/>
-              </a:spcAft>
-              <a:buClrTx/>
-              <a:buSzTx/>
-              <a:buFont typeface="Arial" panose="020B0604020202020204" pitchFamily="34" charset="0"/>
-              <a:buNone/>
-              <a:tabLst/>
-              <a:defRPr/>
-            </a:pPr>
-            <a:endParaRPr kumimoji="0" lang="en-US" sz="1600" b="0" i="0" u="none" strike="noStrike" kern="1200" cap="none" normalizeH="0" noProof="0" dirty="0">
-              <a:ln>
-                <a:noFill/>
-              </a:ln>
-              <a:solidFill>
-                <a:schemeClr val="tx1"/>
-              </a:solidFill>
-              <a:effectLst/>
-              <a:uLnTx/>
-              <a:uFillTx/>
-              <a:latin typeface="+mn-lt"/>
-              <a:ea typeface="+mn-ea"/>
-              <a:cs typeface="Biome Light" panose="020B0303030204020804" pitchFamily="34" charset="0"/>
-            </a:endParaRPr>
-          </a:p>
-          <a:p>
-            <a:pPr marL="0" marR="0" lvl="0" indent="0" algn="l" defTabSz="914400" rtl="0" eaLnBrk="1" fontAlgn="auto" latinLnBrk="0" hangingPunct="1">
-              <a:lnSpc>
-                <a:spcPct val="100000"/>
-              </a:lnSpc>
-              <a:spcBef>
-                <a:spcPts val="1000"/>
-              </a:spcBef>
-              <a:spcAft>
-                <a:spcPts val="0"/>
-              </a:spcAft>
-              <a:buClrTx/>
-              <a:buSzTx/>
-              <a:buFont typeface="Arial" panose="020B0604020202020204" pitchFamily="34" charset="0"/>
-              <a:buNone/>
-              <a:tabLst/>
-              <a:defRPr/>
-            </a:pPr>
-            <a:r>
-              <a:rPr kumimoji="0" lang="en-US" sz="2000" b="0" i="0" u="none" strike="noStrike" kern="1200" cap="none" normalizeH="0" noProof="0" dirty="0">
-                <a:ln>
-                  <a:noFill/>
-                </a:ln>
-                <a:solidFill>
-                  <a:schemeClr val="tx1"/>
-                </a:solidFill>
-                <a:effectLst/>
-                <a:uLnTx/>
-                <a:uFillTx/>
-                <a:latin typeface="+mn-lt"/>
-                <a:ea typeface="+mn-ea"/>
-                <a:cs typeface="Biome Light" panose="020B0303030204020804" pitchFamily="34" charset="0"/>
-              </a:rPr>
               <a:t>Database</a:t>
             </a:r>
           </a:p>
           <a:p>
-            <a:pPr marL="0" marR="0" lvl="0" indent="0" algn="l" defTabSz="914400" rtl="0" eaLnBrk="1" fontAlgn="auto" latinLnBrk="0" hangingPunct="1">
+            <a:pPr marL="0" marR="0" lvl="0" indent="0" defTabSz="914400" rtl="0" eaLnBrk="1" fontAlgn="auto" latinLnBrk="0" hangingPunct="1">
               <a:lnSpc>
                 <a:spcPct val="100000"/>
               </a:lnSpc>
@@ -9300,40 +9446,6 @@
           <a:chExt cx="0" cy="0"/>
         </a:xfrm>
       </p:grpSpPr>
-      <p:sp>
-        <p:nvSpPr>
-          <p:cNvPr id="8" name="Title 7">
-            <a:extLst>
-              <a:ext uri="{FF2B5EF4-FFF2-40B4-BE49-F238E27FC236}">
-                <a16:creationId xmlns:a16="http://schemas.microsoft.com/office/drawing/2014/main" id="{103950CF-5BF2-4FB0-A36C-48C194F39E12}"/>
-              </a:ext>
-            </a:extLst>
-          </p:cNvPr>
-          <p:cNvSpPr>
-            <a:spLocks noGrp="1"/>
-          </p:cNvSpPr>
-          <p:nvPr>
-            <p:ph type="title"/>
-          </p:nvPr>
-        </p:nvSpPr>
-        <p:spPr>
-          <a:xfrm>
-            <a:off x="6096000" y="144089"/>
-            <a:ext cx="5897218" cy="753220"/>
-          </a:xfrm>
-        </p:spPr>
-        <p:txBody>
-          <a:bodyPr/>
-          <a:lstStyle/>
-          <a:p>
-            <a:pPr algn="ctr"/>
-            <a:r>
-              <a:rPr lang="en-US" sz="2800" dirty="0"/>
-              <a:t>Project Overview</a:t>
-            </a:r>
-          </a:p>
-        </p:txBody>
-      </p:sp>
       <p:pic>
         <p:nvPicPr>
           <p:cNvPr id="5" name="Picture Placeholder 4" descr="table with various people working on their laptops">
@@ -9392,7 +9504,7 @@
         </p:nvSpPr>
         <p:spPr>
           <a:xfrm>
-            <a:off x="6336334" y="1681983"/>
+            <a:off x="6336334" y="1552549"/>
             <a:ext cx="5416550" cy="4557919"/>
           </a:xfrm>
         </p:spPr>
@@ -9405,10 +9517,7 @@
             <a:pPr marL="0" indent="0">
               <a:buNone/>
             </a:pPr>
-            <a:r>
-              <a:rPr lang="en-US" dirty="0"/>
-              <a:t>CentRes is a software for small restaurant owners that helps their employees streamline the order process and manage tables easily. The main goal of CentRes is restaurant centralization. </a:t>
-            </a:r>
+            <a:endParaRPr lang="en-US" dirty="0"/>
           </a:p>
           <a:p>
             <a:pPr marL="0" indent="0">
@@ -9416,7 +9525,22 @@
             </a:pPr>
             <a:r>
               <a:rPr lang="en-US" dirty="0"/>
-              <a:t>Servers will have an easy-to-read display that keeps track of things such as menu items, prices, order times and order status. Chefs will have access to real time order data and will have the ability to provide status updates to servers. Hosts can manage the restaurant flow via table assignments and can view server availability. Managers have the ability to update the menu, edit orders, alter the bill, view wait times and more!</a:t>
+              <a:t>CentRes is a software for small restaurant owners that helps their employees streamline the order process and manage tables easily. The main goal of CentRes is restaurant centralization. </a:t>
+            </a:r>
+          </a:p>
+          <a:p>
+            <a:pPr marL="0" indent="0">
+              <a:buNone/>
+            </a:pPr>
+            <a:endParaRPr lang="en-US" dirty="0"/>
+          </a:p>
+          <a:p>
+            <a:pPr marL="0" indent="0">
+              <a:buNone/>
+            </a:pPr>
+            <a:r>
+              <a:rPr lang="en-US" dirty="0"/>
+              <a:t>CentRes allows employees to easily interact with customers’ orders and reduces miscommunication. Customer wait times are reduced by transmitting orders directly to the kitchen. </a:t>
             </a:r>
           </a:p>
         </p:txBody>
@@ -9468,8 +9592,8 @@
         </p:nvSpPr>
         <p:spPr>
           <a:xfrm>
-            <a:off x="7032929" y="897309"/>
-            <a:ext cx="4023360" cy="464871"/>
+            <a:off x="6336335" y="346229"/>
+            <a:ext cx="5212934" cy="976544"/>
           </a:xfrm>
         </p:spPr>
         <p:txBody>
@@ -9477,8 +9601,10 @@
           <a:lstStyle/>
           <a:p>
             <a:r>
-              <a:rPr lang="en-US" spc="0" dirty="0"/>
-              <a:t>Get to know more about our software</a:t>
+              <a:rPr lang="en-US" sz="3600" spc="100" dirty="0">
+                <a:latin typeface="+mj-lt"/>
+              </a:rPr>
+              <a:t>Project Overview</a:t>
             </a:r>
           </a:p>
         </p:txBody>
@@ -9513,40 +9639,6 @@
           <a:chExt cx="0" cy="0"/>
         </a:xfrm>
       </p:grpSpPr>
-      <p:sp>
-        <p:nvSpPr>
-          <p:cNvPr id="8" name="Title 7">
-            <a:extLst>
-              <a:ext uri="{FF2B5EF4-FFF2-40B4-BE49-F238E27FC236}">
-                <a16:creationId xmlns:a16="http://schemas.microsoft.com/office/drawing/2014/main" id="{103950CF-5BF2-4FB0-A36C-48C194F39E12}"/>
-              </a:ext>
-            </a:extLst>
-          </p:cNvPr>
-          <p:cNvSpPr>
-            <a:spLocks noGrp="1"/>
-          </p:cNvSpPr>
-          <p:nvPr>
-            <p:ph type="title"/>
-          </p:nvPr>
-        </p:nvSpPr>
-        <p:spPr>
-          <a:xfrm>
-            <a:off x="6096000" y="56057"/>
-            <a:ext cx="5897218" cy="753220"/>
-          </a:xfrm>
-        </p:spPr>
-        <p:txBody>
-          <a:bodyPr/>
-          <a:lstStyle/>
-          <a:p>
-            <a:pPr algn="ctr"/>
-            <a:r>
-              <a:rPr lang="en-US" sz="2800" dirty="0"/>
-              <a:t>Project Description</a:t>
-            </a:r>
-          </a:p>
-        </p:txBody>
-      </p:sp>
       <p:pic>
         <p:nvPicPr>
           <p:cNvPr id="5" name="Picture Placeholder 4" descr="table with various people working on their laptops">
@@ -9618,9 +9710,15 @@
             <a:pPr marL="0" indent="0">
               <a:buNone/>
             </a:pPr>
+            <a:endParaRPr lang="en-US" dirty="0"/>
+          </a:p>
+          <a:p>
+            <a:pPr marL="0" indent="0">
+              <a:buNone/>
+            </a:pPr>
             <a:r>
               <a:rPr lang="en-US" dirty="0"/>
-              <a:t>TEXT HERE</a:t>
+              <a:t>Servers will have an easy-to-read display that keeps track of things such as menu items, prices, order times and order status. Chefs will have access to real time order data and will have the ability to provide status updates to servers. Hosts can manage the restaurant flow via table assignments and can view server availability. Managers have the ability to update the menu, edit orders, alter the bill, view wait times and more!</a:t>
             </a:r>
           </a:p>
         </p:txBody>
@@ -9656,10 +9754,10 @@
       </p:sp>
       <p:sp>
         <p:nvSpPr>
-          <p:cNvPr id="3" name="Text Placeholder 2">
-            <a:extLst>
-              <a:ext uri="{FF2B5EF4-FFF2-40B4-BE49-F238E27FC236}">
-                <a16:creationId xmlns:a16="http://schemas.microsoft.com/office/drawing/2014/main" id="{DBF5275B-C1F9-0732-D4B5-3FCC925E2164}"/>
+          <p:cNvPr id="7" name="Text Placeholder 2">
+            <a:extLst>
+              <a:ext uri="{FF2B5EF4-FFF2-40B4-BE49-F238E27FC236}">
+                <a16:creationId xmlns:a16="http://schemas.microsoft.com/office/drawing/2014/main" id="{CFDA9269-055C-5772-E8B6-BACBFA0AB992}"/>
               </a:ext>
             </a:extLst>
           </p:cNvPr>
@@ -9672,15 +9770,20 @@
         </p:nvSpPr>
         <p:spPr>
           <a:xfrm>
-            <a:off x="7032929" y="1024845"/>
-            <a:ext cx="4023360" cy="464871"/>
+            <a:off x="6336334" y="390618"/>
+            <a:ext cx="5416550" cy="994299"/>
           </a:xfrm>
         </p:spPr>
         <p:txBody>
           <a:bodyPr/>
           <a:lstStyle/>
           <a:p>
-            <a:endParaRPr lang="en-US" spc="0" dirty="0"/>
+            <a:r>
+              <a:rPr lang="en-US" sz="3600" spc="100" dirty="0">
+                <a:latin typeface="+mj-lt"/>
+              </a:rPr>
+              <a:t>Project Description</a:t>
+            </a:r>
           </a:p>
         </p:txBody>
       </p:sp>
@@ -10354,16 +10457,16 @@
         <p:spPr>
           <a:xfrm>
             <a:off x="719940" y="1661686"/>
-            <a:ext cx="4521818" cy="4655890"/>
+            <a:ext cx="4860250" cy="4655890"/>
           </a:xfrm>
         </p:spPr>
         <p:txBody>
           <a:bodyPr>
-            <a:normAutofit fontScale="90000"/>
+            <a:normAutofit/>
           </a:bodyPr>
           <a:lstStyle/>
           <a:p>
-            <a:pPr marL="914400" marR="0" lvl="2">
+            <a:pPr marL="914400" marR="0" lvl="2" algn="l">
               <a:lnSpc>
                 <a:spcPct val="107000"/>
               </a:lnSpc>
@@ -10732,7 +10835,7 @@
         </p:nvSpPr>
         <p:spPr>
           <a:xfrm>
-            <a:off x="1439124" y="594590"/>
+            <a:off x="1246178" y="672451"/>
             <a:ext cx="9234488" cy="897622"/>
           </a:xfrm>
         </p:spPr>
@@ -10763,8 +10866,8 @@
         </p:nvSpPr>
         <p:spPr>
           <a:xfrm>
-            <a:off x="6950244" y="1661686"/>
-            <a:ext cx="4521818" cy="4655890"/>
+            <a:off x="6300130" y="1661686"/>
+            <a:ext cx="5171930" cy="4655890"/>
           </a:xfrm>
           <a:prstGeom prst="rect">
             <a:avLst/>
@@ -12191,21 +12294,21 @@
 </file>
 
 <file path=customXml/item2.xml><?xml version="1.0" encoding="utf-8"?>
+<?mso-contentType ?>
+<FormTemplates xmlns="http://schemas.microsoft.com/sharepoint/v3/contenttype/forms">
+  <Display>DocumentLibraryForm</Display>
+  <Edit>DocumentLibraryForm</Edit>
+  <New>DocumentLibraryForm</New>
+</FormTemplates>
+</file>
+
+<file path=customXml/item3.xml><?xml version="1.0" encoding="utf-8"?>
 <p:properties xmlns:p="http://schemas.microsoft.com/office/2006/metadata/properties" xmlns:xsi="http://www.w3.org/2001/XMLSchema-instance" xmlns:pc="http://schemas.microsoft.com/office/infopath/2007/PartnerControls">
   <documentManagement>
     <Status xmlns="71af3243-3dd4-4a8d-8c0d-dd76da1f02a5">Not started</Status>
     <MediaServiceKeyPoints xmlns="71af3243-3dd4-4a8d-8c0d-dd76da1f02a5" xsi:nil="true"/>
   </documentManagement>
 </p:properties>
-</file>
-
-<file path=customXml/item3.xml><?xml version="1.0" encoding="utf-8"?>
-<?mso-contentType ?>
-<FormTemplates xmlns="http://schemas.microsoft.com/sharepoint/v3/contenttype/forms">
-  <Display>DocumentLibraryForm</Display>
-  <Edit>DocumentLibraryForm</Edit>
-  <New>DocumentLibraryForm</New>
-</FormTemplates>
 </file>
 
 <file path=customXml/itemProps1.xml><?xml version="1.0" encoding="utf-8"?>
@@ -12228,6 +12331,14 @@
 </file>
 
 <file path=customXml/itemProps2.xml><?xml version="1.0" encoding="utf-8"?>
+<ds:datastoreItem xmlns:ds="http://schemas.openxmlformats.org/officeDocument/2006/customXml" ds:itemID="{1B7E2D32-4FDD-4266-880C-17595B801432}">
+  <ds:schemaRefs>
+    <ds:schemaRef ds:uri="http://schemas.microsoft.com/sharepoint/v3/contenttype/forms"/>
+  </ds:schemaRefs>
+</ds:datastoreItem>
+</file>
+
+<file path=customXml/itemProps3.xml><?xml version="1.0" encoding="utf-8"?>
 <ds:datastoreItem xmlns:ds="http://schemas.openxmlformats.org/officeDocument/2006/customXml" ds:itemID="{E3D9F223-918A-45AF-9B53-56AB9E5E2182}">
   <ds:schemaRefs>
     <ds:schemaRef ds:uri="http://schemas.microsoft.com/office/2006/metadata/properties"/>
@@ -12235,12 +12346,4 @@
     <ds:schemaRef ds:uri="71af3243-3dd4-4a8d-8c0d-dd76da1f02a5"/>
   </ds:schemaRefs>
 </ds:datastoreItem>
-</file>
-
-<file path=customXml/itemProps3.xml><?xml version="1.0" encoding="utf-8"?>
-<ds:datastoreItem xmlns:ds="http://schemas.openxmlformats.org/officeDocument/2006/customXml" ds:itemID="{1B7E2D32-4FDD-4266-880C-17595B801432}">
-  <ds:schemaRefs>
-    <ds:schemaRef ds:uri="http://schemas.microsoft.com/sharepoint/v3/contenttype/forms"/>
-  </ds:schemaRefs>
-</ds:datastoreItem>
 </file>
</xml_diff>

<commit_message>
Updated project to fix duplicate files.
Added Mohamed's section from the duplicate project to the main powerpoint file.
</commit_message>
<xml_diff>
--- a/CentRes.pptx
+++ b/CentRes.pptx
@@ -249,7 +249,7 @@
           <a:p>
             <a:fld id="{966D5B4E-BF3E-3B45-A4BA-D6C3B92870D7}" type="datetimeFigureOut">
               <a:rPr lang="en-US" smtClean="0"/>
-              <a:t>11/9/2022</a:t>
+              <a:t>11/10/2022</a:t>
             </a:fld>
             <a:endParaRPr lang="en-US" dirty="0"/>
           </a:p>
@@ -426,7 +426,7 @@
           <a:p>
             <a:fld id="{F5A8621B-8C8E-49BA-8772-41D0FE75A082}" type="datetimeFigureOut">
               <a:rPr lang="en-US" smtClean="0"/>
-              <a:t>11/9/2022</a:t>
+              <a:t>11/10/2022</a:t>
             </a:fld>
             <a:endParaRPr lang="en-US" dirty="0"/>
           </a:p>
@@ -7545,21 +7545,12 @@
               <a:defRPr/>
             </a:pPr>
             <a:r>
-              <a:rPr kumimoji="0" lang="en-US" sz="1600" b="0" i="0" u="none" strike="noStrike" kern="1200" cap="none" normalizeH="0" noProof="0" dirty="0">
-                <a:ln>
-                  <a:noFill/>
-                </a:ln>
-                <a:solidFill>
-                  <a:schemeClr val="tx1"/>
-                </a:solidFill>
+              <a:rPr lang="en-US" sz="1600" dirty="0">
                 <a:effectLst/>
-                <a:uLnTx/>
-                <a:uFillTx/>
-                <a:latin typeface="+mn-lt"/>
-                <a:ea typeface="+mn-ea"/>
-                <a:cs typeface="Biome Light" panose="020B0303030204020804" pitchFamily="34" charset="0"/>
+                <a:ea typeface="Yu Mincho" panose="02020400000000000000" pitchFamily="18" charset="-128"/>
+                <a:cs typeface="Times New Roman" panose="02020603050405020304" pitchFamily="18" charset="0"/>
               </a:rPr>
-              <a:t>Customer satisfaction increased from 70 to 80%</a:t>
+              <a:t>CentRes will be using a MySQL relational database to store employee information and communicate information related to sales transactions and product inventory.  MySQL can help the restaurant to keep tracking the inventory. See what foods are selling more and which foods are selling less, and this can help to optimize the menu and minimize waste.</a:t>
             </a:r>
           </a:p>
           <a:p>
@@ -8278,9 +8269,24 @@
               <a:buFont typeface="Arial" panose="020B0604020202020204" pitchFamily="34" charset="0"/>
               <a:buChar char="•"/>
             </a:pPr>
-            <a:endParaRPr lang="en-US" spc="0" dirty="0">
-              <a:cs typeface="Arial" panose="020B0604020202020204" pitchFamily="34" charset="0"/>
-            </a:endParaRPr>
+            <a:r>
+              <a:rPr lang="en-US" spc="0" dirty="0">
+                <a:cs typeface="Arial" panose="020B0604020202020204" pitchFamily="34" charset="0"/>
+              </a:rPr>
+              <a:t>Individual team members feel more satisfied with their roles which gives them extra motivation to perform.</a:t>
+            </a:r>
+          </a:p>
+          <a:p>
+            <a:pPr marL="285750" indent="-285750" algn="l">
+              <a:buFont typeface="Arial" panose="020B0604020202020204" pitchFamily="34" charset="0"/>
+              <a:buChar char="•"/>
+            </a:pPr>
+            <a:r>
+              <a:rPr lang="en-US" spc="0" dirty="0">
+                <a:cs typeface="Arial" panose="020B0604020202020204" pitchFamily="34" charset="0"/>
+              </a:rPr>
+              <a:t>tasks are completed on time and in full.</a:t>
+            </a:r>
           </a:p>
           <a:p>
             <a:pPr marL="285750" indent="-285750" algn="l">
@@ -8292,7 +8298,10 @@
             </a:endParaRPr>
           </a:p>
           <a:p>
-            <a:pPr algn="l"/>
+            <a:pPr marL="285750" indent="-285750" algn="l">
+              <a:buFont typeface="Arial" panose="020B0604020202020204" pitchFamily="34" charset="0"/>
+              <a:buChar char="•"/>
+            </a:pPr>
             <a:endParaRPr lang="en-US" spc="0" dirty="0">
               <a:cs typeface="Arial" panose="020B0604020202020204" pitchFamily="34" charset="0"/>
             </a:endParaRPr>
@@ -8509,14 +8518,26 @@
               <a:rPr lang="en-US" sz="1600" spc="0" dirty="0">
                 <a:cs typeface="Arial" panose="020B0604020202020204" pitchFamily="34" charset="0"/>
               </a:rPr>
-              <a:t>Create a Mobile application version to give restaurant owners the option to use either a web application or mobile application based </a:t>
-            </a:r>
-            <a:r>
-              <a:rPr lang="en-US" sz="1600" spc="0">
+              <a:t>Create a Mobile application version to give restaurant owners the option to use either a web application or mobile application based on their needs. </a:t>
+            </a:r>
+          </a:p>
+          <a:p>
+            <a:pPr marL="285750" indent="-285750" algn="l">
+              <a:buFont typeface="Arial" panose="020B0604020202020204" pitchFamily="34" charset="0"/>
+              <a:buChar char="•"/>
+            </a:pPr>
+            <a:r>
+              <a:rPr lang="en-US" sz="1600" spc="0" dirty="0">
                 <a:cs typeface="Arial" panose="020B0604020202020204" pitchFamily="34" charset="0"/>
               </a:rPr>
-              <a:t>on their needs. </a:t>
-            </a:r>
+              <a:t>add online reservation for customers .</a:t>
+            </a:r>
+          </a:p>
+          <a:p>
+            <a:pPr marL="285750" indent="-285750" algn="l">
+              <a:buFont typeface="Arial" panose="020B0604020202020204" pitchFamily="34" charset="0"/>
+              <a:buChar char="•"/>
+            </a:pPr>
             <a:endParaRPr lang="en-US" sz="1600" spc="0" dirty="0">
               <a:cs typeface="Arial" panose="020B0604020202020204" pitchFamily="34" charset="0"/>
             </a:endParaRPr>
@@ -12294,21 +12315,21 @@
 </file>
 
 <file path=customXml/item2.xml><?xml version="1.0" encoding="utf-8"?>
+<p:properties xmlns:p="http://schemas.microsoft.com/office/2006/metadata/properties" xmlns:xsi="http://www.w3.org/2001/XMLSchema-instance" xmlns:pc="http://schemas.microsoft.com/office/infopath/2007/PartnerControls">
+  <documentManagement>
+    <Status xmlns="71af3243-3dd4-4a8d-8c0d-dd76da1f02a5">Not started</Status>
+    <MediaServiceKeyPoints xmlns="71af3243-3dd4-4a8d-8c0d-dd76da1f02a5" xsi:nil="true"/>
+  </documentManagement>
+</p:properties>
+</file>
+
+<file path=customXml/item3.xml><?xml version="1.0" encoding="utf-8"?>
 <?mso-contentType ?>
 <FormTemplates xmlns="http://schemas.microsoft.com/sharepoint/v3/contenttype/forms">
   <Display>DocumentLibraryForm</Display>
   <Edit>DocumentLibraryForm</Edit>
   <New>DocumentLibraryForm</New>
 </FormTemplates>
-</file>
-
-<file path=customXml/item3.xml><?xml version="1.0" encoding="utf-8"?>
-<p:properties xmlns:p="http://schemas.microsoft.com/office/2006/metadata/properties" xmlns:xsi="http://www.w3.org/2001/XMLSchema-instance" xmlns:pc="http://schemas.microsoft.com/office/infopath/2007/PartnerControls">
-  <documentManagement>
-    <Status xmlns="71af3243-3dd4-4a8d-8c0d-dd76da1f02a5">Not started</Status>
-    <MediaServiceKeyPoints xmlns="71af3243-3dd4-4a8d-8c0d-dd76da1f02a5" xsi:nil="true"/>
-  </documentManagement>
-</p:properties>
 </file>
 
 <file path=customXml/itemProps1.xml><?xml version="1.0" encoding="utf-8"?>
@@ -12331,14 +12352,6 @@
 </file>
 
 <file path=customXml/itemProps2.xml><?xml version="1.0" encoding="utf-8"?>
-<ds:datastoreItem xmlns:ds="http://schemas.openxmlformats.org/officeDocument/2006/customXml" ds:itemID="{1B7E2D32-4FDD-4266-880C-17595B801432}">
-  <ds:schemaRefs>
-    <ds:schemaRef ds:uri="http://schemas.microsoft.com/sharepoint/v3/contenttype/forms"/>
-  </ds:schemaRefs>
-</ds:datastoreItem>
-</file>
-
-<file path=customXml/itemProps3.xml><?xml version="1.0" encoding="utf-8"?>
 <ds:datastoreItem xmlns:ds="http://schemas.openxmlformats.org/officeDocument/2006/customXml" ds:itemID="{E3D9F223-918A-45AF-9B53-56AB9E5E2182}">
   <ds:schemaRefs>
     <ds:schemaRef ds:uri="http://schemas.microsoft.com/office/2006/metadata/properties"/>
@@ -12346,4 +12359,12 @@
     <ds:schemaRef ds:uri="71af3243-3dd4-4a8d-8c0d-dd76da1f02a5"/>
   </ds:schemaRefs>
 </ds:datastoreItem>
+</file>
+
+<file path=customXml/itemProps3.xml><?xml version="1.0" encoding="utf-8"?>
+<ds:datastoreItem xmlns:ds="http://schemas.openxmlformats.org/officeDocument/2006/customXml" ds:itemID="{1B7E2D32-4FDD-4266-880C-17595B801432}">
+  <ds:schemaRefs>
+    <ds:schemaRef ds:uri="http://schemas.microsoft.com/sharepoint/v3/contenttype/forms"/>
+  </ds:schemaRefs>
+</ds:datastoreItem>
 </file>
</xml_diff>

<commit_message>
Changed formatting added extra slides
</commit_message>
<xml_diff>
--- a/CentRes.pptx
+++ b/CentRes.pptx
@@ -5,10 +5,10 @@
     <p:sldMasterId id="2147483648" r:id="rId4"/>
   </p:sldMasterIdLst>
   <p:notesMasterIdLst>
-    <p:notesMasterId r:id="rId25"/>
+    <p:notesMasterId r:id="rId27"/>
   </p:notesMasterIdLst>
   <p:handoutMasterIdLst>
-    <p:handoutMasterId r:id="rId26"/>
+    <p:handoutMasterId r:id="rId28"/>
   </p:handoutMasterIdLst>
   <p:sldIdLst>
     <p:sldId id="2448" r:id="rId5"/>
@@ -22,15 +22,17 @@
     <p:sldId id="2465" r:id="rId13"/>
     <p:sldId id="2467" r:id="rId14"/>
     <p:sldId id="2457" r:id="rId15"/>
-    <p:sldId id="2474" r:id="rId16"/>
-    <p:sldId id="2475" r:id="rId17"/>
-    <p:sldId id="2456" r:id="rId18"/>
-    <p:sldId id="2468" r:id="rId19"/>
-    <p:sldId id="2470" r:id="rId20"/>
-    <p:sldId id="2473" r:id="rId21"/>
-    <p:sldId id="2471" r:id="rId22"/>
-    <p:sldId id="2472" r:id="rId23"/>
-    <p:sldId id="2436" r:id="rId24"/>
+    <p:sldId id="2476" r:id="rId16"/>
+    <p:sldId id="2474" r:id="rId17"/>
+    <p:sldId id="2475" r:id="rId18"/>
+    <p:sldId id="2456" r:id="rId19"/>
+    <p:sldId id="2468" r:id="rId20"/>
+    <p:sldId id="2470" r:id="rId21"/>
+    <p:sldId id="2473" r:id="rId22"/>
+    <p:sldId id="2477" r:id="rId23"/>
+    <p:sldId id="2471" r:id="rId24"/>
+    <p:sldId id="2472" r:id="rId25"/>
+    <p:sldId id="2436" r:id="rId26"/>
   </p:sldIdLst>
   <p:sldSz cx="12192000" cy="6858000"/>
   <p:notesSz cx="6858000" cy="9144000"/>
@@ -934,7 +936,7 @@
             <a:fld id="{228B34ED-4CDD-41C9-90F7-D768D5559A6F}" type="slidenum">
               <a:rPr lang="en-US" smtClean="0"/>
               <a:pPr/>
-              <a:t>14</a:t>
+              <a:t>15</a:t>
             </a:fld>
             <a:endParaRPr lang="en-US" dirty="0"/>
           </a:p>
@@ -1019,7 +1021,7 @@
             <a:fld id="{228B34ED-4CDD-41C9-90F7-D768D5559A6F}" type="slidenum">
               <a:rPr lang="en-US" smtClean="0"/>
               <a:pPr/>
-              <a:t>15</a:t>
+              <a:t>16</a:t>
             </a:fld>
             <a:endParaRPr lang="en-US" dirty="0"/>
           </a:p>
@@ -1104,7 +1106,7 @@
             <a:fld id="{228B34ED-4CDD-41C9-90F7-D768D5559A6F}" type="slidenum">
               <a:rPr lang="en-US" smtClean="0"/>
               <a:pPr/>
-              <a:t>16</a:t>
+              <a:t>17</a:t>
             </a:fld>
             <a:endParaRPr lang="en-US" dirty="0"/>
           </a:p>
@@ -1189,7 +1191,7 @@
             <a:fld id="{228B34ED-4CDD-41C9-90F7-D768D5559A6F}" type="slidenum">
               <a:rPr lang="en-US" smtClean="0"/>
               <a:pPr/>
-              <a:t>17</a:t>
+              <a:t>18</a:t>
             </a:fld>
             <a:endParaRPr lang="en-US" dirty="0"/>
           </a:p>
@@ -1199,6 +1201,91 @@
     <p:extLst>
       <p:ext uri="{BB962C8B-B14F-4D97-AF65-F5344CB8AC3E}">
         <p14:creationId xmlns:p14="http://schemas.microsoft.com/office/powerpoint/2010/main" val="3809423074"/>
+      </p:ext>
+    </p:extLst>
+  </p:cSld>
+  <p:clrMapOvr>
+    <a:masterClrMapping/>
+  </p:clrMapOvr>
+</p:notes>
+</file>
+
+<file path=ppt/notesSlides/notesSlide7.xml><?xml version="1.0" encoding="utf-8"?>
+<p:notes xmlns:a="http://schemas.openxmlformats.org/drawingml/2006/main" xmlns:r="http://schemas.openxmlformats.org/officeDocument/2006/relationships" xmlns:p="http://schemas.openxmlformats.org/presentationml/2006/main">
+  <p:cSld>
+    <p:spTree>
+      <p:nvGrpSpPr>
+        <p:cNvPr id="1" name=""/>
+        <p:cNvGrpSpPr/>
+        <p:nvPr/>
+      </p:nvGrpSpPr>
+      <p:grpSpPr>
+        <a:xfrm>
+          <a:off x="0" y="0"/>
+          <a:ext cx="0" cy="0"/>
+          <a:chOff x="0" y="0"/>
+          <a:chExt cx="0" cy="0"/>
+        </a:xfrm>
+      </p:grpSpPr>
+      <p:sp>
+        <p:nvSpPr>
+          <p:cNvPr id="2" name="Slide Image Placeholder 1"/>
+          <p:cNvSpPr>
+            <a:spLocks noGrp="1" noRot="1" noChangeAspect="1"/>
+          </p:cNvSpPr>
+          <p:nvPr>
+            <p:ph type="sldImg"/>
+          </p:nvPr>
+        </p:nvSpPr>
+        <p:spPr/>
+      </p:sp>
+      <p:sp>
+        <p:nvSpPr>
+          <p:cNvPr id="3" name="Notes Placeholder 2"/>
+          <p:cNvSpPr>
+            <a:spLocks noGrp="1"/>
+          </p:cNvSpPr>
+          <p:nvPr>
+            <p:ph type="body" idx="1"/>
+          </p:nvPr>
+        </p:nvSpPr>
+        <p:spPr/>
+        <p:txBody>
+          <a:bodyPr/>
+          <a:lstStyle/>
+          <a:p>
+            <a:endParaRPr lang="en-US" dirty="0"/>
+          </a:p>
+        </p:txBody>
+      </p:sp>
+      <p:sp>
+        <p:nvSpPr>
+          <p:cNvPr id="4" name="Slide Number Placeholder 3"/>
+          <p:cNvSpPr>
+            <a:spLocks noGrp="1"/>
+          </p:cNvSpPr>
+          <p:nvPr>
+            <p:ph type="sldNum" sz="quarter" idx="5"/>
+          </p:nvPr>
+        </p:nvSpPr>
+        <p:spPr/>
+        <p:txBody>
+          <a:bodyPr/>
+          <a:lstStyle/>
+          <a:p>
+            <a:fld id="{228B34ED-4CDD-41C9-90F7-D768D5559A6F}" type="slidenum">
+              <a:rPr lang="en-US" smtClean="0"/>
+              <a:pPr/>
+              <a:t>19</a:t>
+            </a:fld>
+            <a:endParaRPr lang="en-US" dirty="0"/>
+          </a:p>
+        </p:txBody>
+      </p:sp>
+    </p:spTree>
+    <p:extLst>
+      <p:ext uri="{BB962C8B-B14F-4D97-AF65-F5344CB8AC3E}">
+        <p14:creationId xmlns:p14="http://schemas.microsoft.com/office/powerpoint/2010/main" val="2759226863"/>
       </p:ext>
     </p:extLst>
   </p:cSld>
@@ -5871,8 +5958,8 @@
         </p:nvSpPr>
         <p:spPr>
           <a:xfrm>
-            <a:off x="5707038" y="1651820"/>
-            <a:ext cx="6096000" cy="4886631"/>
+            <a:off x="5707038" y="1677798"/>
+            <a:ext cx="6096000" cy="4860654"/>
           </a:xfrm>
         </p:spPr>
         <p:txBody>
@@ -5938,55 +6025,6 @@
             <a:r>
               <a:rPr lang="en-US" sz="1200" cap="none" spc="0" dirty="0"/>
               <a:t>	- Keep long term data in a cloud or off-site server database with a data 	storage model allowing for frequent input of data but infrequent querying of 	that data (AWS)</a:t>
-            </a:r>
-          </a:p>
-          <a:p>
-            <a:pPr algn="l"/>
-            <a:r>
-              <a:rPr lang="en-US" sz="1200" u="sng" spc="0" dirty="0"/>
-              <a:t>User Requirements:</a:t>
-            </a:r>
-          </a:p>
-          <a:p>
-            <a:pPr algn="l">
-              <a:buFont typeface="Arial" pitchFamily="34" charset="0"/>
-              <a:buChar char="•"/>
-            </a:pPr>
-            <a:r>
-              <a:rPr lang="en-US" sz="1200" spc="0" dirty="0"/>
-              <a:t>        Must:</a:t>
-            </a:r>
-          </a:p>
-          <a:p>
-            <a:pPr algn="l"/>
-            <a:r>
-              <a:rPr lang="en-US" sz="1200" cap="none" spc="0" dirty="0"/>
-              <a:t>	- Manager can edit orders, alter bill, overview of wait times, view time stamps in 	order</a:t>
-            </a:r>
-          </a:p>
-          <a:p>
-            <a:pPr algn="l"/>
-            <a:r>
-              <a:rPr lang="en-US" sz="1200" cap="none" spc="0" dirty="0"/>
-              <a:t>	- Chef can view orders, time stamps for orders, and mark as ready</a:t>
-            </a:r>
-          </a:p>
-          <a:p>
-            <a:pPr algn="l"/>
-            <a:r>
-              <a:rPr lang="en-US" sz="1200" cap="none" spc="0" dirty="0"/>
-              <a:t>	- Waiter can view orders, view tables, time stamp for orders, alter bill, view 	menu</a:t>
-            </a:r>
-            <a:endParaRPr lang="en-US" sz="1800" cap="none" spc="0" dirty="0"/>
-          </a:p>
-          <a:p>
-            <a:pPr algn="l">
-              <a:buFont typeface="Arial" pitchFamily="34" charset="0"/>
-              <a:buChar char="•"/>
-            </a:pPr>
-            <a:r>
-              <a:rPr lang="en-US" sz="1200" spc="0" dirty="0"/>
-              <a:t>        Should:</a:t>
             </a:r>
           </a:p>
           <a:p>
@@ -6156,130 +6194,50 @@
           <a:p>
             <a:pPr algn="l"/>
             <a:r>
-              <a:rPr lang="en-US" sz="1200" b="1" u="sng" spc="0" dirty="0">
-                <a:cs typeface="Arial" panose="020B0604020202020204" pitchFamily="34" charset="0"/>
-              </a:rPr>
-              <a:t>Functional requirements</a:t>
-            </a:r>
-          </a:p>
-          <a:p>
-            <a:pPr marL="285750" indent="-285750" algn="l">
-              <a:buFont typeface="Arial" panose="020B0604020202020204" pitchFamily="34" charset="0"/>
+              <a:rPr lang="en-US" sz="1200" u="sng" spc="0" dirty="0"/>
+              <a:t>User Requirements:</a:t>
+            </a:r>
+          </a:p>
+          <a:p>
+            <a:pPr algn="l">
+              <a:buFont typeface="Arial" pitchFamily="34" charset="0"/>
               <a:buChar char="•"/>
             </a:pPr>
             <a:r>
-              <a:rPr lang="en-US" sz="1200" spc="0" dirty="0">
-                <a:cs typeface="Arial" panose="020B0604020202020204" pitchFamily="34" charset="0"/>
-              </a:rPr>
-              <a:t>Must:</a:t>
+              <a:rPr lang="en-US" sz="1200" spc="0" dirty="0"/>
+              <a:t>        Must:</a:t>
             </a:r>
           </a:p>
           <a:p>
             <a:pPr algn="l"/>
             <a:r>
-              <a:rPr lang="en-US" sz="1200" spc="0" dirty="0">
-                <a:cs typeface="Arial" panose="020B0604020202020204" pitchFamily="34" charset="0"/>
-              </a:rPr>
-              <a:t>	-</a:t>
-            </a:r>
-            <a:r>
-              <a:rPr lang="en-US" sz="1200" cap="none" spc="0" dirty="0">
-                <a:cs typeface="Arial" panose="020B0604020202020204" pitchFamily="34" charset="0"/>
-              </a:rPr>
-              <a:t>Display menu when requested</a:t>
+              <a:rPr lang="en-US" sz="1200" cap="none" spc="0" dirty="0"/>
+              <a:t>	- Manager can edit orders, alter bill, overview of wait times, view time stamps in 	order</a:t>
             </a:r>
           </a:p>
           <a:p>
             <a:pPr algn="l"/>
             <a:r>
-              <a:rPr lang="en-US" sz="1200" cap="none" spc="0" dirty="0">
-                <a:cs typeface="Arial" panose="020B0604020202020204" pitchFamily="34" charset="0"/>
-              </a:rPr>
-              <a:t>	-Display orders, bill, wait times,  and time stamps when requested</a:t>
+              <a:rPr lang="en-US" sz="1200" cap="none" spc="0" dirty="0"/>
+              <a:t>	- Chef can view orders, time stamps for orders, and mark as ready</a:t>
             </a:r>
           </a:p>
           <a:p>
             <a:pPr algn="l"/>
             <a:r>
-              <a:rPr lang="en-US" sz="1200" cap="none" spc="0" dirty="0">
-                <a:cs typeface="Arial" panose="020B0604020202020204" pitchFamily="34" charset="0"/>
-              </a:rPr>
-              <a:t>	-Allow user to login  when successfully entering in user and password</a:t>
-            </a:r>
-            <a:endParaRPr lang="en-US" sz="1200" spc="0" dirty="0">
-              <a:cs typeface="Arial" panose="020B0604020202020204" pitchFamily="34" charset="0"/>
-            </a:endParaRPr>
-          </a:p>
-          <a:p>
-            <a:pPr marL="285750" indent="-285750" algn="l">
-              <a:buFont typeface="Arial" panose="020B0604020202020204" pitchFamily="34" charset="0"/>
+              <a:rPr lang="en-US" sz="1200" cap="none" spc="0" dirty="0"/>
+              <a:t>	- Waiter can view orders, view tables, time stamp for orders, alter bill, view 	menu</a:t>
+            </a:r>
+            <a:endParaRPr lang="en-US" sz="1800" cap="none" spc="0" dirty="0"/>
+          </a:p>
+          <a:p>
+            <a:pPr algn="l">
+              <a:buFont typeface="Arial" pitchFamily="34" charset="0"/>
               <a:buChar char="•"/>
             </a:pPr>
             <a:r>
-              <a:rPr lang="en-US" sz="1200" spc="0" dirty="0">
-                <a:cs typeface="Arial" panose="020B0604020202020204" pitchFamily="34" charset="0"/>
-              </a:rPr>
-              <a:t>Should:</a:t>
-            </a:r>
-          </a:p>
-          <a:p>
-            <a:pPr algn="l"/>
-            <a:r>
-              <a:rPr lang="en-US" sz="1200" spc="0" dirty="0">
-                <a:cs typeface="Arial" panose="020B0604020202020204" pitchFamily="34" charset="0"/>
-              </a:rPr>
-              <a:t>	-</a:t>
-            </a:r>
-            <a:r>
-              <a:rPr lang="en-US" sz="1200" cap="none" spc="0" dirty="0">
-                <a:cs typeface="Arial" panose="020B0604020202020204" pitchFamily="34" charset="0"/>
-              </a:rPr>
-              <a:t>Use 2fa for manager login to secure admin privileges (two factor 	authentication)</a:t>
-            </a:r>
-          </a:p>
-          <a:p>
-            <a:pPr algn="l"/>
-            <a:r>
-              <a:rPr lang="en-US" sz="1200" cap="none" spc="0" dirty="0">
-                <a:cs typeface="Arial" panose="020B0604020202020204" pitchFamily="34" charset="0"/>
-              </a:rPr>
-              <a:t>	-Keep track of volume over time to create a predictive model for future use</a:t>
-            </a:r>
-          </a:p>
-          <a:p>
-            <a:pPr algn="l"/>
-            <a:r>
-              <a:rPr lang="en-US" sz="1200" cap="none" spc="0" dirty="0">
-                <a:cs typeface="Arial" panose="020B0604020202020204" pitchFamily="34" charset="0"/>
-              </a:rPr>
-              <a:t>	- Require user log back in after tablet/device is idle for more than 60 seconds</a:t>
-            </a:r>
-          </a:p>
-          <a:p>
-            <a:pPr marL="285750" indent="-285750" algn="l">
-              <a:buFont typeface="Arial" panose="020B0604020202020204" pitchFamily="34" charset="0"/>
-              <a:buChar char="•"/>
-            </a:pPr>
-            <a:r>
-              <a:rPr lang="en-US" sz="1200" spc="0" dirty="0">
-                <a:cs typeface="Arial" panose="020B0604020202020204" pitchFamily="34" charset="0"/>
-              </a:rPr>
-              <a:t>Could:</a:t>
-            </a:r>
-          </a:p>
-          <a:p>
-            <a:pPr algn="l"/>
-            <a:r>
-              <a:rPr lang="en-US" sz="1200" spc="0" dirty="0">
-                <a:cs typeface="Arial" panose="020B0604020202020204" pitchFamily="34" charset="0"/>
-              </a:rPr>
-              <a:t>	-</a:t>
-            </a:r>
-            <a:r>
-              <a:rPr lang="en-US" sz="1200" cap="none" spc="0" dirty="0">
-                <a:cs typeface="Arial" panose="020B0604020202020204" pitchFamily="34" charset="0"/>
-              </a:rPr>
-              <a:t>Customer rewards program</a:t>
+              <a:rPr lang="en-US" sz="1200" spc="0" dirty="0"/>
+              <a:t>        Should:</a:t>
             </a:r>
           </a:p>
           <a:p>
@@ -6444,7 +6402,7 @@
         </p:nvSpPr>
         <p:spPr>
           <a:xfrm>
-            <a:off x="5766032" y="1518408"/>
+            <a:off x="5697206" y="1656060"/>
             <a:ext cx="6096000" cy="4882392"/>
           </a:xfrm>
         </p:spPr>
@@ -6457,7 +6415,7 @@
               <a:rPr lang="en-US" sz="1200" b="1" u="sng" spc="0" dirty="0">
                 <a:cs typeface="Arial" panose="020B0604020202020204" pitchFamily="34" charset="0"/>
               </a:rPr>
-              <a:t>NON-Functional requirements</a:t>
+              <a:t>Functional requirements</a:t>
             </a:r>
           </a:p>
           <a:p>
@@ -6484,7 +6442,7 @@
               <a:rPr lang="en-US" sz="1200" cap="none" spc="0" dirty="0">
                 <a:cs typeface="Arial" panose="020B0604020202020204" pitchFamily="34" charset="0"/>
               </a:rPr>
-              <a:t>Database should update in a timely manner to keep communication between 	users accurate	-Display orders, bill, wait times,  and time stamps when requested</a:t>
+              <a:t>Display menu when requested</a:t>
             </a:r>
           </a:p>
           <a:p>
@@ -6493,7 +6451,7 @@
               <a:rPr lang="en-US" sz="1200" cap="none" spc="0" dirty="0">
                 <a:cs typeface="Arial" panose="020B0604020202020204" pitchFamily="34" charset="0"/>
               </a:rPr>
-              <a:t>	-Password must meet defined password criteria</a:t>
+              <a:t>	-Display orders, bill, wait times,  and time stamps when requested</a:t>
             </a:r>
           </a:p>
           <a:p>
@@ -6502,26 +6460,11 @@
               <a:rPr lang="en-US" sz="1200" cap="none" spc="0" dirty="0">
                 <a:cs typeface="Arial" panose="020B0604020202020204" pitchFamily="34" charset="0"/>
               </a:rPr>
-              <a:t>	-Must not allow fault input to a field</a:t>
-            </a:r>
-          </a:p>
-          <a:p>
-            <a:pPr algn="l"/>
-            <a:r>
-              <a:rPr lang="en-US" sz="1200" cap="none" spc="0" dirty="0">
-                <a:cs typeface="Arial" panose="020B0604020202020204" pitchFamily="34" charset="0"/>
-              </a:rPr>
-              <a:t>	-Users must only be able to access what they have permission to see</a:t>
-            </a:r>
-          </a:p>
-          <a:p>
-            <a:pPr algn="l"/>
-            <a:r>
-              <a:rPr lang="en-US" sz="1200" cap="none" spc="0" dirty="0">
-                <a:cs typeface="Arial" panose="020B0604020202020204" pitchFamily="34" charset="0"/>
-              </a:rPr>
-              <a:t>	-The system should support enough logged in users at any given time to satisfy 	the restaurants requirements for access frequency</a:t>
-            </a:r>
+              <a:t>	-Allow user to login  when successfully entering in user and password</a:t>
+            </a:r>
+            <a:endParaRPr lang="en-US" sz="1200" spc="0" dirty="0">
+              <a:cs typeface="Arial" panose="020B0604020202020204" pitchFamily="34" charset="0"/>
+            </a:endParaRPr>
           </a:p>
           <a:p>
             <a:pPr marL="285750" indent="-285750" algn="l">
@@ -6547,7 +6490,7 @@
               <a:rPr lang="en-US" sz="1200" cap="none" spc="0" dirty="0">
                 <a:cs typeface="Arial" panose="020B0604020202020204" pitchFamily="34" charset="0"/>
               </a:rPr>
-              <a:t>Can scale the restaurant table display volume and placement based on 	remodeling and rearrangement)</a:t>
+              <a:t>Use 2fa for manager login to secure admin privileges (two factor 	authentication)</a:t>
             </a:r>
           </a:p>
           <a:p>
@@ -6556,7 +6499,7 @@
               <a:rPr lang="en-US" sz="1200" cap="none" spc="0" dirty="0">
                 <a:cs typeface="Arial" panose="020B0604020202020204" pitchFamily="34" charset="0"/>
               </a:rPr>
-              <a:t>	-Use of local database for efficiency and external/cloud-based database for long 	term data collection for aggregation	</a:t>
+              <a:t>	-Keep track of volume over time to create a predictive model for future use</a:t>
             </a:r>
           </a:p>
           <a:p>
@@ -6565,14 +6508,44 @@
               <a:rPr lang="en-US" sz="1200" cap="none" spc="0" dirty="0">
                 <a:cs typeface="Arial" panose="020B0604020202020204" pitchFamily="34" charset="0"/>
               </a:rPr>
-              <a:t>	- Keep track of each table as an object with data attributes such as item orders 	per seat, bill cost, wait time</a:t>
+              <a:t>	- Require user log back in after tablet/device is idle for more than 60 seconds</a:t>
+            </a:r>
+          </a:p>
+          <a:p>
+            <a:pPr marL="285750" indent="-285750" algn="l">
+              <a:buFont typeface="Arial" panose="020B0604020202020204" pitchFamily="34" charset="0"/>
+              <a:buChar char="•"/>
+            </a:pPr>
+            <a:r>
+              <a:rPr lang="en-US" sz="1200" spc="0" dirty="0">
+                <a:cs typeface="Arial" panose="020B0604020202020204" pitchFamily="34" charset="0"/>
+              </a:rPr>
+              <a:t>Could:</a:t>
             </a:r>
           </a:p>
           <a:p>
             <a:pPr algn="l"/>
-            <a:endParaRPr lang="en-US" sz="1400" spc="0" dirty="0">
+            <a:r>
+              <a:rPr lang="en-US" sz="1200" spc="0" dirty="0">
+                <a:cs typeface="Arial" panose="020B0604020202020204" pitchFamily="34" charset="0"/>
+              </a:rPr>
+              <a:t>	-</a:t>
+            </a:r>
+            <a:r>
+              <a:rPr lang="en-US" sz="1200" cap="none" spc="0" dirty="0">
+                <a:cs typeface="Arial" panose="020B0604020202020204" pitchFamily="34" charset="0"/>
+              </a:rPr>
+              <a:t>Customer rewards program</a:t>
+            </a:r>
+          </a:p>
+          <a:p>
+            <a:pPr algn="l"/>
+            <a:endParaRPr lang="en-US" sz="1200" cap="none" spc="0" dirty="0">
               <a:cs typeface="Arial" panose="020B0604020202020204" pitchFamily="34" charset="0"/>
             </a:endParaRPr>
+          </a:p>
+          <a:p>
+            <a:endParaRPr lang="en-US" sz="1200" spc="0" dirty="0"/>
           </a:p>
         </p:txBody>
       </p:sp>
@@ -6609,7 +6582,7 @@
     </p:spTree>
     <p:extLst>
       <p:ext uri="{BB962C8B-B14F-4D97-AF65-F5344CB8AC3E}">
-        <p14:creationId xmlns:p14="http://schemas.microsoft.com/office/powerpoint/2010/main" val="3800372191"/>
+        <p14:creationId xmlns:p14="http://schemas.microsoft.com/office/powerpoint/2010/main" val="257715524"/>
       </p:ext>
     </p:extLst>
   </p:cSld>
@@ -6740,7 +6713,7 @@
               <a:rPr lang="en-US" sz="1200" b="1" u="sng" spc="0" dirty="0">
                 <a:cs typeface="Arial" panose="020B0604020202020204" pitchFamily="34" charset="0"/>
               </a:rPr>
-              <a:t>NON-Functional requirements (continued)</a:t>
+              <a:t>NON-Functional requirements</a:t>
             </a:r>
           </a:p>
           <a:p>
@@ -6752,35 +6725,110 @@
               <a:rPr lang="en-US" sz="1200" spc="0" dirty="0">
                 <a:cs typeface="Arial" panose="020B0604020202020204" pitchFamily="34" charset="0"/>
               </a:rPr>
-              <a:t>Could:</a:t>
-            </a:r>
-            <a:endParaRPr lang="en-US" sz="1200" cap="none" spc="0" dirty="0">
+              <a:t>Must:</a:t>
+            </a:r>
+          </a:p>
+          <a:p>
+            <a:pPr algn="l"/>
+            <a:r>
+              <a:rPr lang="en-US" sz="1200" spc="0" dirty="0">
+                <a:cs typeface="Arial" panose="020B0604020202020204" pitchFamily="34" charset="0"/>
+              </a:rPr>
+              <a:t>	-</a:t>
+            </a:r>
+            <a:r>
+              <a:rPr lang="en-US" sz="1200" cap="none" spc="0" dirty="0">
+                <a:cs typeface="Arial" panose="020B0604020202020204" pitchFamily="34" charset="0"/>
+              </a:rPr>
+              <a:t>Database should update in a timely manner to keep communication between 	users accurate	-Display orders, bill, wait times,  and time stamps when requested</a:t>
+            </a:r>
+          </a:p>
+          <a:p>
+            <a:pPr algn="l"/>
+            <a:r>
+              <a:rPr lang="en-US" sz="1200" cap="none" spc="0" dirty="0">
+                <a:cs typeface="Arial" panose="020B0604020202020204" pitchFamily="34" charset="0"/>
+              </a:rPr>
+              <a:t>	-Password must meet defined password criteria</a:t>
+            </a:r>
+          </a:p>
+          <a:p>
+            <a:pPr algn="l"/>
+            <a:r>
+              <a:rPr lang="en-US" sz="1200" cap="none" spc="0" dirty="0">
+                <a:cs typeface="Arial" panose="020B0604020202020204" pitchFamily="34" charset="0"/>
+              </a:rPr>
+              <a:t>	-Must not allow fault input to a field</a:t>
+            </a:r>
+          </a:p>
+          <a:p>
+            <a:pPr algn="l"/>
+            <a:r>
+              <a:rPr lang="en-US" sz="1200" cap="none" spc="0" dirty="0">
+                <a:cs typeface="Arial" panose="020B0604020202020204" pitchFamily="34" charset="0"/>
+              </a:rPr>
+              <a:t>	-Users must only be able to access what they have permission to see</a:t>
+            </a:r>
+          </a:p>
+          <a:p>
+            <a:pPr algn="l"/>
+            <a:r>
+              <a:rPr lang="en-US" sz="1200" cap="none" spc="0" dirty="0">
+                <a:cs typeface="Arial" panose="020B0604020202020204" pitchFamily="34" charset="0"/>
+              </a:rPr>
+              <a:t>	-The system should support enough logged in users at any given time to satisfy 	the restaurants requirements for access frequency</a:t>
+            </a:r>
+          </a:p>
+          <a:p>
+            <a:pPr marL="285750" indent="-285750" algn="l">
+              <a:buFont typeface="Arial" panose="020B0604020202020204" pitchFamily="34" charset="0"/>
+              <a:buChar char="•"/>
+            </a:pPr>
+            <a:r>
+              <a:rPr lang="en-US" sz="1200" spc="0" dirty="0">
+                <a:cs typeface="Arial" panose="020B0604020202020204" pitchFamily="34" charset="0"/>
+              </a:rPr>
+              <a:t>Should:</a:t>
+            </a:r>
+          </a:p>
+          <a:p>
+            <a:pPr algn="l"/>
+            <a:r>
+              <a:rPr lang="en-US" sz="1200" spc="0" dirty="0">
+                <a:cs typeface="Arial" panose="020B0604020202020204" pitchFamily="34" charset="0"/>
+              </a:rPr>
+              <a:t>	-</a:t>
+            </a:r>
+            <a:r>
+              <a:rPr lang="en-US" sz="1200" cap="none" spc="0" dirty="0">
+                <a:cs typeface="Arial" panose="020B0604020202020204" pitchFamily="34" charset="0"/>
+              </a:rPr>
+              <a:t>Can scale the restaurant table display volume and placement based on 	remodeling and rearrangement)</a:t>
+            </a:r>
+          </a:p>
+          <a:p>
+            <a:pPr algn="l"/>
+            <a:r>
+              <a:rPr lang="en-US" sz="1200" cap="none" spc="0" dirty="0">
+                <a:cs typeface="Arial" panose="020B0604020202020204" pitchFamily="34" charset="0"/>
+              </a:rPr>
+              <a:t>	-Use of local database for efficiency and external/cloud-based database for long 	term data collection for aggregation	</a:t>
+            </a:r>
+          </a:p>
+          <a:p>
+            <a:pPr algn="l"/>
+            <a:r>
+              <a:rPr lang="en-US" sz="1200" cap="none" spc="0" dirty="0">
+                <a:cs typeface="Arial" panose="020B0604020202020204" pitchFamily="34" charset="0"/>
+              </a:rPr>
+              <a:t>	- Keep track of each table as an object with data attributes such as item orders 	per seat, bill cost, wait time</a:t>
+            </a:r>
+          </a:p>
+          <a:p>
+            <a:pPr algn="l"/>
+            <a:endParaRPr lang="en-US" sz="1400" spc="0" dirty="0">
               <a:cs typeface="Arial" panose="020B0604020202020204" pitchFamily="34" charset="0"/>
             </a:endParaRPr>
-          </a:p>
-          <a:p>
-            <a:pPr algn="l"/>
-            <a:r>
-              <a:rPr lang="en-US" sz="1200" cap="none" spc="0" dirty="0">
-                <a:cs typeface="Arial" panose="020B0604020202020204" pitchFamily="34" charset="0"/>
-              </a:rPr>
-              <a:t>	-Use a third-party security/authentication system to avoid unwanted 	manipulation</a:t>
-            </a:r>
-          </a:p>
-          <a:p>
-            <a:pPr algn="l"/>
-            <a:r>
-              <a:rPr lang="en-US" sz="1400" spc="0" dirty="0">
-                <a:cs typeface="Arial" panose="020B0604020202020204" pitchFamily="34" charset="0"/>
-              </a:rPr>
-              <a:t>	- </a:t>
-            </a:r>
-            <a:r>
-              <a:rPr lang="en-US" sz="1200" cap="none" spc="0" dirty="0">
-                <a:cs typeface="Arial" panose="020B0604020202020204" pitchFamily="34" charset="0"/>
-              </a:rPr>
-              <a:t>Implement customer rewards program with customer email</a:t>
-            </a:r>
           </a:p>
         </p:txBody>
       </p:sp>
@@ -6809,6 +6857,214 @@
               <a:rPr lang="en-US" smtClean="0"/>
               <a:pPr/>
               <a:t>13</a:t>
+            </a:fld>
+            <a:endParaRPr lang="en-US" dirty="0"/>
+          </a:p>
+        </p:txBody>
+      </p:sp>
+    </p:spTree>
+    <p:extLst>
+      <p:ext uri="{BB962C8B-B14F-4D97-AF65-F5344CB8AC3E}">
+        <p14:creationId xmlns:p14="http://schemas.microsoft.com/office/powerpoint/2010/main" val="3800372191"/>
+      </p:ext>
+    </p:extLst>
+  </p:cSld>
+  <p:clrMapOvr>
+    <a:masterClrMapping/>
+  </p:clrMapOvr>
+</p:sld>
+</file>
+
+<file path=ppt/slides/slide14.xml><?xml version="1.0" encoding="utf-8"?>
+<p:sld xmlns:a="http://schemas.openxmlformats.org/drawingml/2006/main" xmlns:r="http://schemas.openxmlformats.org/officeDocument/2006/relationships" xmlns:p="http://schemas.openxmlformats.org/presentationml/2006/main">
+  <p:cSld>
+    <p:spTree>
+      <p:nvGrpSpPr>
+        <p:cNvPr id="1" name=""/>
+        <p:cNvGrpSpPr/>
+        <p:nvPr/>
+      </p:nvGrpSpPr>
+      <p:grpSpPr>
+        <a:xfrm>
+          <a:off x="0" y="0"/>
+          <a:ext cx="0" cy="0"/>
+          <a:chOff x="0" y="0"/>
+          <a:chExt cx="0" cy="0"/>
+        </a:xfrm>
+      </p:grpSpPr>
+      <p:sp>
+        <p:nvSpPr>
+          <p:cNvPr id="3" name="Title 2">
+            <a:extLst>
+              <a:ext uri="{FF2B5EF4-FFF2-40B4-BE49-F238E27FC236}">
+                <a16:creationId xmlns:a16="http://schemas.microsoft.com/office/drawing/2014/main" id="{1D24B42B-925B-494C-A986-BD85E8117E1E}"/>
+              </a:ext>
+            </a:extLst>
+          </p:cNvPr>
+          <p:cNvSpPr>
+            <a:spLocks noGrp="1"/>
+          </p:cNvSpPr>
+          <p:nvPr>
+            <p:ph type="title"/>
+          </p:nvPr>
+        </p:nvSpPr>
+        <p:spPr>
+          <a:xfrm>
+            <a:off x="6227184" y="142613"/>
+            <a:ext cx="5766033" cy="1231302"/>
+          </a:xfrm>
+        </p:spPr>
+        <p:txBody>
+          <a:bodyPr>
+            <a:normAutofit/>
+          </a:bodyPr>
+          <a:lstStyle/>
+          <a:p>
+            <a:r>
+              <a:rPr lang="en-US" sz="3600" dirty="0"/>
+              <a:t>Requirement Specifications</a:t>
+            </a:r>
+          </a:p>
+        </p:txBody>
+      </p:sp>
+      <p:pic>
+        <p:nvPicPr>
+          <p:cNvPr id="13" name="Picture Placeholder 12" descr="close up of computer on top of table against a brick wall">
+            <a:extLst>
+              <a:ext uri="{FF2B5EF4-FFF2-40B4-BE49-F238E27FC236}">
+                <a16:creationId xmlns:a16="http://schemas.microsoft.com/office/drawing/2014/main" id="{90BB9493-60B4-4B89-89CE-E1F8BF6C4D12}"/>
+              </a:ext>
+            </a:extLst>
+          </p:cNvPr>
+          <p:cNvPicPr>
+            <a:picLocks noGrp="1" noChangeAspect="1"/>
+          </p:cNvPicPr>
+          <p:nvPr>
+            <p:ph type="pic" sz="quarter" idx="13"/>
+          </p:nvPr>
+        </p:nvPicPr>
+        <p:blipFill rotWithShape="1">
+          <a:blip r:embed="rId2" cstate="email">
+            <a:extLst>
+              <a:ext uri="{BEBA8EAE-BF5A-486C-A8C5-ECC9F3942E4B}">
+                <a14:imgProps xmlns:a14="http://schemas.microsoft.com/office/drawing/2010/main">
+                  <a14:imgLayer r:embed="rId3">
+                    <a14:imgEffect>
+                      <a14:saturation sat="0"/>
+                    </a14:imgEffect>
+                  </a14:imgLayer>
+                </a14:imgProps>
+              </a:ext>
+              <a:ext uri="{28A0092B-C50C-407E-A947-70E740481C1C}">
+                <a14:useLocalDpi xmlns:a14="http://schemas.microsoft.com/office/drawing/2010/main"/>
+              </a:ext>
+            </a:extLst>
+          </a:blip>
+          <a:srcRect l="20370" r="20370"/>
+          <a:stretch/>
+        </p:blipFill>
+        <p:spPr/>
+      </p:pic>
+      <p:sp>
+        <p:nvSpPr>
+          <p:cNvPr id="5" name="Text Placeholder 4">
+            <a:extLst>
+              <a:ext uri="{FF2B5EF4-FFF2-40B4-BE49-F238E27FC236}">
+                <a16:creationId xmlns:a16="http://schemas.microsoft.com/office/drawing/2014/main" id="{AF9B872F-6332-408E-9135-B871F0C90C00}"/>
+              </a:ext>
+            </a:extLst>
+          </p:cNvPr>
+          <p:cNvSpPr>
+            <a:spLocks noGrp="1"/>
+          </p:cNvSpPr>
+          <p:nvPr>
+            <p:ph type="body" idx="1"/>
+          </p:nvPr>
+        </p:nvSpPr>
+        <p:spPr>
+          <a:xfrm>
+            <a:off x="5766032" y="1518408"/>
+            <a:ext cx="6096000" cy="4882392"/>
+          </a:xfrm>
+        </p:spPr>
+        <p:txBody>
+          <a:bodyPr/>
+          <a:lstStyle/>
+          <a:p>
+            <a:pPr algn="l"/>
+            <a:r>
+              <a:rPr lang="en-US" sz="1200" b="1" u="sng" spc="0" dirty="0">
+                <a:cs typeface="Arial" panose="020B0604020202020204" pitchFamily="34" charset="0"/>
+              </a:rPr>
+              <a:t>NON-Functional requirements (continued)</a:t>
+            </a:r>
+          </a:p>
+          <a:p>
+            <a:pPr marL="285750" indent="-285750" algn="l">
+              <a:buFont typeface="Arial" panose="020B0604020202020204" pitchFamily="34" charset="0"/>
+              <a:buChar char="•"/>
+            </a:pPr>
+            <a:r>
+              <a:rPr lang="en-US" sz="1200" spc="0" dirty="0">
+                <a:cs typeface="Arial" panose="020B0604020202020204" pitchFamily="34" charset="0"/>
+              </a:rPr>
+              <a:t>Could:</a:t>
+            </a:r>
+            <a:endParaRPr lang="en-US" sz="1200" cap="none" spc="0" dirty="0">
+              <a:cs typeface="Arial" panose="020B0604020202020204" pitchFamily="34" charset="0"/>
+            </a:endParaRPr>
+          </a:p>
+          <a:p>
+            <a:pPr algn="l"/>
+            <a:r>
+              <a:rPr lang="en-US" sz="1200" cap="none" spc="0" dirty="0">
+                <a:cs typeface="Arial" panose="020B0604020202020204" pitchFamily="34" charset="0"/>
+              </a:rPr>
+              <a:t>	-Use a third-party security/authentication system to avoid unwanted 	manipulation</a:t>
+            </a:r>
+          </a:p>
+          <a:p>
+            <a:pPr algn="l"/>
+            <a:r>
+              <a:rPr lang="en-US" sz="1400" spc="0" dirty="0">
+                <a:cs typeface="Arial" panose="020B0604020202020204" pitchFamily="34" charset="0"/>
+              </a:rPr>
+              <a:t>	- </a:t>
+            </a:r>
+            <a:r>
+              <a:rPr lang="en-US" sz="1200" cap="none" spc="0" dirty="0">
+                <a:cs typeface="Arial" panose="020B0604020202020204" pitchFamily="34" charset="0"/>
+              </a:rPr>
+              <a:t>Implement customer rewards program with customer email</a:t>
+            </a:r>
+          </a:p>
+        </p:txBody>
+      </p:sp>
+      <p:sp>
+        <p:nvSpPr>
+          <p:cNvPr id="2" name="Slide Number Placeholder 1">
+            <a:extLst>
+              <a:ext uri="{FF2B5EF4-FFF2-40B4-BE49-F238E27FC236}">
+                <a16:creationId xmlns:a16="http://schemas.microsoft.com/office/drawing/2014/main" id="{948DD8A0-BD53-4DBF-949B-0D64D12DADA9}"/>
+              </a:ext>
+            </a:extLst>
+          </p:cNvPr>
+          <p:cNvSpPr>
+            <a:spLocks noGrp="1"/>
+          </p:cNvSpPr>
+          <p:nvPr>
+            <p:ph type="sldNum" sz="quarter" idx="12"/>
+          </p:nvPr>
+        </p:nvSpPr>
+        <p:spPr/>
+        <p:txBody>
+          <a:bodyPr/>
+          <a:lstStyle/>
+          <a:p>
+            <a:fld id="{8C2E478F-E849-4A8C-AF1F-CBCC78A7CBFA}" type="slidenum">
+              <a:rPr lang="en-US" smtClean="0"/>
+              <a:pPr/>
+              <a:t>14</a:t>
             </a:fld>
             <a:endParaRPr lang="en-US" dirty="0"/>
           </a:p>
@@ -6827,7 +7083,7 @@
 </p:sld>
 </file>
 
-<file path=ppt/slides/slide14.xml><?xml version="1.0" encoding="utf-8"?>
+<file path=ppt/slides/slide15.xml><?xml version="1.0" encoding="utf-8"?>
 <p:sld xmlns:a="http://schemas.openxmlformats.org/drawingml/2006/main" xmlns:r="http://schemas.openxmlformats.org/officeDocument/2006/relationships" xmlns:p="http://schemas.openxmlformats.org/presentationml/2006/main">
   <p:cSld>
     <p:spTree>
@@ -7523,7 +7779,7 @@
             <a:fld id="{8C2E478F-E849-4A8C-AF1F-CBCC78A7CBFA}" type="slidenum">
               <a:rPr lang="en-US" smtClean="0"/>
               <a:pPr/>
-              <a:t>14</a:t>
+              <a:t>15</a:t>
             </a:fld>
             <a:endParaRPr lang="en-US" dirty="0"/>
           </a:p>
@@ -7542,7 +7798,7 @@
 </p:sld>
 </file>
 
-<file path=ppt/slides/slide15.xml><?xml version="1.0" encoding="utf-8"?>
+<file path=ppt/slides/slide16.xml><?xml version="1.0" encoding="utf-8"?>
 <p:sld xmlns:a="http://schemas.openxmlformats.org/drawingml/2006/main" xmlns:r="http://schemas.openxmlformats.org/officeDocument/2006/relationships" xmlns:p="http://schemas.openxmlformats.org/presentationml/2006/main">
   <p:cSld>
     <p:spTree>
@@ -7763,7 +8019,7 @@
             <a:fld id="{8C2E478F-E849-4A8C-AF1F-CBCC78A7CBFA}" type="slidenum">
               <a:rPr lang="en-US" smtClean="0"/>
               <a:pPr/>
-              <a:t>15</a:t>
+              <a:t>16</a:t>
             </a:fld>
             <a:endParaRPr lang="en-US" dirty="0"/>
           </a:p>
@@ -7782,7 +8038,7 @@
 </p:sld>
 </file>
 
-<file path=ppt/slides/slide16.xml><?xml version="1.0" encoding="utf-8"?>
+<file path=ppt/slides/slide17.xml><?xml version="1.0" encoding="utf-8"?>
 <p:sld xmlns:a="http://schemas.openxmlformats.org/drawingml/2006/main" xmlns:r="http://schemas.openxmlformats.org/officeDocument/2006/relationships" xmlns:p="http://schemas.openxmlformats.org/presentationml/2006/main">
   <p:cSld>
     <p:spTree>
@@ -8271,7 +8527,7 @@
             <a:fld id="{8C2E478F-E849-4A8C-AF1F-CBCC78A7CBFA}" type="slidenum">
               <a:rPr lang="en-US" smtClean="0"/>
               <a:pPr/>
-              <a:t>16</a:t>
+              <a:t>17</a:t>
             </a:fld>
             <a:endParaRPr lang="en-US" dirty="0"/>
           </a:p>
@@ -8290,7 +8546,7 @@
 </p:sld>
 </file>
 
-<file path=ppt/slides/slide17.xml><?xml version="1.0" encoding="utf-8"?>
+<file path=ppt/slides/slide18.xml><?xml version="1.0" encoding="utf-8"?>
 <p:sld xmlns:a="http://schemas.openxmlformats.org/drawingml/2006/main" xmlns:r="http://schemas.openxmlformats.org/officeDocument/2006/relationships" xmlns:p="http://schemas.openxmlformats.org/presentationml/2006/main">
   <p:cSld>
     <p:spTree>
@@ -8398,8 +8654,8 @@
         </p:nvSpPr>
         <p:spPr>
           <a:xfrm>
-            <a:off x="6086167" y="673514"/>
-            <a:ext cx="5690532" cy="4949971"/>
+            <a:off x="5734056" y="1061678"/>
+            <a:ext cx="6259161" cy="4668561"/>
           </a:xfrm>
         </p:spPr>
         <p:txBody>
@@ -8426,7 +8682,7 @@
               <a:defRPr/>
             </a:pPr>
             <a:r>
-              <a:rPr kumimoji="0" lang="en-US" sz="2000" b="0" i="0" u="none" strike="noStrike" kern="1200" cap="none" normalizeH="0" noProof="0" dirty="0">
+              <a:rPr kumimoji="0" lang="en-US" sz="2000" b="0" i="0" u="sng" strike="noStrike" kern="1200" cap="none" normalizeH="0" noProof="0" dirty="0">
                 <a:ln>
                   <a:noFill/>
                 </a:ln>
@@ -8626,13 +8882,7 @@
               <a:tabLst/>
               <a:defRPr/>
             </a:pPr>
-            <a:r>
-              <a:rPr lang="en-US" sz="2000" dirty="0">
-                <a:cs typeface="Biome Light" panose="020B0303030204020804" pitchFamily="34" charset="0"/>
-              </a:rPr>
-              <a:t>Data Flow Diagram</a:t>
-            </a:r>
-            <a:endParaRPr kumimoji="0" lang="en-US" sz="2000" b="0" i="0" u="none" strike="noStrike" kern="1200" cap="none" normalizeH="0" noProof="0" dirty="0">
+            <a:endParaRPr kumimoji="0" lang="en-US" sz="1600" b="0" i="0" u="none" strike="noStrike" kern="1200" cap="none" normalizeH="0" noProof="0" dirty="0">
               <a:ln>
                 <a:noFill/>
               </a:ln>
@@ -8648,41 +8898,206 @@
             </a:endParaRPr>
           </a:p>
           <a:p>
-            <a:pPr marL="0" marR="0" lvl="0" indent="0" algn="l" defTabSz="914400" rtl="0" eaLnBrk="1" fontAlgn="auto" latinLnBrk="0" hangingPunct="1">
-              <a:lnSpc>
-                <a:spcPct val="100000"/>
-              </a:lnSpc>
-              <a:spcBef>
-                <a:spcPts val="1000"/>
-              </a:spcBef>
-              <a:spcAft>
-                <a:spcPts val="0"/>
-              </a:spcAft>
-              <a:buClrTx/>
-              <a:buSzTx/>
-              <a:buFont typeface="Arial" panose="020B0604020202020204" pitchFamily="34" charset="0"/>
+            <a:pPr marL="0" indent="0">
               <a:buNone/>
-              <a:tabLst/>
-              <a:defRPr/>
             </a:pPr>
-            <a:r>
-              <a:rPr kumimoji="0" lang="en-US" sz="1600" b="0" i="0" u="none" strike="noStrike" kern="1200" cap="none" normalizeH="0" noProof="0" dirty="0">
-                <a:ln>
-                  <a:noFill/>
-                </a:ln>
-                <a:solidFill>
-                  <a:schemeClr val="tx1"/>
-                </a:solidFill>
-                <a:effectLst/>
-                <a:uLnTx/>
-                <a:uFillTx/>
-                <a:latin typeface="+mn-lt"/>
-                <a:ea typeface="+mn-ea"/>
-                <a:cs typeface="Biome Light" panose="020B0303030204020804" pitchFamily="34" charset="0"/>
-              </a:rPr>
-              <a:t>Customer satisfaction increased from 70 to 80%</a:t>
-            </a:r>
-          </a:p>
+            <a:endParaRPr lang="en-US" b="1" dirty="0"/>
+          </a:p>
+        </p:txBody>
+      </p:sp>
+      <p:sp>
+        <p:nvSpPr>
+          <p:cNvPr id="16" name="Slide Number Placeholder 15">
+            <a:extLst>
+              <a:ext uri="{FF2B5EF4-FFF2-40B4-BE49-F238E27FC236}">
+                <a16:creationId xmlns:a16="http://schemas.microsoft.com/office/drawing/2014/main" id="{7FA57D11-A25F-4772-8E50-DDB68BE8CB69}"/>
+              </a:ext>
+            </a:extLst>
+          </p:cNvPr>
+          <p:cNvSpPr>
+            <a:spLocks noGrp="1"/>
+          </p:cNvSpPr>
+          <p:nvPr>
+            <p:ph type="sldNum" sz="quarter" idx="4"/>
+          </p:nvPr>
+        </p:nvSpPr>
+        <p:spPr/>
+        <p:txBody>
+          <a:bodyPr/>
+          <a:lstStyle/>
+          <a:p>
+            <a:fld id="{8C2E478F-E849-4A8C-AF1F-CBCC78A7CBFA}" type="slidenum">
+              <a:rPr lang="en-US" smtClean="0"/>
+              <a:pPr/>
+              <a:t>18</a:t>
+            </a:fld>
+            <a:endParaRPr lang="en-US" dirty="0"/>
+          </a:p>
+        </p:txBody>
+      </p:sp>
+      <p:pic>
+        <p:nvPicPr>
+          <p:cNvPr id="7" name="Picture 6"/>
+          <p:cNvPicPr/>
+          <p:nvPr/>
+        </p:nvPicPr>
+        <p:blipFill>
+          <a:blip r:embed="rId5">
+            <a:extLst>
+              <a:ext uri="{28A0092B-C50C-407E-A947-70E740481C1C}">
+                <a14:useLocalDpi xmlns:a14="http://schemas.microsoft.com/office/drawing/2010/main" val="0"/>
+              </a:ext>
+            </a:extLst>
+          </a:blip>
+          <a:srcRect/>
+          <a:stretch>
+            <a:fillRect/>
+          </a:stretch>
+        </p:blipFill>
+        <p:spPr bwMode="auto">
+          <a:xfrm>
+            <a:off x="5870682" y="1658916"/>
+            <a:ext cx="6122535" cy="3801358"/>
+          </a:xfrm>
+          <a:prstGeom prst="rect">
+            <a:avLst/>
+          </a:prstGeom>
+          <a:noFill/>
+          <a:ln>
+            <a:noFill/>
+          </a:ln>
+        </p:spPr>
+      </p:pic>
+    </p:spTree>
+    <p:extLst>
+      <p:ext uri="{BB962C8B-B14F-4D97-AF65-F5344CB8AC3E}">
+        <p14:creationId xmlns:p14="http://schemas.microsoft.com/office/powerpoint/2010/main" val="692636852"/>
+      </p:ext>
+    </p:extLst>
+  </p:cSld>
+  <p:clrMapOvr>
+    <a:masterClrMapping/>
+  </p:clrMapOvr>
+</p:sld>
+</file>
+
+<file path=ppt/slides/slide19.xml><?xml version="1.0" encoding="utf-8"?>
+<p:sld xmlns:a="http://schemas.openxmlformats.org/drawingml/2006/main" xmlns:r="http://schemas.openxmlformats.org/officeDocument/2006/relationships" xmlns:p="http://schemas.openxmlformats.org/presentationml/2006/main">
+  <p:cSld>
+    <p:spTree>
+      <p:nvGrpSpPr>
+        <p:cNvPr id="1" name=""/>
+        <p:cNvGrpSpPr/>
+        <p:nvPr/>
+      </p:nvGrpSpPr>
+      <p:grpSpPr>
+        <a:xfrm>
+          <a:off x="0" y="0"/>
+          <a:ext cx="0" cy="0"/>
+          <a:chOff x="0" y="0"/>
+          <a:chExt cx="0" cy="0"/>
+        </a:xfrm>
+      </p:grpSpPr>
+      <p:sp>
+        <p:nvSpPr>
+          <p:cNvPr id="2" name="Title 1">
+            <a:extLst>
+              <a:ext uri="{FF2B5EF4-FFF2-40B4-BE49-F238E27FC236}">
+                <a16:creationId xmlns:a16="http://schemas.microsoft.com/office/drawing/2014/main" id="{12CC3376-5069-4C7B-BE6B-A3776D1B47BA}"/>
+              </a:ext>
+            </a:extLst>
+          </p:cNvPr>
+          <p:cNvSpPr>
+            <a:spLocks noGrp="1"/>
+          </p:cNvSpPr>
+          <p:nvPr>
+            <p:ph type="title"/>
+          </p:nvPr>
+        </p:nvSpPr>
+        <p:spPr>
+          <a:xfrm>
+            <a:off x="6095999" y="35082"/>
+            <a:ext cx="5897218" cy="884238"/>
+          </a:xfrm>
+        </p:spPr>
+        <p:txBody>
+          <a:bodyPr/>
+          <a:lstStyle/>
+          <a:p>
+            <a:r>
+              <a:rPr lang="en-US" dirty="0"/>
+              <a:t>High Level Design</a:t>
+            </a:r>
+          </a:p>
+        </p:txBody>
+      </p:sp>
+      <p:pic>
+        <p:nvPicPr>
+          <p:cNvPr id="6" name="Picture Placeholder 5" descr="person staring at blueprints on a brick wall">
+            <a:extLst>
+              <a:ext uri="{FF2B5EF4-FFF2-40B4-BE49-F238E27FC236}">
+                <a16:creationId xmlns:a16="http://schemas.microsoft.com/office/drawing/2014/main" id="{C07C315A-7CD1-432C-92FA-6B62159B56CA}"/>
+              </a:ext>
+            </a:extLst>
+          </p:cNvPr>
+          <p:cNvPicPr>
+            <a:picLocks noGrp="1" noChangeAspect="1"/>
+          </p:cNvPicPr>
+          <p:nvPr>
+            <p:ph type="pic" sz="quarter" idx="14"/>
+          </p:nvPr>
+        </p:nvPicPr>
+        <p:blipFill rotWithShape="1">
+          <a:blip r:embed="rId3">
+            <a:extLst>
+              <a:ext uri="{BEBA8EAE-BF5A-486C-A8C5-ECC9F3942E4B}">
+                <a14:imgProps xmlns:a14="http://schemas.microsoft.com/office/drawing/2010/main">
+                  <a14:imgLayer r:embed="rId4">
+                    <a14:imgEffect>
+                      <a14:saturation sat="0"/>
+                    </a14:imgEffect>
+                  </a14:imgLayer>
+                </a14:imgProps>
+              </a:ext>
+            </a:extLst>
+          </a:blip>
+          <a:srcRect l="23552" t="1" r="23880" b="327"/>
+          <a:stretch/>
+        </p:blipFill>
+        <p:spPr>
+          <a:xfrm>
+            <a:off x="0" y="0"/>
+            <a:ext cx="5416550" cy="6858000"/>
+          </a:xfrm>
+        </p:spPr>
+      </p:pic>
+      <p:sp>
+        <p:nvSpPr>
+          <p:cNvPr id="14" name="Content Placeholder 13">
+            <a:extLst>
+              <a:ext uri="{FF2B5EF4-FFF2-40B4-BE49-F238E27FC236}">
+                <a16:creationId xmlns:a16="http://schemas.microsoft.com/office/drawing/2014/main" id="{79248A72-A597-48DF-A270-3389F5D209C0}"/>
+              </a:ext>
+            </a:extLst>
+          </p:cNvPr>
+          <p:cNvSpPr>
+            <a:spLocks noGrp="1"/>
+          </p:cNvSpPr>
+          <p:nvPr>
+            <p:ph idx="1"/>
+          </p:nvPr>
+        </p:nvSpPr>
+        <p:spPr>
+          <a:xfrm>
+            <a:off x="6086167" y="1071154"/>
+            <a:ext cx="5690532" cy="4552331"/>
+          </a:xfrm>
+        </p:spPr>
+        <p:txBody>
+          <a:bodyPr>
+            <a:normAutofit/>
+          </a:bodyPr>
+          <a:lstStyle/>
           <a:p>
             <a:pPr marL="0" marR="0" lvl="0" indent="0" algn="l" defTabSz="914400" rtl="0" eaLnBrk="1" fontAlgn="auto" latinLnBrk="0" hangingPunct="1">
               <a:lnSpc>
@@ -8717,6 +9132,114 @@
             </a:endParaRPr>
           </a:p>
           <a:p>
+            <a:pPr marL="0" marR="0" lvl="0" indent="0" algn="l" defTabSz="914400" rtl="0" eaLnBrk="1" fontAlgn="auto" latinLnBrk="0" hangingPunct="1">
+              <a:lnSpc>
+                <a:spcPct val="100000"/>
+              </a:lnSpc>
+              <a:spcBef>
+                <a:spcPts val="1000"/>
+              </a:spcBef>
+              <a:spcAft>
+                <a:spcPts val="0"/>
+              </a:spcAft>
+              <a:buClrTx/>
+              <a:buSzTx/>
+              <a:buFont typeface="Arial" panose="020B0604020202020204" pitchFamily="34" charset="0"/>
+              <a:buNone/>
+              <a:tabLst/>
+              <a:defRPr/>
+            </a:pPr>
+            <a:r>
+              <a:rPr lang="en-US" sz="2000" dirty="0">
+                <a:cs typeface="Biome Light" panose="020B0303030204020804" pitchFamily="34" charset="0"/>
+              </a:rPr>
+              <a:t>Data Flow Diagram</a:t>
+            </a:r>
+            <a:endParaRPr kumimoji="0" lang="en-US" sz="2000" b="0" i="0" u="none" strike="noStrike" kern="1200" cap="none" normalizeH="0" noProof="0" dirty="0">
+              <a:ln>
+                <a:noFill/>
+              </a:ln>
+              <a:solidFill>
+                <a:schemeClr val="tx1"/>
+              </a:solidFill>
+              <a:effectLst/>
+              <a:uLnTx/>
+              <a:uFillTx/>
+              <a:latin typeface="+mn-lt"/>
+              <a:ea typeface="+mn-ea"/>
+              <a:cs typeface="Biome Light" panose="020B0303030204020804" pitchFamily="34" charset="0"/>
+            </a:endParaRPr>
+          </a:p>
+          <a:p>
+            <a:pPr marL="0" marR="0" lvl="0" indent="0" algn="l" defTabSz="914400" rtl="0" eaLnBrk="1" fontAlgn="auto" latinLnBrk="0" hangingPunct="1">
+              <a:lnSpc>
+                <a:spcPct val="100000"/>
+              </a:lnSpc>
+              <a:spcBef>
+                <a:spcPts val="1000"/>
+              </a:spcBef>
+              <a:spcAft>
+                <a:spcPts val="0"/>
+              </a:spcAft>
+              <a:buClrTx/>
+              <a:buSzTx/>
+              <a:buFont typeface="Arial" panose="020B0604020202020204" pitchFamily="34" charset="0"/>
+              <a:buNone/>
+              <a:tabLst/>
+              <a:defRPr/>
+            </a:pPr>
+            <a:r>
+              <a:rPr kumimoji="0" lang="en-US" sz="1600" b="0" i="0" u="none" strike="noStrike" kern="1200" cap="none" normalizeH="0" noProof="0" dirty="0">
+                <a:ln>
+                  <a:noFill/>
+                </a:ln>
+                <a:solidFill>
+                  <a:schemeClr val="tx1"/>
+                </a:solidFill>
+                <a:effectLst/>
+                <a:uLnTx/>
+                <a:uFillTx/>
+                <a:latin typeface="+mn-lt"/>
+                <a:ea typeface="+mn-ea"/>
+                <a:cs typeface="Biome Light" panose="020B0303030204020804" pitchFamily="34" charset="0"/>
+              </a:rPr>
+              <a:t>Customer satisfaction increased from 70 to 80%</a:t>
+            </a:r>
+          </a:p>
+          <a:p>
+            <a:pPr marL="0" marR="0" lvl="0" indent="0" algn="l" defTabSz="914400" rtl="0" eaLnBrk="1" fontAlgn="auto" latinLnBrk="0" hangingPunct="1">
+              <a:lnSpc>
+                <a:spcPct val="100000"/>
+              </a:lnSpc>
+              <a:spcBef>
+                <a:spcPts val="1000"/>
+              </a:spcBef>
+              <a:spcAft>
+                <a:spcPts val="0"/>
+              </a:spcAft>
+              <a:buClrTx/>
+              <a:buSzTx/>
+              <a:buFont typeface="Arial" panose="020B0604020202020204" pitchFamily="34" charset="0"/>
+              <a:buNone/>
+              <a:tabLst/>
+              <a:defRPr/>
+            </a:pPr>
+            <a:endParaRPr kumimoji="0" lang="en-US" sz="1600" b="0" i="0" u="none" strike="noStrike" kern="1200" cap="none" normalizeH="0" noProof="0" dirty="0">
+              <a:ln>
+                <a:noFill/>
+              </a:ln>
+              <a:solidFill>
+                <a:schemeClr val="tx1"/>
+              </a:solidFill>
+              <a:effectLst/>
+              <a:uLnTx/>
+              <a:uFillTx/>
+              <a:latin typeface="+mn-lt"/>
+              <a:ea typeface="+mn-ea"/>
+              <a:cs typeface="Biome Light" panose="020B0303030204020804" pitchFamily="34" charset="0"/>
+            </a:endParaRPr>
+          </a:p>
+          <a:p>
             <a:pPr marL="0" indent="0">
               <a:buNone/>
             </a:pPr>
@@ -8738,516 +9261,6 @@
           </p:cNvSpPr>
           <p:nvPr>
             <p:ph type="sldNum" sz="quarter" idx="4"/>
-          </p:nvPr>
-        </p:nvSpPr>
-        <p:spPr/>
-        <p:txBody>
-          <a:bodyPr/>
-          <a:lstStyle/>
-          <a:p>
-            <a:fld id="{8C2E478F-E849-4A8C-AF1F-CBCC78A7CBFA}" type="slidenum">
-              <a:rPr lang="en-US" smtClean="0"/>
-              <a:pPr/>
-              <a:t>17</a:t>
-            </a:fld>
-            <a:endParaRPr lang="en-US" dirty="0"/>
-          </a:p>
-        </p:txBody>
-      </p:sp>
-      <p:pic>
-        <p:nvPicPr>
-          <p:cNvPr id="7" name="Picture 6"/>
-          <p:cNvPicPr/>
-          <p:nvPr/>
-        </p:nvPicPr>
-        <p:blipFill>
-          <a:blip r:embed="rId5">
-            <a:extLst>
-              <a:ext uri="{28A0092B-C50C-407E-A947-70E740481C1C}">
-                <a14:useLocalDpi xmlns:a14="http://schemas.microsoft.com/office/drawing/2010/main" val="0"/>
-              </a:ext>
-            </a:extLst>
-          </a:blip>
-          <a:srcRect/>
-          <a:stretch>
-            <a:fillRect/>
-          </a:stretch>
-        </p:blipFill>
-        <p:spPr bwMode="auto">
-          <a:xfrm>
-            <a:off x="6657692" y="1061679"/>
-            <a:ext cx="3813664" cy="2182967"/>
-          </a:xfrm>
-          <a:prstGeom prst="rect">
-            <a:avLst/>
-          </a:prstGeom>
-          <a:noFill/>
-          <a:ln>
-            <a:noFill/>
-          </a:ln>
-        </p:spPr>
-      </p:pic>
-    </p:spTree>
-    <p:extLst>
-      <p:ext uri="{BB962C8B-B14F-4D97-AF65-F5344CB8AC3E}">
-        <p14:creationId xmlns:p14="http://schemas.microsoft.com/office/powerpoint/2010/main" val="692636852"/>
-      </p:ext>
-    </p:extLst>
-  </p:cSld>
-  <p:clrMapOvr>
-    <a:masterClrMapping/>
-  </p:clrMapOvr>
-</p:sld>
-</file>
-
-<file path=ppt/slides/slide18.xml><?xml version="1.0" encoding="utf-8"?>
-<p:sld xmlns:a="http://schemas.openxmlformats.org/drawingml/2006/main" xmlns:r="http://schemas.openxmlformats.org/officeDocument/2006/relationships" xmlns:p="http://schemas.openxmlformats.org/presentationml/2006/main">
-  <p:cSld>
-    <p:spTree>
-      <p:nvGrpSpPr>
-        <p:cNvPr id="1" name=""/>
-        <p:cNvGrpSpPr/>
-        <p:nvPr/>
-      </p:nvGrpSpPr>
-      <p:grpSpPr>
-        <a:xfrm>
-          <a:off x="0" y="0"/>
-          <a:ext cx="0" cy="0"/>
-          <a:chOff x="0" y="0"/>
-          <a:chExt cx="0" cy="0"/>
-        </a:xfrm>
-      </p:grpSpPr>
-      <p:sp>
-        <p:nvSpPr>
-          <p:cNvPr id="3" name="Title 2">
-            <a:extLst>
-              <a:ext uri="{FF2B5EF4-FFF2-40B4-BE49-F238E27FC236}">
-                <a16:creationId xmlns:a16="http://schemas.microsoft.com/office/drawing/2014/main" id="{1D24B42B-925B-494C-A986-BD85E8117E1E}"/>
-              </a:ext>
-            </a:extLst>
-          </p:cNvPr>
-          <p:cNvSpPr>
-            <a:spLocks noGrp="1"/>
-          </p:cNvSpPr>
-          <p:nvPr>
-            <p:ph type="title"/>
-          </p:nvPr>
-        </p:nvSpPr>
-        <p:spPr>
-          <a:xfrm>
-            <a:off x="6258991" y="151788"/>
-            <a:ext cx="5251450" cy="975869"/>
-          </a:xfrm>
-        </p:spPr>
-        <p:txBody>
-          <a:bodyPr>
-            <a:normAutofit/>
-          </a:bodyPr>
-          <a:lstStyle/>
-          <a:p>
-            <a:r>
-              <a:rPr lang="en-US" sz="2800" dirty="0"/>
-              <a:t>Achievements and challenges</a:t>
-            </a:r>
-          </a:p>
-        </p:txBody>
-      </p:sp>
-      <p:pic>
-        <p:nvPicPr>
-          <p:cNvPr id="8" name="Picture Placeholder 7" descr="close up of computer code">
-            <a:extLst>
-              <a:ext uri="{FF2B5EF4-FFF2-40B4-BE49-F238E27FC236}">
-                <a16:creationId xmlns:a16="http://schemas.microsoft.com/office/drawing/2014/main" id="{A596BF19-CC58-4709-B5D6-3FC378FDC7BA}"/>
-              </a:ext>
-            </a:extLst>
-          </p:cNvPr>
-          <p:cNvPicPr>
-            <a:picLocks noGrp="1" noChangeAspect="1"/>
-          </p:cNvPicPr>
-          <p:nvPr>
-            <p:ph type="pic" sz="quarter" idx="13"/>
-          </p:nvPr>
-        </p:nvPicPr>
-        <p:blipFill rotWithShape="1">
-          <a:blip r:embed="rId2">
-            <a:extLst>
-              <a:ext uri="{BEBA8EAE-BF5A-486C-A8C5-ECC9F3942E4B}">
-                <a14:imgProps xmlns:a14="http://schemas.microsoft.com/office/drawing/2010/main">
-                  <a14:imgLayer r:embed="rId3">
-                    <a14:imgEffect>
-                      <a14:saturation sat="0"/>
-                    </a14:imgEffect>
-                  </a14:imgLayer>
-                </a14:imgProps>
-              </a:ext>
-            </a:extLst>
-          </a:blip>
-          <a:srcRect l="20370" r="20370"/>
-          <a:stretch/>
-        </p:blipFill>
-        <p:spPr>
-          <a:xfrm>
-            <a:off x="0" y="-9922"/>
-            <a:ext cx="6096000" cy="6867922"/>
-          </a:xfrm>
-        </p:spPr>
-      </p:pic>
-      <p:sp>
-        <p:nvSpPr>
-          <p:cNvPr id="2" name="Text Placeholder 1">
-            <a:extLst>
-              <a:ext uri="{FF2B5EF4-FFF2-40B4-BE49-F238E27FC236}">
-                <a16:creationId xmlns:a16="http://schemas.microsoft.com/office/drawing/2014/main" id="{B156CAF1-214F-4566-9B0D-DACA1063E8C8}"/>
-              </a:ext>
-            </a:extLst>
-          </p:cNvPr>
-          <p:cNvSpPr>
-            <a:spLocks noGrp="1"/>
-          </p:cNvSpPr>
-          <p:nvPr>
-            <p:ph type="body" idx="1"/>
-          </p:nvPr>
-        </p:nvSpPr>
-        <p:spPr>
-          <a:xfrm>
-            <a:off x="5897218" y="1375873"/>
-            <a:ext cx="6095999" cy="5233911"/>
-          </a:xfrm>
-        </p:spPr>
-        <p:txBody>
-          <a:bodyPr/>
-          <a:lstStyle/>
-          <a:p>
-            <a:pPr algn="l"/>
-            <a:r>
-              <a:rPr lang="en-US" sz="1600" u="sng" spc="0" dirty="0">
-                <a:cs typeface="Arial" panose="020B0604020202020204" pitchFamily="34" charset="0"/>
-              </a:rPr>
-              <a:t>Achievements:</a:t>
-            </a:r>
-          </a:p>
-          <a:p>
-            <a:pPr marL="285750" indent="-285750" algn="l">
-              <a:buFont typeface="Arial" panose="020B0604020202020204" pitchFamily="34" charset="0"/>
-              <a:buChar char="•"/>
-            </a:pPr>
-            <a:r>
-              <a:rPr lang="en-US" spc="0" dirty="0">
-                <a:cs typeface="Arial" panose="020B0604020202020204" pitchFamily="34" charset="0"/>
-              </a:rPr>
-              <a:t>Successfully hosted sprint meetings with all members present weekly and participating</a:t>
-            </a:r>
-          </a:p>
-          <a:p>
-            <a:pPr marL="285750" indent="-285750" algn="l">
-              <a:buFont typeface="Arial" panose="020B0604020202020204" pitchFamily="34" charset="0"/>
-              <a:buChar char="•"/>
-            </a:pPr>
-            <a:r>
-              <a:rPr lang="en-US" spc="0" dirty="0">
-                <a:cs typeface="Arial" panose="020B0604020202020204" pitchFamily="34" charset="0"/>
-              </a:rPr>
-              <a:t>Individual team members feel more satisfied with their roles which gives them extra motivation to perform.</a:t>
-            </a:r>
-          </a:p>
-          <a:p>
-            <a:pPr marL="285750" indent="-285750" algn="l">
-              <a:buFont typeface="Arial" panose="020B0604020202020204" pitchFamily="34" charset="0"/>
-              <a:buChar char="•"/>
-            </a:pPr>
-            <a:r>
-              <a:rPr lang="en-US" spc="0" dirty="0">
-                <a:cs typeface="Arial" panose="020B0604020202020204" pitchFamily="34" charset="0"/>
-              </a:rPr>
-              <a:t>tasks are completed on time and in full.</a:t>
-            </a:r>
-          </a:p>
-          <a:p>
-            <a:pPr marL="285750" indent="-285750" algn="l">
-              <a:buFont typeface="Arial" panose="020B0604020202020204" pitchFamily="34" charset="0"/>
-              <a:buChar char="•"/>
-            </a:pPr>
-            <a:endParaRPr lang="en-US" spc="0" dirty="0">
-              <a:cs typeface="Arial" panose="020B0604020202020204" pitchFamily="34" charset="0"/>
-            </a:endParaRPr>
-          </a:p>
-          <a:p>
-            <a:pPr marL="285750" indent="-285750" algn="l">
-              <a:buFont typeface="Arial" panose="020B0604020202020204" pitchFamily="34" charset="0"/>
-              <a:buChar char="•"/>
-            </a:pPr>
-            <a:endParaRPr lang="en-US" spc="0" dirty="0">
-              <a:cs typeface="Arial" panose="020B0604020202020204" pitchFamily="34" charset="0"/>
-            </a:endParaRPr>
-          </a:p>
-          <a:p>
-            <a:pPr algn="l"/>
-            <a:endParaRPr lang="en-US" spc="0" dirty="0">
-              <a:cs typeface="Arial" panose="020B0604020202020204" pitchFamily="34" charset="0"/>
-            </a:endParaRPr>
-          </a:p>
-          <a:p>
-            <a:pPr algn="l"/>
-            <a:endParaRPr lang="en-US" spc="0" dirty="0">
-              <a:cs typeface="Arial" panose="020B0604020202020204" pitchFamily="34" charset="0"/>
-            </a:endParaRPr>
-          </a:p>
-          <a:p>
-            <a:pPr algn="l"/>
-            <a:r>
-              <a:rPr lang="en-US" sz="1600" u="sng" spc="0" dirty="0">
-                <a:cs typeface="Arial" panose="020B0604020202020204" pitchFamily="34" charset="0"/>
-              </a:rPr>
-              <a:t>Challenges:</a:t>
-            </a:r>
-          </a:p>
-          <a:p>
-            <a:pPr marL="285750" indent="-285750" algn="l">
-              <a:buFont typeface="Arial" panose="020B0604020202020204" pitchFamily="34" charset="0"/>
-              <a:buChar char="•"/>
-            </a:pPr>
-            <a:r>
-              <a:rPr lang="en-US" spc="0" dirty="0">
-                <a:cs typeface="Arial" panose="020B0604020202020204" pitchFamily="34" charset="0"/>
-              </a:rPr>
-              <a:t>Microsoft word formatting for SRS document </a:t>
-            </a:r>
-          </a:p>
-          <a:p>
-            <a:pPr marL="285750" indent="-285750" algn="l">
-              <a:buFont typeface="Arial" panose="020B0604020202020204" pitchFamily="34" charset="0"/>
-              <a:buChar char="•"/>
-            </a:pPr>
-            <a:endParaRPr lang="en-US" spc="0" dirty="0">
-              <a:cs typeface="Arial" panose="020B0604020202020204" pitchFamily="34" charset="0"/>
-            </a:endParaRPr>
-          </a:p>
-          <a:p>
-            <a:pPr algn="l"/>
-            <a:endParaRPr lang="en-US" spc="0" dirty="0">
-              <a:cs typeface="Arial" panose="020B0604020202020204" pitchFamily="34" charset="0"/>
-            </a:endParaRPr>
-          </a:p>
-          <a:p>
-            <a:pPr marL="285750" indent="-285750" algn="l">
-              <a:buFont typeface="Arial" panose="020B0604020202020204" pitchFamily="34" charset="0"/>
-              <a:buChar char="•"/>
-            </a:pPr>
-            <a:endParaRPr lang="en-US" spc="0" dirty="0">
-              <a:cs typeface="Arial" panose="020B0604020202020204" pitchFamily="34" charset="0"/>
-            </a:endParaRPr>
-          </a:p>
-        </p:txBody>
-      </p:sp>
-      <p:sp>
-        <p:nvSpPr>
-          <p:cNvPr id="6" name="Slide Number Placeholder 5">
-            <a:extLst>
-              <a:ext uri="{FF2B5EF4-FFF2-40B4-BE49-F238E27FC236}">
-                <a16:creationId xmlns:a16="http://schemas.microsoft.com/office/drawing/2014/main" id="{FC6A5C12-E784-444E-B868-DE2AE85742BB}"/>
-              </a:ext>
-            </a:extLst>
-          </p:cNvPr>
-          <p:cNvSpPr>
-            <a:spLocks noGrp="1"/>
-          </p:cNvSpPr>
-          <p:nvPr>
-            <p:ph type="sldNum" sz="quarter" idx="12"/>
-          </p:nvPr>
-        </p:nvSpPr>
-        <p:spPr/>
-        <p:txBody>
-          <a:bodyPr/>
-          <a:lstStyle/>
-          <a:p>
-            <a:fld id="{8C2E478F-E849-4A8C-AF1F-CBCC78A7CBFA}" type="slidenum">
-              <a:rPr lang="en-US" smtClean="0"/>
-              <a:pPr/>
-              <a:t>18</a:t>
-            </a:fld>
-            <a:endParaRPr lang="en-US" dirty="0"/>
-          </a:p>
-        </p:txBody>
-      </p:sp>
-    </p:spTree>
-    <p:extLst>
-      <p:ext uri="{BB962C8B-B14F-4D97-AF65-F5344CB8AC3E}">
-        <p14:creationId xmlns:p14="http://schemas.microsoft.com/office/powerpoint/2010/main" val="2918897839"/>
-      </p:ext>
-    </p:extLst>
-  </p:cSld>
-  <p:clrMapOvr>
-    <a:masterClrMapping/>
-  </p:clrMapOvr>
-</p:sld>
-</file>
-
-<file path=ppt/slides/slide19.xml><?xml version="1.0" encoding="utf-8"?>
-<p:sld xmlns:a="http://schemas.openxmlformats.org/drawingml/2006/main" xmlns:r="http://schemas.openxmlformats.org/officeDocument/2006/relationships" xmlns:p="http://schemas.openxmlformats.org/presentationml/2006/main">
-  <p:cSld>
-    <p:spTree>
-      <p:nvGrpSpPr>
-        <p:cNvPr id="1" name=""/>
-        <p:cNvGrpSpPr/>
-        <p:nvPr/>
-      </p:nvGrpSpPr>
-      <p:grpSpPr>
-        <a:xfrm>
-          <a:off x="0" y="0"/>
-          <a:ext cx="0" cy="0"/>
-          <a:chOff x="0" y="0"/>
-          <a:chExt cx="0" cy="0"/>
-        </a:xfrm>
-      </p:grpSpPr>
-      <p:sp>
-        <p:nvSpPr>
-          <p:cNvPr id="3" name="Title 2">
-            <a:extLst>
-              <a:ext uri="{FF2B5EF4-FFF2-40B4-BE49-F238E27FC236}">
-                <a16:creationId xmlns:a16="http://schemas.microsoft.com/office/drawing/2014/main" id="{1D24B42B-925B-494C-A986-BD85E8117E1E}"/>
-              </a:ext>
-            </a:extLst>
-          </p:cNvPr>
-          <p:cNvSpPr>
-            <a:spLocks noGrp="1"/>
-          </p:cNvSpPr>
-          <p:nvPr>
-            <p:ph type="title"/>
-          </p:nvPr>
-        </p:nvSpPr>
-        <p:spPr>
-          <a:xfrm>
-            <a:off x="6243087" y="58128"/>
-            <a:ext cx="5569486" cy="741763"/>
-          </a:xfrm>
-        </p:spPr>
-        <p:txBody>
-          <a:bodyPr>
-            <a:normAutofit/>
-          </a:bodyPr>
-          <a:lstStyle/>
-          <a:p>
-            <a:r>
-              <a:rPr lang="en-US" sz="2800" dirty="0"/>
-              <a:t>Future Development Plan</a:t>
-            </a:r>
-          </a:p>
-        </p:txBody>
-      </p:sp>
-      <p:pic>
-        <p:nvPicPr>
-          <p:cNvPr id="8" name="Picture Placeholder 7" descr="close up of computer code">
-            <a:extLst>
-              <a:ext uri="{FF2B5EF4-FFF2-40B4-BE49-F238E27FC236}">
-                <a16:creationId xmlns:a16="http://schemas.microsoft.com/office/drawing/2014/main" id="{A596BF19-CC58-4709-B5D6-3FC378FDC7BA}"/>
-              </a:ext>
-            </a:extLst>
-          </p:cNvPr>
-          <p:cNvPicPr>
-            <a:picLocks noGrp="1" noChangeAspect="1"/>
-          </p:cNvPicPr>
-          <p:nvPr>
-            <p:ph type="pic" sz="quarter" idx="13"/>
-          </p:nvPr>
-        </p:nvPicPr>
-        <p:blipFill rotWithShape="1">
-          <a:blip r:embed="rId2">
-            <a:extLst>
-              <a:ext uri="{BEBA8EAE-BF5A-486C-A8C5-ECC9F3942E4B}">
-                <a14:imgProps xmlns:a14="http://schemas.microsoft.com/office/drawing/2010/main">
-                  <a14:imgLayer r:embed="rId3">
-                    <a14:imgEffect>
-                      <a14:saturation sat="0"/>
-                    </a14:imgEffect>
-                  </a14:imgLayer>
-                </a14:imgProps>
-              </a:ext>
-            </a:extLst>
-          </a:blip>
-          <a:srcRect l="20370" r="20370"/>
-          <a:stretch/>
-        </p:blipFill>
-        <p:spPr>
-          <a:xfrm>
-            <a:off x="0" y="-9922"/>
-            <a:ext cx="6096000" cy="6867922"/>
-          </a:xfrm>
-        </p:spPr>
-      </p:pic>
-      <p:sp>
-        <p:nvSpPr>
-          <p:cNvPr id="2" name="Text Placeholder 1">
-            <a:extLst>
-              <a:ext uri="{FF2B5EF4-FFF2-40B4-BE49-F238E27FC236}">
-                <a16:creationId xmlns:a16="http://schemas.microsoft.com/office/drawing/2014/main" id="{B156CAF1-214F-4566-9B0D-DACA1063E8C8}"/>
-              </a:ext>
-            </a:extLst>
-          </p:cNvPr>
-          <p:cNvSpPr>
-            <a:spLocks noGrp="1"/>
-          </p:cNvSpPr>
-          <p:nvPr>
-            <p:ph type="body" idx="1"/>
-          </p:nvPr>
-        </p:nvSpPr>
-        <p:spPr>
-          <a:xfrm>
-            <a:off x="5897218" y="956345"/>
-            <a:ext cx="6095999" cy="5578679"/>
-          </a:xfrm>
-        </p:spPr>
-        <p:txBody>
-          <a:bodyPr/>
-          <a:lstStyle/>
-          <a:p>
-            <a:pPr marL="285750" indent="-285750" algn="l">
-              <a:buFont typeface="Arial" panose="020B0604020202020204" pitchFamily="34" charset="0"/>
-              <a:buChar char="•"/>
-            </a:pPr>
-            <a:r>
-              <a:rPr lang="en-US" sz="1600" spc="0" dirty="0">
-                <a:cs typeface="Arial" panose="020B0604020202020204" pitchFamily="34" charset="0"/>
-              </a:rPr>
-              <a:t>Create a Mobile application version to give restaurant owners the option to use either a web application or mobile application based on their needs. </a:t>
-            </a:r>
-          </a:p>
-          <a:p>
-            <a:pPr marL="285750" indent="-285750" algn="l">
-              <a:buFont typeface="Arial" panose="020B0604020202020204" pitchFamily="34" charset="0"/>
-              <a:buChar char="•"/>
-            </a:pPr>
-            <a:r>
-              <a:rPr lang="en-US" sz="1600" spc="0" dirty="0">
-                <a:cs typeface="Arial" panose="020B0604020202020204" pitchFamily="34" charset="0"/>
-              </a:rPr>
-              <a:t>add online reservation for customers .</a:t>
-            </a:r>
-          </a:p>
-          <a:p>
-            <a:pPr marL="285750" indent="-285750" algn="l">
-              <a:buFont typeface="Arial" panose="020B0604020202020204" pitchFamily="34" charset="0"/>
-              <a:buChar char="•"/>
-            </a:pPr>
-            <a:endParaRPr lang="en-US" sz="1600" spc="0" dirty="0">
-              <a:cs typeface="Arial" panose="020B0604020202020204" pitchFamily="34" charset="0"/>
-            </a:endParaRPr>
-          </a:p>
-        </p:txBody>
-      </p:sp>
-      <p:sp>
-        <p:nvSpPr>
-          <p:cNvPr id="6" name="Slide Number Placeholder 5">
-            <a:extLst>
-              <a:ext uri="{FF2B5EF4-FFF2-40B4-BE49-F238E27FC236}">
-                <a16:creationId xmlns:a16="http://schemas.microsoft.com/office/drawing/2014/main" id="{FC6A5C12-E784-444E-B868-DE2AE85742BB}"/>
-              </a:ext>
-            </a:extLst>
-          </p:cNvPr>
-          <p:cNvSpPr>
-            <a:spLocks noGrp="1"/>
-          </p:cNvSpPr>
-          <p:nvPr>
-            <p:ph type="sldNum" sz="quarter" idx="12"/>
           </p:nvPr>
         </p:nvSpPr>
         <p:spPr/>
@@ -9267,7 +9280,7 @@
     </p:spTree>
     <p:extLst>
       <p:ext uri="{BB962C8B-B14F-4D97-AF65-F5344CB8AC3E}">
-        <p14:creationId xmlns:p14="http://schemas.microsoft.com/office/powerpoint/2010/main" val="3853358220"/>
+        <p14:creationId xmlns:p14="http://schemas.microsoft.com/office/powerpoint/2010/main" val="494086945"/>
       </p:ext>
     </p:extLst>
   </p:cSld>
@@ -9520,6 +9533,483 @@
 </file>
 
 <file path=ppt/slides/slide20.xml><?xml version="1.0" encoding="utf-8"?>
+<p:sld xmlns:a="http://schemas.openxmlformats.org/drawingml/2006/main" xmlns:r="http://schemas.openxmlformats.org/officeDocument/2006/relationships" xmlns:p="http://schemas.openxmlformats.org/presentationml/2006/main">
+  <p:cSld>
+    <p:spTree>
+      <p:nvGrpSpPr>
+        <p:cNvPr id="1" name=""/>
+        <p:cNvGrpSpPr/>
+        <p:nvPr/>
+      </p:nvGrpSpPr>
+      <p:grpSpPr>
+        <a:xfrm>
+          <a:off x="0" y="0"/>
+          <a:ext cx="0" cy="0"/>
+          <a:chOff x="0" y="0"/>
+          <a:chExt cx="0" cy="0"/>
+        </a:xfrm>
+      </p:grpSpPr>
+      <p:sp>
+        <p:nvSpPr>
+          <p:cNvPr id="3" name="Title 2">
+            <a:extLst>
+              <a:ext uri="{FF2B5EF4-FFF2-40B4-BE49-F238E27FC236}">
+                <a16:creationId xmlns:a16="http://schemas.microsoft.com/office/drawing/2014/main" id="{1D24B42B-925B-494C-A986-BD85E8117E1E}"/>
+              </a:ext>
+            </a:extLst>
+          </p:cNvPr>
+          <p:cNvSpPr>
+            <a:spLocks noGrp="1"/>
+          </p:cNvSpPr>
+          <p:nvPr>
+            <p:ph type="title"/>
+          </p:nvPr>
+        </p:nvSpPr>
+        <p:spPr>
+          <a:xfrm>
+            <a:off x="6258991" y="151788"/>
+            <a:ext cx="5251450" cy="975869"/>
+          </a:xfrm>
+        </p:spPr>
+        <p:txBody>
+          <a:bodyPr>
+            <a:normAutofit/>
+          </a:bodyPr>
+          <a:lstStyle/>
+          <a:p>
+            <a:r>
+              <a:rPr lang="en-US" sz="2800" dirty="0"/>
+              <a:t>Achievements and challenges</a:t>
+            </a:r>
+          </a:p>
+        </p:txBody>
+      </p:sp>
+      <p:pic>
+        <p:nvPicPr>
+          <p:cNvPr id="8" name="Picture Placeholder 7" descr="close up of computer code">
+            <a:extLst>
+              <a:ext uri="{FF2B5EF4-FFF2-40B4-BE49-F238E27FC236}">
+                <a16:creationId xmlns:a16="http://schemas.microsoft.com/office/drawing/2014/main" id="{A596BF19-CC58-4709-B5D6-3FC378FDC7BA}"/>
+              </a:ext>
+            </a:extLst>
+          </p:cNvPr>
+          <p:cNvPicPr>
+            <a:picLocks noGrp="1" noChangeAspect="1"/>
+          </p:cNvPicPr>
+          <p:nvPr>
+            <p:ph type="pic" sz="quarter" idx="13"/>
+          </p:nvPr>
+        </p:nvPicPr>
+        <p:blipFill rotWithShape="1">
+          <a:blip r:embed="rId2">
+            <a:extLst>
+              <a:ext uri="{BEBA8EAE-BF5A-486C-A8C5-ECC9F3942E4B}">
+                <a14:imgProps xmlns:a14="http://schemas.microsoft.com/office/drawing/2010/main">
+                  <a14:imgLayer r:embed="rId3">
+                    <a14:imgEffect>
+                      <a14:saturation sat="0"/>
+                    </a14:imgEffect>
+                  </a14:imgLayer>
+                </a14:imgProps>
+              </a:ext>
+            </a:extLst>
+          </a:blip>
+          <a:srcRect l="20370" r="20370"/>
+          <a:stretch/>
+        </p:blipFill>
+        <p:spPr>
+          <a:xfrm>
+            <a:off x="0" y="-9922"/>
+            <a:ext cx="6096000" cy="6867922"/>
+          </a:xfrm>
+        </p:spPr>
+      </p:pic>
+      <p:sp>
+        <p:nvSpPr>
+          <p:cNvPr id="2" name="Text Placeholder 1">
+            <a:extLst>
+              <a:ext uri="{FF2B5EF4-FFF2-40B4-BE49-F238E27FC236}">
+                <a16:creationId xmlns:a16="http://schemas.microsoft.com/office/drawing/2014/main" id="{B156CAF1-214F-4566-9B0D-DACA1063E8C8}"/>
+              </a:ext>
+            </a:extLst>
+          </p:cNvPr>
+          <p:cNvSpPr>
+            <a:spLocks noGrp="1"/>
+          </p:cNvSpPr>
+          <p:nvPr>
+            <p:ph type="body" idx="1"/>
+          </p:nvPr>
+        </p:nvSpPr>
+        <p:spPr>
+          <a:xfrm>
+            <a:off x="5897218" y="1375873"/>
+            <a:ext cx="6095999" cy="5233911"/>
+          </a:xfrm>
+        </p:spPr>
+        <p:txBody>
+          <a:bodyPr/>
+          <a:lstStyle/>
+          <a:p>
+            <a:pPr algn="l"/>
+            <a:r>
+              <a:rPr lang="en-US" sz="1600" u="sng" spc="0" dirty="0">
+                <a:cs typeface="Arial" panose="020B0604020202020204" pitchFamily="34" charset="0"/>
+              </a:rPr>
+              <a:t>Achievements:</a:t>
+            </a:r>
+          </a:p>
+          <a:p>
+            <a:pPr marL="285750" indent="-285750" algn="l">
+              <a:buFont typeface="Arial" panose="020B0604020202020204" pitchFamily="34" charset="0"/>
+              <a:buChar char="•"/>
+            </a:pPr>
+            <a:r>
+              <a:rPr lang="en-US" spc="0" dirty="0">
+                <a:cs typeface="Arial" panose="020B0604020202020204" pitchFamily="34" charset="0"/>
+              </a:rPr>
+              <a:t>Successfully hosted sprint meetings with all members present weekly and participating</a:t>
+            </a:r>
+          </a:p>
+          <a:p>
+            <a:pPr marL="285750" indent="-285750" algn="l">
+              <a:buFont typeface="Arial" panose="020B0604020202020204" pitchFamily="34" charset="0"/>
+              <a:buChar char="•"/>
+            </a:pPr>
+            <a:r>
+              <a:rPr lang="en-US" spc="0" dirty="0">
+                <a:cs typeface="Arial" panose="020B0604020202020204" pitchFamily="34" charset="0"/>
+              </a:rPr>
+              <a:t>Individual team members feel more satisfied with their roles which gives them extra motivation to perform.</a:t>
+            </a:r>
+          </a:p>
+          <a:p>
+            <a:pPr marL="285750" indent="-285750" algn="l">
+              <a:buFont typeface="Arial" panose="020B0604020202020204" pitchFamily="34" charset="0"/>
+              <a:buChar char="•"/>
+            </a:pPr>
+            <a:r>
+              <a:rPr lang="en-US" spc="0" dirty="0">
+                <a:cs typeface="Arial" panose="020B0604020202020204" pitchFamily="34" charset="0"/>
+              </a:rPr>
+              <a:t>tasks are completed on time and in full.</a:t>
+            </a:r>
+          </a:p>
+          <a:p>
+            <a:pPr marL="285750" indent="-285750" algn="l">
+              <a:buFont typeface="Arial" panose="020B0604020202020204" pitchFamily="34" charset="0"/>
+              <a:buChar char="•"/>
+            </a:pPr>
+            <a:endParaRPr lang="en-US" spc="0" dirty="0">
+              <a:cs typeface="Arial" panose="020B0604020202020204" pitchFamily="34" charset="0"/>
+            </a:endParaRPr>
+          </a:p>
+          <a:p>
+            <a:pPr marL="285750" indent="-285750" algn="l">
+              <a:buFont typeface="Arial" panose="020B0604020202020204" pitchFamily="34" charset="0"/>
+              <a:buChar char="•"/>
+            </a:pPr>
+            <a:endParaRPr lang="en-US" spc="0" dirty="0">
+              <a:cs typeface="Arial" panose="020B0604020202020204" pitchFamily="34" charset="0"/>
+            </a:endParaRPr>
+          </a:p>
+          <a:p>
+            <a:pPr algn="l"/>
+            <a:endParaRPr lang="en-US" spc="0" dirty="0">
+              <a:cs typeface="Arial" panose="020B0604020202020204" pitchFamily="34" charset="0"/>
+            </a:endParaRPr>
+          </a:p>
+          <a:p>
+            <a:pPr algn="l"/>
+            <a:endParaRPr lang="en-US" spc="0" dirty="0">
+              <a:cs typeface="Arial" panose="020B0604020202020204" pitchFamily="34" charset="0"/>
+            </a:endParaRPr>
+          </a:p>
+          <a:p>
+            <a:pPr algn="l"/>
+            <a:r>
+              <a:rPr lang="en-US" sz="1600" u="sng" spc="0" dirty="0">
+                <a:cs typeface="Arial" panose="020B0604020202020204" pitchFamily="34" charset="0"/>
+              </a:rPr>
+              <a:t>Challenges:</a:t>
+            </a:r>
+          </a:p>
+          <a:p>
+            <a:pPr marL="285750" indent="-285750" algn="l">
+              <a:buFont typeface="Arial" panose="020B0604020202020204" pitchFamily="34" charset="0"/>
+              <a:buChar char="•"/>
+            </a:pPr>
+            <a:r>
+              <a:rPr lang="en-US" spc="0" dirty="0">
+                <a:cs typeface="Arial" panose="020B0604020202020204" pitchFamily="34" charset="0"/>
+              </a:rPr>
+              <a:t>Microsoft word formatting for SRS document </a:t>
+            </a:r>
+          </a:p>
+          <a:p>
+            <a:pPr marL="285750" indent="-285750" algn="l">
+              <a:buFont typeface="Arial" panose="020B0604020202020204" pitchFamily="34" charset="0"/>
+              <a:buChar char="•"/>
+            </a:pPr>
+            <a:endParaRPr lang="en-US" spc="0" dirty="0">
+              <a:cs typeface="Arial" panose="020B0604020202020204" pitchFamily="34" charset="0"/>
+            </a:endParaRPr>
+          </a:p>
+          <a:p>
+            <a:pPr algn="l"/>
+            <a:endParaRPr lang="en-US" spc="0" dirty="0">
+              <a:cs typeface="Arial" panose="020B0604020202020204" pitchFamily="34" charset="0"/>
+            </a:endParaRPr>
+          </a:p>
+          <a:p>
+            <a:pPr marL="285750" indent="-285750" algn="l">
+              <a:buFont typeface="Arial" panose="020B0604020202020204" pitchFamily="34" charset="0"/>
+              <a:buChar char="•"/>
+            </a:pPr>
+            <a:endParaRPr lang="en-US" spc="0" dirty="0">
+              <a:cs typeface="Arial" panose="020B0604020202020204" pitchFamily="34" charset="0"/>
+            </a:endParaRPr>
+          </a:p>
+        </p:txBody>
+      </p:sp>
+      <p:sp>
+        <p:nvSpPr>
+          <p:cNvPr id="6" name="Slide Number Placeholder 5">
+            <a:extLst>
+              <a:ext uri="{FF2B5EF4-FFF2-40B4-BE49-F238E27FC236}">
+                <a16:creationId xmlns:a16="http://schemas.microsoft.com/office/drawing/2014/main" id="{FC6A5C12-E784-444E-B868-DE2AE85742BB}"/>
+              </a:ext>
+            </a:extLst>
+          </p:cNvPr>
+          <p:cNvSpPr>
+            <a:spLocks noGrp="1"/>
+          </p:cNvSpPr>
+          <p:nvPr>
+            <p:ph type="sldNum" sz="quarter" idx="12"/>
+          </p:nvPr>
+        </p:nvSpPr>
+        <p:spPr/>
+        <p:txBody>
+          <a:bodyPr/>
+          <a:lstStyle/>
+          <a:p>
+            <a:fld id="{8C2E478F-E849-4A8C-AF1F-CBCC78A7CBFA}" type="slidenum">
+              <a:rPr lang="en-US" smtClean="0"/>
+              <a:pPr/>
+              <a:t>20</a:t>
+            </a:fld>
+            <a:endParaRPr lang="en-US" dirty="0"/>
+          </a:p>
+        </p:txBody>
+      </p:sp>
+    </p:spTree>
+    <p:extLst>
+      <p:ext uri="{BB962C8B-B14F-4D97-AF65-F5344CB8AC3E}">
+        <p14:creationId xmlns:p14="http://schemas.microsoft.com/office/powerpoint/2010/main" val="2918897839"/>
+      </p:ext>
+    </p:extLst>
+  </p:cSld>
+  <p:clrMapOvr>
+    <a:masterClrMapping/>
+  </p:clrMapOvr>
+</p:sld>
+</file>
+
+<file path=ppt/slides/slide21.xml><?xml version="1.0" encoding="utf-8"?>
+<p:sld xmlns:a="http://schemas.openxmlformats.org/drawingml/2006/main" xmlns:r="http://schemas.openxmlformats.org/officeDocument/2006/relationships" xmlns:p="http://schemas.openxmlformats.org/presentationml/2006/main">
+  <p:cSld>
+    <p:spTree>
+      <p:nvGrpSpPr>
+        <p:cNvPr id="1" name=""/>
+        <p:cNvGrpSpPr/>
+        <p:nvPr/>
+      </p:nvGrpSpPr>
+      <p:grpSpPr>
+        <a:xfrm>
+          <a:off x="0" y="0"/>
+          <a:ext cx="0" cy="0"/>
+          <a:chOff x="0" y="0"/>
+          <a:chExt cx="0" cy="0"/>
+        </a:xfrm>
+      </p:grpSpPr>
+      <p:sp>
+        <p:nvSpPr>
+          <p:cNvPr id="3" name="Title 2">
+            <a:extLst>
+              <a:ext uri="{FF2B5EF4-FFF2-40B4-BE49-F238E27FC236}">
+                <a16:creationId xmlns:a16="http://schemas.microsoft.com/office/drawing/2014/main" id="{1D24B42B-925B-494C-A986-BD85E8117E1E}"/>
+              </a:ext>
+            </a:extLst>
+          </p:cNvPr>
+          <p:cNvSpPr>
+            <a:spLocks noGrp="1"/>
+          </p:cNvSpPr>
+          <p:nvPr>
+            <p:ph type="title"/>
+          </p:nvPr>
+        </p:nvSpPr>
+        <p:spPr>
+          <a:xfrm>
+            <a:off x="6243087" y="58128"/>
+            <a:ext cx="5569486" cy="741763"/>
+          </a:xfrm>
+        </p:spPr>
+        <p:txBody>
+          <a:bodyPr>
+            <a:normAutofit/>
+          </a:bodyPr>
+          <a:lstStyle/>
+          <a:p>
+            <a:r>
+              <a:rPr lang="en-US" sz="2800" dirty="0"/>
+              <a:t>Future Development Plan</a:t>
+            </a:r>
+          </a:p>
+        </p:txBody>
+      </p:sp>
+      <p:pic>
+        <p:nvPicPr>
+          <p:cNvPr id="8" name="Picture Placeholder 7" descr="close up of computer code">
+            <a:extLst>
+              <a:ext uri="{FF2B5EF4-FFF2-40B4-BE49-F238E27FC236}">
+                <a16:creationId xmlns:a16="http://schemas.microsoft.com/office/drawing/2014/main" id="{A596BF19-CC58-4709-B5D6-3FC378FDC7BA}"/>
+              </a:ext>
+            </a:extLst>
+          </p:cNvPr>
+          <p:cNvPicPr>
+            <a:picLocks noGrp="1" noChangeAspect="1"/>
+          </p:cNvPicPr>
+          <p:nvPr>
+            <p:ph type="pic" sz="quarter" idx="13"/>
+          </p:nvPr>
+        </p:nvPicPr>
+        <p:blipFill rotWithShape="1">
+          <a:blip r:embed="rId2">
+            <a:extLst>
+              <a:ext uri="{BEBA8EAE-BF5A-486C-A8C5-ECC9F3942E4B}">
+                <a14:imgProps xmlns:a14="http://schemas.microsoft.com/office/drawing/2010/main">
+                  <a14:imgLayer r:embed="rId3">
+                    <a14:imgEffect>
+                      <a14:saturation sat="0"/>
+                    </a14:imgEffect>
+                  </a14:imgLayer>
+                </a14:imgProps>
+              </a:ext>
+            </a:extLst>
+          </a:blip>
+          <a:srcRect l="20370" r="20370"/>
+          <a:stretch/>
+        </p:blipFill>
+        <p:spPr>
+          <a:xfrm>
+            <a:off x="0" y="-9922"/>
+            <a:ext cx="6096000" cy="6867922"/>
+          </a:xfrm>
+        </p:spPr>
+      </p:pic>
+      <p:sp>
+        <p:nvSpPr>
+          <p:cNvPr id="2" name="Text Placeholder 1">
+            <a:extLst>
+              <a:ext uri="{FF2B5EF4-FFF2-40B4-BE49-F238E27FC236}">
+                <a16:creationId xmlns:a16="http://schemas.microsoft.com/office/drawing/2014/main" id="{B156CAF1-214F-4566-9B0D-DACA1063E8C8}"/>
+              </a:ext>
+            </a:extLst>
+          </p:cNvPr>
+          <p:cNvSpPr>
+            <a:spLocks noGrp="1"/>
+          </p:cNvSpPr>
+          <p:nvPr>
+            <p:ph type="body" idx="1"/>
+          </p:nvPr>
+        </p:nvSpPr>
+        <p:spPr>
+          <a:xfrm>
+            <a:off x="5897218" y="956345"/>
+            <a:ext cx="6095999" cy="5578679"/>
+          </a:xfrm>
+        </p:spPr>
+        <p:txBody>
+          <a:bodyPr/>
+          <a:lstStyle/>
+          <a:p>
+            <a:pPr marL="285750" indent="-285750" algn="l">
+              <a:buFont typeface="Arial" panose="020B0604020202020204" pitchFamily="34" charset="0"/>
+              <a:buChar char="•"/>
+            </a:pPr>
+            <a:r>
+              <a:rPr lang="en-US" sz="1600" spc="0" dirty="0">
+                <a:cs typeface="Arial" panose="020B0604020202020204" pitchFamily="34" charset="0"/>
+              </a:rPr>
+              <a:t>Create a Mobile application version to give restaurant owners the option to use either a web application or mobile application based on their needs. </a:t>
+            </a:r>
+          </a:p>
+          <a:p>
+            <a:pPr marL="285750" indent="-285750" algn="l">
+              <a:buFont typeface="Arial" panose="020B0604020202020204" pitchFamily="34" charset="0"/>
+              <a:buChar char="•"/>
+            </a:pPr>
+            <a:r>
+              <a:rPr lang="en-US" sz="1600" spc="0" dirty="0">
+                <a:cs typeface="Arial" panose="020B0604020202020204" pitchFamily="34" charset="0"/>
+              </a:rPr>
+              <a:t>add online reservation for customers .</a:t>
+            </a:r>
+          </a:p>
+          <a:p>
+            <a:pPr marL="285750" indent="-285750" algn="l">
+              <a:buFont typeface="Arial" panose="020B0604020202020204" pitchFamily="34" charset="0"/>
+              <a:buChar char="•"/>
+            </a:pPr>
+            <a:endParaRPr lang="en-US" sz="1600" spc="0" dirty="0">
+              <a:cs typeface="Arial" panose="020B0604020202020204" pitchFamily="34" charset="0"/>
+            </a:endParaRPr>
+          </a:p>
+        </p:txBody>
+      </p:sp>
+      <p:sp>
+        <p:nvSpPr>
+          <p:cNvPr id="6" name="Slide Number Placeholder 5">
+            <a:extLst>
+              <a:ext uri="{FF2B5EF4-FFF2-40B4-BE49-F238E27FC236}">
+                <a16:creationId xmlns:a16="http://schemas.microsoft.com/office/drawing/2014/main" id="{FC6A5C12-E784-444E-B868-DE2AE85742BB}"/>
+              </a:ext>
+            </a:extLst>
+          </p:cNvPr>
+          <p:cNvSpPr>
+            <a:spLocks noGrp="1"/>
+          </p:cNvSpPr>
+          <p:nvPr>
+            <p:ph type="sldNum" sz="quarter" idx="12"/>
+          </p:nvPr>
+        </p:nvSpPr>
+        <p:spPr/>
+        <p:txBody>
+          <a:bodyPr/>
+          <a:lstStyle/>
+          <a:p>
+            <a:fld id="{8C2E478F-E849-4A8C-AF1F-CBCC78A7CBFA}" type="slidenum">
+              <a:rPr lang="en-US" smtClean="0"/>
+              <a:pPr/>
+              <a:t>21</a:t>
+            </a:fld>
+            <a:endParaRPr lang="en-US" dirty="0"/>
+          </a:p>
+        </p:txBody>
+      </p:sp>
+    </p:spTree>
+    <p:extLst>
+      <p:ext uri="{BB962C8B-B14F-4D97-AF65-F5344CB8AC3E}">
+        <p14:creationId xmlns:p14="http://schemas.microsoft.com/office/powerpoint/2010/main" val="3853358220"/>
+      </p:ext>
+    </p:extLst>
+  </p:cSld>
+  <p:clrMapOvr>
+    <a:masterClrMapping/>
+  </p:clrMapOvr>
+</p:sld>
+</file>
+
+<file path=ppt/slides/slide22.xml><?xml version="1.0" encoding="utf-8"?>
 <p:sld xmlns:a="http://schemas.openxmlformats.org/drawingml/2006/main" xmlns:r="http://schemas.openxmlformats.org/officeDocument/2006/relationships" xmlns:p="http://schemas.openxmlformats.org/presentationml/2006/main">
   <p:cSld>
     <p:bg>
@@ -12797,15 +13287,6 @@
 </file>
 
 <file path=customXml/item2.xml><?xml version="1.0" encoding="utf-8"?>
-<p:properties xmlns:p="http://schemas.microsoft.com/office/2006/metadata/properties" xmlns:xsi="http://www.w3.org/2001/XMLSchema-instance" xmlns:pc="http://schemas.microsoft.com/office/infopath/2007/PartnerControls">
-  <documentManagement>
-    <Status xmlns="71af3243-3dd4-4a8d-8c0d-dd76da1f02a5">Not started</Status>
-    <MediaServiceKeyPoints xmlns="71af3243-3dd4-4a8d-8c0d-dd76da1f02a5" xsi:nil="true"/>
-  </documentManagement>
-</p:properties>
-</file>
-
-<file path=customXml/item3.xml><?xml version="1.0" encoding="utf-8"?>
 <ct:contentTypeSchema xmlns:ct="http://schemas.microsoft.com/office/2006/metadata/contentType" xmlns:ma="http://schemas.microsoft.com/office/2006/metadata/properties/metaAttributes" ct:_="" ma:_="" ma:contentTypeName="Document" ma:contentTypeID="0x01010079F111ED35F8CC479449609E8A0923A6" ma:contentTypeVersion="12" ma:contentTypeDescription="Create a new document." ma:contentTypeScope="" ma:versionID="426e97fa315356fffbdcd9876fe988c2">
   <xsd:schema xmlns:xsd="http://www.w3.org/2001/XMLSchema" xmlns:xs="http://www.w3.org/2001/XMLSchema" xmlns:p="http://schemas.microsoft.com/office/2006/metadata/properties" xmlns:ns2="71af3243-3dd4-4a8d-8c0d-dd76da1f02a5" xmlns:ns3="16c05727-aa75-4e4a-9b5f-8a80a1165891" targetNamespace="http://schemas.microsoft.com/office/2006/metadata/properties" ma:root="true" ma:fieldsID="14b8f0def80e6d70ce3def20c90759ae" ns2:_="" ns3:_="">
     <xsd:import namespace="71af3243-3dd4-4a8d-8c0d-dd76da1f02a5"/>
@@ -13026,6 +13507,15 @@
 </ct:contentTypeSchema>
 </file>
 
+<file path=customXml/item3.xml><?xml version="1.0" encoding="utf-8"?>
+<p:properties xmlns:p="http://schemas.microsoft.com/office/2006/metadata/properties" xmlns:xsi="http://www.w3.org/2001/XMLSchema-instance" xmlns:pc="http://schemas.microsoft.com/office/infopath/2007/PartnerControls">
+  <documentManagement>
+    <Status xmlns="71af3243-3dd4-4a8d-8c0d-dd76da1f02a5">Not started</Status>
+    <MediaServiceKeyPoints xmlns="71af3243-3dd4-4a8d-8c0d-dd76da1f02a5" xsi:nil="true"/>
+  </documentManagement>
+</p:properties>
+</file>
+
 <file path=customXml/itemProps1.xml><?xml version="1.0" encoding="utf-8"?>
 <ds:datastoreItem xmlns:ds="http://schemas.openxmlformats.org/officeDocument/2006/customXml" ds:itemID="{1B7E2D32-4FDD-4266-880C-17595B801432}">
   <ds:schemaRefs>
@@ -13035,16 +13525,6 @@
 </file>
 
 <file path=customXml/itemProps2.xml><?xml version="1.0" encoding="utf-8"?>
-<ds:datastoreItem xmlns:ds="http://schemas.openxmlformats.org/officeDocument/2006/customXml" ds:itemID="{E3D9F223-918A-45AF-9B53-56AB9E5E2182}">
-  <ds:schemaRefs>
-    <ds:schemaRef ds:uri="http://schemas.microsoft.com/office/2006/metadata/properties"/>
-    <ds:schemaRef ds:uri="http://schemas.microsoft.com/office/infopath/2007/PartnerControls"/>
-    <ds:schemaRef ds:uri="71af3243-3dd4-4a8d-8c0d-dd76da1f02a5"/>
-  </ds:schemaRefs>
-</ds:datastoreItem>
-</file>
-
-<file path=customXml/itemProps3.xml><?xml version="1.0" encoding="utf-8"?>
 <ds:datastoreItem xmlns:ds="http://schemas.openxmlformats.org/officeDocument/2006/customXml" ds:itemID="{55BB9993-D5F9-46FA-B2E5-80E3632E9820}">
   <ds:schemaRefs>
     <ds:schemaRef ds:uri="http://schemas.microsoft.com/office/2006/metadata/contentType"/>
@@ -13061,4 +13541,14 @@
     <ds:schemaRef ds:uri="http://schemas.microsoft.com/internal/obd"/>
   </ds:schemaRefs>
 </ds:datastoreItem>
+</file>
+
+<file path=customXml/itemProps3.xml><?xml version="1.0" encoding="utf-8"?>
+<ds:datastoreItem xmlns:ds="http://schemas.openxmlformats.org/officeDocument/2006/customXml" ds:itemID="{E3D9F223-918A-45AF-9B53-56AB9E5E2182}">
+  <ds:schemaRefs>
+    <ds:schemaRef ds:uri="http://schemas.microsoft.com/office/2006/metadata/properties"/>
+    <ds:schemaRef ds:uri="http://schemas.microsoft.com/office/infopath/2007/PartnerControls"/>
+    <ds:schemaRef ds:uri="71af3243-3dd4-4a8d-8c0d-dd76da1f02a5"/>
+  </ds:schemaRefs>
+</ds:datastoreItem>
 </file>
</xml_diff>